<commit_message>
New build of MZShuttle web app
</commit_message>
<xml_diff>
--- a/flexjs/worldtour-sf/JS_with_AS3.pptx
+++ b/flexjs/worldtour-sf/JS_with_AS3.pptx
@@ -13,17 +13,18 @@
     <p:sldId id="260" r:id="rId7"/>
     <p:sldId id="261" r:id="rId8"/>
     <p:sldId id="262" r:id="rId9"/>
-    <p:sldId id="263" r:id="rId10"/>
-    <p:sldId id="275" r:id="rId11"/>
-    <p:sldId id="264" r:id="rId12"/>
-    <p:sldId id="265" r:id="rId13"/>
-    <p:sldId id="271" r:id="rId14"/>
-    <p:sldId id="266" r:id="rId15"/>
-    <p:sldId id="267" r:id="rId16"/>
-    <p:sldId id="272" r:id="rId17"/>
-    <p:sldId id="273" r:id="rId18"/>
-    <p:sldId id="274" r:id="rId19"/>
-    <p:sldId id="270" r:id="rId20"/>
+    <p:sldId id="276" r:id="rId10"/>
+    <p:sldId id="263" r:id="rId11"/>
+    <p:sldId id="275" r:id="rId12"/>
+    <p:sldId id="264" r:id="rId13"/>
+    <p:sldId id="265" r:id="rId14"/>
+    <p:sldId id="271" r:id="rId15"/>
+    <p:sldId id="266" r:id="rId16"/>
+    <p:sldId id="267" r:id="rId17"/>
+    <p:sldId id="272" r:id="rId18"/>
+    <p:sldId id="273" r:id="rId19"/>
+    <p:sldId id="274" r:id="rId20"/>
+    <p:sldId id="270" r:id="rId21"/>
   </p:sldIdLst>
   <p:sldSz cx="9144000" cy="6858000" type="screen4x3"/>
   <p:notesSz cx="6858000" cy="9144000"/>
@@ -314,7 +315,7 @@
                 </a:solidFill>
               </a:rPr>
               <a:pPr/>
-              <a:t>4/3/2016</a:t>
+              <a:t>4/4/2016</a:t>
             </a:fld>
             <a:endParaRPr lang="en-US">
               <a:solidFill>
@@ -521,7 +522,7 @@
                 </a:solidFill>
               </a:rPr>
               <a:pPr/>
-              <a:t>4/3/2016</a:t>
+              <a:t>4/4/2016</a:t>
             </a:fld>
             <a:endParaRPr lang="en-US">
               <a:solidFill>
@@ -738,7 +739,7 @@
                 </a:solidFill>
               </a:rPr>
               <a:pPr/>
-              <a:t>4/3/2016</a:t>
+              <a:t>4/4/2016</a:t>
             </a:fld>
             <a:endParaRPr lang="en-US">
               <a:solidFill>
@@ -945,7 +946,7 @@
                 </a:solidFill>
               </a:rPr>
               <a:pPr/>
-              <a:t>4/3/2016</a:t>
+              <a:t>4/4/2016</a:t>
             </a:fld>
             <a:endParaRPr lang="en-US">
               <a:solidFill>
@@ -1228,7 +1229,7 @@
                 </a:solidFill>
               </a:rPr>
               <a:pPr/>
-              <a:t>4/3/2016</a:t>
+              <a:t>4/4/2016</a:t>
             </a:fld>
             <a:endParaRPr lang="en-US">
               <a:solidFill>
@@ -1553,7 +1554,7 @@
                 </a:solidFill>
               </a:rPr>
               <a:pPr/>
-              <a:t>4/3/2016</a:t>
+              <a:t>4/4/2016</a:t>
             </a:fld>
             <a:endParaRPr lang="en-US">
               <a:solidFill>
@@ -2012,7 +2013,7 @@
                 </a:solidFill>
               </a:rPr>
               <a:pPr/>
-              <a:t>4/3/2016</a:t>
+              <a:t>4/4/2016</a:t>
             </a:fld>
             <a:endParaRPr lang="en-US">
               <a:solidFill>
@@ -2167,7 +2168,7 @@
                 </a:solidFill>
               </a:rPr>
               <a:pPr/>
-              <a:t>4/3/2016</a:t>
+              <a:t>4/4/2016</a:t>
             </a:fld>
             <a:endParaRPr lang="en-US">
               <a:solidFill>
@@ -2299,7 +2300,7 @@
                 </a:solidFill>
               </a:rPr>
               <a:pPr/>
-              <a:t>4/3/2016</a:t>
+              <a:t>4/4/2016</a:t>
             </a:fld>
             <a:endParaRPr lang="en-US">
               <a:solidFill>
@@ -2613,7 +2614,7 @@
                 </a:solidFill>
               </a:rPr>
               <a:pPr/>
-              <a:t>4/3/2016</a:t>
+              <a:t>4/4/2016</a:t>
             </a:fld>
             <a:endParaRPr lang="en-US">
               <a:solidFill>
@@ -2903,7 +2904,7 @@
                 </a:solidFill>
               </a:rPr>
               <a:pPr/>
-              <a:t>4/3/2016</a:t>
+              <a:t>4/4/2016</a:t>
             </a:fld>
             <a:endParaRPr lang="en-US">
               <a:solidFill>
@@ -3153,7 +3154,7 @@
                 </a:solidFill>
               </a:rPr>
               <a:pPr/>
-              <a:t>4/3/2016</a:t>
+              <a:t>4/4/2016</a:t>
             </a:fld>
             <a:endParaRPr lang="en-US">
               <a:solidFill>
@@ -3630,15 +3631,7 @@
                   <a:schemeClr val="tx1"/>
                 </a:solidFill>
               </a:rPr>
-              <a:t>San </a:t>
-            </a:r>
-            <a:r>
-              <a:rPr lang="en-US" dirty="0" smtClean="0">
-                <a:solidFill>
-                  <a:schemeClr val="tx1"/>
-                </a:solidFill>
-              </a:rPr>
-              <a:t>Francisco, California</a:t>
+              <a:t>San Francisco, California</a:t>
             </a:r>
           </a:p>
           <a:p>
@@ -3821,7 +3814,6 @@
               <a:rPr lang="en-US" dirty="0" smtClean="0"/>
               <a:t>Externs</a:t>
             </a:r>
-            <a:endParaRPr lang="en-US" dirty="0" smtClean="0"/>
           </a:p>
         </p:txBody>
       </p:sp>
@@ -3848,64 +3840,30 @@
           <a:lstStyle/>
           <a:p>
             <a:r>
-              <a:rPr lang="en-US" dirty="0" err="1" smtClean="0"/>
-              <a:t>FlexJS</a:t>
-            </a:r>
-            <a:r>
               <a:rPr lang="en-US" dirty="0" smtClean="0"/>
-              <a:t> has a built in extern: </a:t>
-            </a:r>
-            <a:r>
-              <a:rPr lang="en-US" dirty="0" err="1" smtClean="0"/>
-              <a:t>js.swc</a:t>
-            </a:r>
-            <a:endParaRPr lang="en-US" dirty="0" smtClean="0"/>
-          </a:p>
-          <a:p>
-            <a:pPr lvl="1"/>
+              <a:t>Externs are API signatures (interfaces) of third party libraries that can be directly accessed from ActionScript during compile time</a:t>
+            </a:r>
+          </a:p>
+          <a:p>
             <a:r>
               <a:rPr lang="en-US" dirty="0" smtClean="0"/>
-              <a:t>Provides all the APIs necessary to access and manipulate the HTML(5)/SVG DOM</a:t>
-            </a:r>
-          </a:p>
-          <a:p>
+              <a:t>Runtime implementation comes from the 3</a:t>
+            </a:r>
+            <a:r>
+              <a:rPr lang="en-US" baseline="30000" dirty="0" smtClean="0"/>
+              <a:t>rd</a:t>
+            </a:r>
             <a:r>
               <a:rPr lang="en-US" dirty="0" smtClean="0"/>
-              <a:t>Tooling available (outside of Apache Flex) to create extern files for any third party JavaScript library </a:t>
-            </a:r>
-            <a:br>
-              <a:rPr lang="en-US" dirty="0" smtClean="0"/>
-            </a:br>
-            <a:r>
-              <a:rPr lang="en-US" dirty="0" smtClean="0"/>
-              <a:t>(Check out Josh </a:t>
-            </a:r>
-            <a:r>
-              <a:rPr lang="en-US" dirty="0" err="1" smtClean="0"/>
-              <a:t>Tynjala’s</a:t>
-            </a:r>
-            <a:r>
-              <a:rPr lang="en-US" dirty="0" smtClean="0"/>
-              <a:t> </a:t>
-            </a:r>
-            <a:r>
-              <a:rPr lang="en-US" dirty="0" smtClean="0">
-                <a:hlinkClick r:id="rId2"/>
-              </a:rPr>
-              <a:t>nextgenactionscript.com</a:t>
-            </a:r>
-            <a:r>
-              <a:rPr lang="en-US" dirty="0" smtClean="0"/>
-              <a:t>)</a:t>
-            </a:r>
-            <a:endParaRPr lang="en-US" dirty="0" smtClean="0"/>
+              <a:t> party library itself</a:t>
+            </a:r>
           </a:p>
         </p:txBody>
       </p:sp>
     </p:spTree>
     <p:extLst>
       <p:ext uri="{BB962C8B-B14F-4D97-AF65-F5344CB8AC3E}">
-        <p14:creationId xmlns:p14="http://schemas.microsoft.com/office/powerpoint/2010/main" val="1562360084"/>
+        <p14:creationId xmlns:p14="http://schemas.microsoft.com/office/powerpoint/2010/main" val="2861399429"/>
       </p:ext>
     </p:extLst>
   </p:cSld>
@@ -3963,9 +3921,8 @@
           <a:p>
             <a:r>
               <a:rPr lang="en-US" dirty="0" smtClean="0"/>
-              <a:t>Externs - JQuery</a:t>
-            </a:r>
-            <a:endParaRPr lang="en-US" dirty="0" smtClean="0"/>
+              <a:t>Externs</a:t>
+            </a:r>
           </a:p>
         </p:txBody>
       </p:sp>
@@ -3981,8 +3938,8 @@
         </p:nvSpPr>
         <p:spPr>
           <a:xfrm>
-            <a:off x="457200" y="1828800"/>
-            <a:ext cx="8229600" cy="4876800"/>
+            <a:off x="76200" y="1828800"/>
+            <a:ext cx="8915400" cy="4876800"/>
           </a:xfrm>
         </p:spPr>
         <p:txBody>
@@ -3991,119 +3948,64 @@
           </a:bodyPr>
           <a:lstStyle/>
           <a:p>
-            <a:pPr marL="0" indent="0">
-              <a:buNone/>
-            </a:pPr>
-            <a:r>
-              <a:rPr lang="en-US" sz="2800" dirty="0">
-                <a:latin typeface="Consolas" panose="020B0609020204030204" pitchFamily="49" charset="0"/>
-                <a:cs typeface="Consolas" panose="020B0609020204030204" pitchFamily="49" charset="0"/>
-              </a:rPr>
-              <a:t>$(circle).animate({opacity: 0.25</a:t>
-            </a:r>
-            <a:r>
-              <a:rPr lang="en-US" sz="2800" dirty="0" smtClean="0">
-                <a:latin typeface="Consolas" panose="020B0609020204030204" pitchFamily="49" charset="0"/>
-                <a:cs typeface="Consolas" panose="020B0609020204030204" pitchFamily="49" charset="0"/>
-              </a:rPr>
-              <a:t>,</a:t>
-            </a:r>
-          </a:p>
-          <a:p>
-            <a:pPr marL="0" indent="0">
-              <a:buNone/>
-            </a:pPr>
-            <a:r>
-              <a:rPr lang="en-US" sz="2800" dirty="0" smtClean="0">
-                <a:latin typeface="Consolas" panose="020B0609020204030204" pitchFamily="49" charset="0"/>
-                <a:cs typeface="Consolas" panose="020B0609020204030204" pitchFamily="49" charset="0"/>
-              </a:rPr>
-              <a:t>                   r</a:t>
-            </a:r>
-            <a:r>
-              <a:rPr lang="en-US" sz="2800" dirty="0">
-                <a:latin typeface="Consolas" panose="020B0609020204030204" pitchFamily="49" charset="0"/>
-                <a:cs typeface="Consolas" panose="020B0609020204030204" pitchFamily="49" charset="0"/>
-              </a:rPr>
-              <a:t>: "toggle</a:t>
-            </a:r>
-            <a:r>
-              <a:rPr lang="en-US" sz="2800" dirty="0" smtClean="0">
-                <a:latin typeface="Consolas" panose="020B0609020204030204" pitchFamily="49" charset="0"/>
-                <a:cs typeface="Consolas" panose="020B0609020204030204" pitchFamily="49" charset="0"/>
-              </a:rPr>
-              <a:t>"});</a:t>
-            </a:r>
-          </a:p>
-          <a:p>
-            <a:pPr marL="0" indent="0">
-              <a:buNone/>
-            </a:pPr>
-            <a:r>
-              <a:rPr lang="en-US" sz="2800" dirty="0">
-                <a:latin typeface="Consolas" panose="020B0609020204030204" pitchFamily="49" charset="0"/>
-                <a:cs typeface="Consolas" panose="020B0609020204030204" pitchFamily="49" charset="0"/>
-              </a:rPr>
-              <a:t>$(circle</a:t>
-            </a:r>
-            <a:r>
-              <a:rPr lang="en-US" sz="2800" dirty="0" smtClean="0">
-                <a:latin typeface="Consolas" panose="020B0609020204030204" pitchFamily="49" charset="0"/>
-                <a:cs typeface="Consolas" panose="020B0609020204030204" pitchFamily="49" charset="0"/>
-              </a:rPr>
-              <a:t>).</a:t>
-            </a:r>
-            <a:r>
-              <a:rPr lang="en-US" sz="2800" dirty="0" err="1" smtClean="0">
-                <a:latin typeface="Consolas" panose="020B0609020204030204" pitchFamily="49" charset="0"/>
-                <a:cs typeface="Consolas" panose="020B0609020204030204" pitchFamily="49" charset="0"/>
-              </a:rPr>
-              <a:t>fadeIn</a:t>
-            </a:r>
-            <a:r>
-              <a:rPr lang="en-US" sz="2800" dirty="0" smtClean="0">
-                <a:latin typeface="Consolas" panose="020B0609020204030204" pitchFamily="49" charset="0"/>
-                <a:cs typeface="Consolas" panose="020B0609020204030204" pitchFamily="49" charset="0"/>
-              </a:rPr>
-              <a:t>();</a:t>
-            </a:r>
-          </a:p>
-          <a:p>
-            <a:pPr marL="0" indent="0">
-              <a:buNone/>
-            </a:pPr>
-            <a:r>
-              <a:rPr lang="en-US" sz="2800" dirty="0" smtClean="0">
-                <a:latin typeface="Consolas" panose="020B0609020204030204" pitchFamily="49" charset="0"/>
-                <a:cs typeface="Consolas" panose="020B0609020204030204" pitchFamily="49" charset="0"/>
-              </a:rPr>
-              <a:t>$(circle).click(</a:t>
-            </a:r>
-            <a:r>
-              <a:rPr lang="en-US" sz="2800" dirty="0" err="1" smtClean="0">
-                <a:latin typeface="Consolas" panose="020B0609020204030204" pitchFamily="49" charset="0"/>
-                <a:cs typeface="Consolas" panose="020B0609020204030204" pitchFamily="49" charset="0"/>
-              </a:rPr>
-              <a:t>handleCircleClick</a:t>
-            </a:r>
-            <a:r>
-              <a:rPr lang="en-US" sz="2800" dirty="0" smtClean="0">
-                <a:latin typeface="Consolas" panose="020B0609020204030204" pitchFamily="49" charset="0"/>
-                <a:cs typeface="Consolas" panose="020B0609020204030204" pitchFamily="49" charset="0"/>
-              </a:rPr>
-              <a:t>);</a:t>
-            </a:r>
-            <a:endParaRPr lang="en-US" sz="2800" dirty="0" smtClean="0">
-              <a:latin typeface="Consolas" panose="020B0609020204030204" pitchFamily="49" charset="0"/>
-              <a:cs typeface="Consolas" panose="020B0609020204030204" pitchFamily="49" charset="0"/>
-            </a:endParaRPr>
+            <a:r>
+              <a:rPr lang="en-US" dirty="0" err="1" smtClean="0"/>
+              <a:t>FlexJS</a:t>
+            </a:r>
+            <a:r>
+              <a:rPr lang="en-US" dirty="0" smtClean="0"/>
+              <a:t> has a built in extern: </a:t>
+            </a:r>
+            <a:r>
+              <a:rPr lang="en-US" dirty="0" err="1" smtClean="0"/>
+              <a:t>js.swc</a:t>
+            </a:r>
+            <a:endParaRPr lang="en-US" dirty="0" smtClean="0"/>
+          </a:p>
+          <a:p>
+            <a:pPr lvl="1"/>
+            <a:r>
+              <a:rPr lang="en-US" dirty="0" smtClean="0"/>
+              <a:t>Provides all the APIs necessary to access and manipulate the HTML(5)/SVG DOM</a:t>
+            </a:r>
+          </a:p>
+          <a:p>
+            <a:r>
+              <a:rPr lang="en-US" dirty="0" smtClean="0"/>
+              <a:t>Tooling available (outside of Apache Flex) to create extern files for any third party JavaScript library </a:t>
+            </a:r>
+            <a:br>
+              <a:rPr lang="en-US" dirty="0" smtClean="0"/>
+            </a:br>
+            <a:r>
+              <a:rPr lang="en-US" dirty="0" smtClean="0"/>
+              <a:t>(Check out Josh </a:t>
+            </a:r>
+            <a:r>
+              <a:rPr lang="en-US" dirty="0" err="1" smtClean="0"/>
+              <a:t>Tynjala’s</a:t>
+            </a:r>
+            <a:r>
+              <a:rPr lang="en-US" dirty="0" smtClean="0"/>
+              <a:t> </a:t>
+            </a:r>
+            <a:r>
+              <a:rPr lang="en-US" dirty="0" smtClean="0">
+                <a:hlinkClick r:id="rId2"/>
+              </a:rPr>
+              <a:t>nextgenactionscript.com</a:t>
+            </a:r>
+            <a:r>
+              <a:rPr lang="en-US" dirty="0" smtClean="0"/>
+              <a:t>)</a:t>
+            </a:r>
           </a:p>
         </p:txBody>
       </p:sp>
     </p:spTree>
     <p:extLst>
       <p:ext uri="{BB962C8B-B14F-4D97-AF65-F5344CB8AC3E}">
-        <p14:creationId xmlns:p14="http://schemas.microsoft.com/office/powerpoint/2010/main" val="3968307096"/>
+        <p14:creationId xmlns:p14="http://schemas.microsoft.com/office/powerpoint/2010/main" val="1562360084"/>
       </p:ext>
     </p:extLst>
   </p:cSld>
@@ -4161,9 +4063,8 @@
           <a:p>
             <a:r>
               <a:rPr lang="en-US" dirty="0" smtClean="0"/>
-              <a:t>Externs - AngularJS</a:t>
-            </a:r>
-            <a:endParaRPr lang="en-US" dirty="0" smtClean="0"/>
+              <a:t>Externs - JQuery</a:t>
+            </a:r>
           </a:p>
         </p:txBody>
       </p:sp>
@@ -4193,242 +4094,103 @@
               <a:buNone/>
             </a:pPr>
             <a:r>
-              <a:rPr lang="en-US" sz="2000" dirty="0" smtClean="0">
-                <a:latin typeface="Consolas" panose="020B0609020204030204" pitchFamily="49" charset="0"/>
-                <a:cs typeface="Consolas" panose="020B0609020204030204" pitchFamily="49" charset="0"/>
-              </a:rPr>
-              <a:t>//Define the Angular App</a:t>
-            </a:r>
-          </a:p>
-          <a:p>
-            <a:pPr marL="0" indent="0">
-              <a:buNone/>
-            </a:pPr>
-            <a:r>
-              <a:rPr lang="en-US" sz="2000" dirty="0" smtClean="0">
-                <a:latin typeface="Consolas" panose="020B0609020204030204" pitchFamily="49" charset="0"/>
-                <a:cs typeface="Consolas" panose="020B0609020204030204" pitchFamily="49" charset="0"/>
-              </a:rPr>
-              <a:t>//Add dependencies </a:t>
-            </a:r>
-          </a:p>
-          <a:p>
-            <a:pPr marL="0" indent="0">
-              <a:buNone/>
-            </a:pPr>
-            <a:r>
-              <a:rPr lang="en-US" sz="2000" dirty="0" err="1" smtClean="0">
-                <a:latin typeface="Consolas" panose="020B0609020204030204" pitchFamily="49" charset="0"/>
-                <a:cs typeface="Consolas" panose="020B0609020204030204" pitchFamily="49" charset="0"/>
-              </a:rPr>
-              <a:t>var</a:t>
-            </a:r>
-            <a:r>
-              <a:rPr lang="en-US" sz="2000" dirty="0" smtClean="0">
-                <a:latin typeface="Consolas" panose="020B0609020204030204" pitchFamily="49" charset="0"/>
-                <a:cs typeface="Consolas" panose="020B0609020204030204" pitchFamily="49" charset="0"/>
-              </a:rPr>
-              <a:t> </a:t>
-            </a:r>
-            <a:r>
-              <a:rPr lang="en-US" sz="2000" dirty="0" err="1" smtClean="0">
-                <a:latin typeface="Consolas" panose="020B0609020204030204" pitchFamily="49" charset="0"/>
-                <a:cs typeface="Consolas" panose="020B0609020204030204" pitchFamily="49" charset="0"/>
-              </a:rPr>
-              <a:t>app:IModule</a:t>
-            </a:r>
-            <a:r>
-              <a:rPr lang="en-US" sz="2000" dirty="0" smtClean="0">
-                <a:latin typeface="Consolas" panose="020B0609020204030204" pitchFamily="49" charset="0"/>
-                <a:cs typeface="Consolas" panose="020B0609020204030204" pitchFamily="49" charset="0"/>
-              </a:rPr>
-              <a:t> </a:t>
-            </a:r>
-            <a:r>
-              <a:rPr lang="en-US" sz="2000" dirty="0">
-                <a:latin typeface="Consolas" panose="020B0609020204030204" pitchFamily="49" charset="0"/>
-                <a:cs typeface="Consolas" panose="020B0609020204030204" pitchFamily="49" charset="0"/>
-              </a:rPr>
-              <a:t>= </a:t>
-            </a:r>
-            <a:r>
-              <a:rPr lang="en-US" sz="2000" dirty="0" err="1">
-                <a:latin typeface="Consolas" panose="020B0609020204030204" pitchFamily="49" charset="0"/>
-                <a:cs typeface="Consolas" panose="020B0609020204030204" pitchFamily="49" charset="0"/>
-              </a:rPr>
-              <a:t>angular.module</a:t>
-            </a:r>
-            <a:r>
-              <a:rPr lang="en-US" sz="2000" dirty="0">
-                <a:latin typeface="Consolas" panose="020B0609020204030204" pitchFamily="49" charset="0"/>
-                <a:cs typeface="Consolas" panose="020B0609020204030204" pitchFamily="49" charset="0"/>
-              </a:rPr>
-              <a:t>("app",["</a:t>
-            </a:r>
-            <a:r>
-              <a:rPr lang="en-US" sz="2000" dirty="0" err="1">
-                <a:latin typeface="Consolas" panose="020B0609020204030204" pitchFamily="49" charset="0"/>
-                <a:cs typeface="Consolas" panose="020B0609020204030204" pitchFamily="49" charset="0"/>
-              </a:rPr>
-              <a:t>ngMaterial</a:t>
-            </a:r>
-            <a:r>
-              <a:rPr lang="en-US" sz="2000" dirty="0" smtClean="0">
-                <a:latin typeface="Consolas" panose="020B0609020204030204" pitchFamily="49" charset="0"/>
-                <a:cs typeface="Consolas" panose="020B0609020204030204" pitchFamily="49" charset="0"/>
-              </a:rPr>
-              <a:t>"]);</a:t>
-            </a:r>
-          </a:p>
-          <a:p>
-            <a:pPr marL="0" indent="0">
-              <a:buNone/>
-            </a:pPr>
-            <a:endParaRPr lang="en-US" sz="2000" dirty="0">
-              <a:latin typeface="Consolas" panose="020B0609020204030204" pitchFamily="49" charset="0"/>
-              <a:cs typeface="Consolas" panose="020B0609020204030204" pitchFamily="49" charset="0"/>
-            </a:endParaRPr>
-          </a:p>
-          <a:p>
-            <a:pPr marL="0" indent="0">
-              <a:buNone/>
-            </a:pPr>
-            <a:r>
-              <a:rPr lang="en-US" sz="2000" dirty="0" smtClean="0">
-                <a:latin typeface="Consolas" panose="020B0609020204030204" pitchFamily="49" charset="0"/>
-                <a:cs typeface="Consolas" panose="020B0609020204030204" pitchFamily="49" charset="0"/>
-              </a:rPr>
-              <a:t>//Add an AngularJS controller</a:t>
-            </a:r>
-          </a:p>
-          <a:p>
-            <a:pPr marL="0" indent="0">
-              <a:buNone/>
-            </a:pPr>
-            <a:r>
-              <a:rPr lang="en-US" sz="2000" dirty="0" err="1" smtClean="0">
-                <a:latin typeface="Consolas" panose="020B0609020204030204" pitchFamily="49" charset="0"/>
-                <a:cs typeface="Consolas" panose="020B0609020204030204" pitchFamily="49" charset="0"/>
-              </a:rPr>
-              <a:t>app.controller</a:t>
-            </a:r>
-            <a:r>
-              <a:rPr lang="en-US" sz="2000" dirty="0">
-                <a:latin typeface="Consolas" panose="020B0609020204030204" pitchFamily="49" charset="0"/>
-                <a:cs typeface="Consolas" panose="020B0609020204030204" pitchFamily="49" charset="0"/>
-              </a:rPr>
-              <a:t>("</a:t>
-            </a:r>
-            <a:r>
-              <a:rPr lang="en-US" sz="2000" dirty="0" err="1">
-                <a:latin typeface="Consolas" panose="020B0609020204030204" pitchFamily="49" charset="0"/>
-                <a:cs typeface="Consolas" panose="020B0609020204030204" pitchFamily="49" charset="0"/>
-              </a:rPr>
-              <a:t>MyController</a:t>
-            </a:r>
-            <a:r>
-              <a:rPr lang="en-US" sz="2000" dirty="0">
-                <a:latin typeface="Consolas" panose="020B0609020204030204" pitchFamily="49" charset="0"/>
-                <a:cs typeface="Consolas" panose="020B0609020204030204" pitchFamily="49" charset="0"/>
-              </a:rPr>
-              <a:t>", ["$scope", "$</a:t>
-            </a:r>
-            <a:r>
-              <a:rPr lang="en-US" sz="2000" dirty="0" err="1">
-                <a:latin typeface="Consolas" panose="020B0609020204030204" pitchFamily="49" charset="0"/>
-                <a:cs typeface="Consolas" panose="020B0609020204030204" pitchFamily="49" charset="0"/>
-              </a:rPr>
-              <a:t>mdDialog</a:t>
-            </a:r>
-            <a:r>
-              <a:rPr lang="en-US" sz="2000" dirty="0">
-                <a:latin typeface="Consolas" panose="020B0609020204030204" pitchFamily="49" charset="0"/>
-                <a:cs typeface="Consolas" panose="020B0609020204030204" pitchFamily="49" charset="0"/>
-              </a:rPr>
-              <a:t>", </a:t>
-            </a:r>
-            <a:r>
-              <a:rPr lang="en-US" sz="2000" dirty="0" err="1">
-                <a:latin typeface="Consolas" panose="020B0609020204030204" pitchFamily="49" charset="0"/>
-                <a:cs typeface="Consolas" panose="020B0609020204030204" pitchFamily="49" charset="0"/>
-              </a:rPr>
-              <a:t>MyController</a:t>
-            </a:r>
-            <a:r>
-              <a:rPr lang="en-US" sz="2000" dirty="0" smtClean="0">
-                <a:latin typeface="Consolas" panose="020B0609020204030204" pitchFamily="49" charset="0"/>
-                <a:cs typeface="Consolas" panose="020B0609020204030204" pitchFamily="49" charset="0"/>
-              </a:rPr>
-              <a:t>]);</a:t>
-            </a:r>
-          </a:p>
-          <a:p>
-            <a:pPr marL="0" indent="0">
-              <a:buNone/>
-            </a:pPr>
-            <a:endParaRPr lang="en-US" sz="2000" dirty="0" smtClean="0">
-              <a:latin typeface="Consolas" panose="020B0609020204030204" pitchFamily="49" charset="0"/>
-              <a:cs typeface="Consolas" panose="020B0609020204030204" pitchFamily="49" charset="0"/>
-            </a:endParaRPr>
-          </a:p>
-          <a:p>
-            <a:pPr marL="0" indent="0">
-              <a:buNone/>
-            </a:pPr>
-            <a:r>
-              <a:rPr lang="en-US" sz="2000" dirty="0" smtClean="0">
-                <a:latin typeface="Consolas" panose="020B0609020204030204" pitchFamily="49" charset="0"/>
-                <a:cs typeface="Consolas" panose="020B0609020204030204" pitchFamily="49" charset="0"/>
-              </a:rPr>
-              <a:t>//Set ng-app attribute on the body element</a:t>
-            </a:r>
-            <a:endParaRPr lang="en-US" sz="2000" dirty="0">
-              <a:latin typeface="Consolas" panose="020B0609020204030204" pitchFamily="49" charset="0"/>
-              <a:cs typeface="Consolas" panose="020B0609020204030204" pitchFamily="49" charset="0"/>
-            </a:endParaRPr>
-          </a:p>
-          <a:p>
-            <a:pPr marL="0" indent="0">
-              <a:buNone/>
-            </a:pPr>
-            <a:r>
-              <a:rPr lang="en-US" sz="2000" dirty="0" err="1">
-                <a:latin typeface="Consolas" panose="020B0609020204030204" pitchFamily="49" charset="0"/>
-                <a:cs typeface="Consolas" panose="020B0609020204030204" pitchFamily="49" charset="0"/>
-              </a:rPr>
-              <a:t>document.body.setAttribute</a:t>
-            </a:r>
-            <a:r>
-              <a:rPr lang="en-US" sz="2000" dirty="0">
-                <a:latin typeface="Consolas" panose="020B0609020204030204" pitchFamily="49" charset="0"/>
-                <a:cs typeface="Consolas" panose="020B0609020204030204" pitchFamily="49" charset="0"/>
-              </a:rPr>
-              <a:t>("ng-app", "app</a:t>
-            </a:r>
-            <a:r>
-              <a:rPr lang="en-US" sz="2000" dirty="0" smtClean="0">
-                <a:latin typeface="Consolas" panose="020B0609020204030204" pitchFamily="49" charset="0"/>
-                <a:cs typeface="Consolas" panose="020B0609020204030204" pitchFamily="49" charset="0"/>
-              </a:rPr>
-              <a:t>");</a:t>
-            </a:r>
-          </a:p>
-          <a:p>
-            <a:pPr marL="0" indent="0">
-              <a:buNone/>
-            </a:pPr>
-            <a:endParaRPr lang="en-US" sz="2000" dirty="0">
-              <a:latin typeface="Consolas" panose="020B0609020204030204" pitchFamily="49" charset="0"/>
-              <a:cs typeface="Consolas" panose="020B0609020204030204" pitchFamily="49" charset="0"/>
-            </a:endParaRPr>
-          </a:p>
-          <a:p>
-            <a:pPr marL="0" indent="0" algn="ctr">
-              <a:buNone/>
-            </a:pPr>
-            <a:r>
-              <a:rPr lang="en-US" sz="3000" dirty="0"/>
-              <a:t>Your AngularJS app is ready!</a:t>
+              <a:rPr lang="en-US" sz="2800" dirty="0">
+                <a:latin typeface="Consolas" panose="020B0609020204030204" pitchFamily="49" charset="0"/>
+                <a:cs typeface="Consolas" panose="020B0609020204030204" pitchFamily="49" charset="0"/>
+              </a:rPr>
+              <a:t>$(circle).animate({opacity: 0.25</a:t>
+            </a:r>
+            <a:r>
+              <a:rPr lang="en-US" sz="2800" dirty="0" smtClean="0">
+                <a:latin typeface="Consolas" panose="020B0609020204030204" pitchFamily="49" charset="0"/>
+                <a:cs typeface="Consolas" panose="020B0609020204030204" pitchFamily="49" charset="0"/>
+              </a:rPr>
+              <a:t>,</a:t>
+            </a:r>
+          </a:p>
+          <a:p>
+            <a:pPr marL="0" indent="0">
+              <a:buNone/>
+            </a:pPr>
+            <a:r>
+              <a:rPr lang="en-US" sz="2800" dirty="0" smtClean="0">
+                <a:latin typeface="Consolas" panose="020B0609020204030204" pitchFamily="49" charset="0"/>
+                <a:cs typeface="Consolas" panose="020B0609020204030204" pitchFamily="49" charset="0"/>
+              </a:rPr>
+              <a:t>                   r</a:t>
+            </a:r>
+            <a:r>
+              <a:rPr lang="en-US" sz="2800" dirty="0">
+                <a:latin typeface="Consolas" panose="020B0609020204030204" pitchFamily="49" charset="0"/>
+                <a:cs typeface="Consolas" panose="020B0609020204030204" pitchFamily="49" charset="0"/>
+              </a:rPr>
+              <a:t>: "toggle</a:t>
+            </a:r>
+            <a:r>
+              <a:rPr lang="en-US" sz="2800" dirty="0" smtClean="0">
+                <a:latin typeface="Consolas" panose="020B0609020204030204" pitchFamily="49" charset="0"/>
+                <a:cs typeface="Consolas" panose="020B0609020204030204" pitchFamily="49" charset="0"/>
+              </a:rPr>
+              <a:t>"});</a:t>
+            </a:r>
+          </a:p>
+          <a:p>
+            <a:pPr marL="0" indent="0">
+              <a:buNone/>
+            </a:pPr>
+            <a:r>
+              <a:rPr lang="en-US" sz="2800" dirty="0">
+                <a:latin typeface="Consolas" panose="020B0609020204030204" pitchFamily="49" charset="0"/>
+                <a:cs typeface="Consolas" panose="020B0609020204030204" pitchFamily="49" charset="0"/>
+              </a:rPr>
+              <a:t>$(circle</a:t>
+            </a:r>
+            <a:r>
+              <a:rPr lang="en-US" sz="2800" dirty="0" smtClean="0">
+                <a:latin typeface="Consolas" panose="020B0609020204030204" pitchFamily="49" charset="0"/>
+                <a:cs typeface="Consolas" panose="020B0609020204030204" pitchFamily="49" charset="0"/>
+              </a:rPr>
+              <a:t>).</a:t>
+            </a:r>
+            <a:r>
+              <a:rPr lang="en-US" sz="2800" dirty="0" err="1" smtClean="0">
+                <a:latin typeface="Consolas" panose="020B0609020204030204" pitchFamily="49" charset="0"/>
+                <a:cs typeface="Consolas" panose="020B0609020204030204" pitchFamily="49" charset="0"/>
+              </a:rPr>
+              <a:t>fadeIn</a:t>
+            </a:r>
+            <a:r>
+              <a:rPr lang="en-US" sz="2800" dirty="0" smtClean="0">
+                <a:latin typeface="Consolas" panose="020B0609020204030204" pitchFamily="49" charset="0"/>
+                <a:cs typeface="Consolas" panose="020B0609020204030204" pitchFamily="49" charset="0"/>
+              </a:rPr>
+              <a:t>();</a:t>
+            </a:r>
+          </a:p>
+          <a:p>
+            <a:pPr marL="0" indent="0">
+              <a:buNone/>
+            </a:pPr>
+            <a:r>
+              <a:rPr lang="en-US" sz="2800" dirty="0" smtClean="0">
+                <a:latin typeface="Consolas" panose="020B0609020204030204" pitchFamily="49" charset="0"/>
+                <a:cs typeface="Consolas" panose="020B0609020204030204" pitchFamily="49" charset="0"/>
+              </a:rPr>
+              <a:t>$(circle).click(</a:t>
+            </a:r>
+            <a:r>
+              <a:rPr lang="en-US" sz="2800" dirty="0" err="1" smtClean="0">
+                <a:latin typeface="Consolas" panose="020B0609020204030204" pitchFamily="49" charset="0"/>
+                <a:cs typeface="Consolas" panose="020B0609020204030204" pitchFamily="49" charset="0"/>
+              </a:rPr>
+              <a:t>handleCircleClick</a:t>
+            </a:r>
+            <a:r>
+              <a:rPr lang="en-US" sz="2800" dirty="0" smtClean="0">
+                <a:latin typeface="Consolas" panose="020B0609020204030204" pitchFamily="49" charset="0"/>
+                <a:cs typeface="Consolas" panose="020B0609020204030204" pitchFamily="49" charset="0"/>
+              </a:rPr>
+              <a:t>);</a:t>
             </a:r>
           </a:p>
         </p:txBody>
@@ -4436,7 +4198,7 @@
     </p:spTree>
     <p:extLst>
       <p:ext uri="{BB962C8B-B14F-4D97-AF65-F5344CB8AC3E}">
-        <p14:creationId xmlns:p14="http://schemas.microsoft.com/office/powerpoint/2010/main" val="1091432470"/>
+        <p14:creationId xmlns:p14="http://schemas.microsoft.com/office/powerpoint/2010/main" val="3968307096"/>
       </p:ext>
     </p:extLst>
   </p:cSld>
@@ -4496,7 +4258,6 @@
               <a:rPr lang="en-US" dirty="0" smtClean="0"/>
               <a:t>Externs - AngularJS</a:t>
             </a:r>
-            <a:endParaRPr lang="en-US" dirty="0" smtClean="0"/>
           </a:p>
         </p:txBody>
       </p:sp>
@@ -4512,13 +4273,13 @@
         </p:nvSpPr>
         <p:spPr>
           <a:xfrm>
-            <a:off x="457200" y="1295400"/>
-            <a:ext cx="8229600" cy="5410200"/>
+            <a:off x="457200" y="1828800"/>
+            <a:ext cx="8229600" cy="4876800"/>
           </a:xfrm>
         </p:spPr>
         <p:txBody>
           <a:bodyPr>
-            <a:normAutofit fontScale="92500" lnSpcReduction="20000"/>
+            <a:normAutofit/>
           </a:bodyPr>
           <a:lstStyle/>
           <a:p>
@@ -4530,7 +4291,7 @@
                 <a:latin typeface="Consolas" panose="020B0609020204030204" pitchFamily="49" charset="0"/>
                 <a:cs typeface="Consolas" panose="020B0609020204030204" pitchFamily="49" charset="0"/>
               </a:rPr>
-              <a:t>//AngularJS Controller class (yes, a proper class!)	</a:t>
+              <a:t>//Define the Angular App</a:t>
             </a:r>
           </a:p>
           <a:p>
@@ -4542,252 +4303,157 @@
                 <a:latin typeface="Consolas" panose="020B0609020204030204" pitchFamily="49" charset="0"/>
                 <a:cs typeface="Consolas" panose="020B0609020204030204" pitchFamily="49" charset="0"/>
               </a:rPr>
-              <a:t>public class </a:t>
-            </a:r>
+              <a:t>//Add dependencies </a:t>
+            </a:r>
+          </a:p>
+          <a:p>
+            <a:pPr marL="0" indent="0">
+              <a:buNone/>
+            </a:pPr>
             <a:r>
               <a:rPr lang="en-US" sz="2000" dirty="0" err="1" smtClean="0">
                 <a:latin typeface="Consolas" panose="020B0609020204030204" pitchFamily="49" charset="0"/>
                 <a:cs typeface="Consolas" panose="020B0609020204030204" pitchFamily="49" charset="0"/>
               </a:rPr>
+              <a:t>var</a:t>
+            </a:r>
+            <a:r>
+              <a:rPr lang="en-US" sz="2000" dirty="0" smtClean="0">
+                <a:latin typeface="Consolas" panose="020B0609020204030204" pitchFamily="49" charset="0"/>
+                <a:cs typeface="Consolas" panose="020B0609020204030204" pitchFamily="49" charset="0"/>
+              </a:rPr>
+              <a:t> </a:t>
+            </a:r>
+            <a:r>
+              <a:rPr lang="en-US" sz="2000" dirty="0" err="1" smtClean="0">
+                <a:latin typeface="Consolas" panose="020B0609020204030204" pitchFamily="49" charset="0"/>
+                <a:cs typeface="Consolas" panose="020B0609020204030204" pitchFamily="49" charset="0"/>
+              </a:rPr>
+              <a:t>app:IModule</a:t>
+            </a:r>
+            <a:r>
+              <a:rPr lang="en-US" sz="2000" dirty="0" smtClean="0">
+                <a:latin typeface="Consolas" panose="020B0609020204030204" pitchFamily="49" charset="0"/>
+                <a:cs typeface="Consolas" panose="020B0609020204030204" pitchFamily="49" charset="0"/>
+              </a:rPr>
+              <a:t> </a:t>
+            </a:r>
+            <a:r>
+              <a:rPr lang="en-US" sz="2000" dirty="0">
+                <a:latin typeface="Consolas" panose="020B0609020204030204" pitchFamily="49" charset="0"/>
+                <a:cs typeface="Consolas" panose="020B0609020204030204" pitchFamily="49" charset="0"/>
+              </a:rPr>
+              <a:t>= </a:t>
+            </a:r>
+            <a:r>
+              <a:rPr lang="en-US" sz="2000" dirty="0" err="1">
+                <a:latin typeface="Consolas" panose="020B0609020204030204" pitchFamily="49" charset="0"/>
+                <a:cs typeface="Consolas" panose="020B0609020204030204" pitchFamily="49" charset="0"/>
+              </a:rPr>
+              <a:t>angular.module</a:t>
+            </a:r>
+            <a:r>
+              <a:rPr lang="en-US" sz="2000" dirty="0">
+                <a:latin typeface="Consolas" panose="020B0609020204030204" pitchFamily="49" charset="0"/>
+                <a:cs typeface="Consolas" panose="020B0609020204030204" pitchFamily="49" charset="0"/>
+              </a:rPr>
+              <a:t>("app",["</a:t>
+            </a:r>
+            <a:r>
+              <a:rPr lang="en-US" sz="2000" dirty="0" err="1">
+                <a:latin typeface="Consolas" panose="020B0609020204030204" pitchFamily="49" charset="0"/>
+                <a:cs typeface="Consolas" panose="020B0609020204030204" pitchFamily="49" charset="0"/>
+              </a:rPr>
+              <a:t>ngMaterial</a:t>
+            </a:r>
+            <a:r>
+              <a:rPr lang="en-US" sz="2000" dirty="0" smtClean="0">
+                <a:latin typeface="Consolas" panose="020B0609020204030204" pitchFamily="49" charset="0"/>
+                <a:cs typeface="Consolas" panose="020B0609020204030204" pitchFamily="49" charset="0"/>
+              </a:rPr>
+              <a:t>"]);</a:t>
+            </a:r>
+          </a:p>
+          <a:p>
+            <a:pPr marL="0" indent="0">
+              <a:buNone/>
+            </a:pPr>
+            <a:endParaRPr lang="en-US" sz="2000" dirty="0">
+              <a:latin typeface="Consolas" panose="020B0609020204030204" pitchFamily="49" charset="0"/>
+              <a:cs typeface="Consolas" panose="020B0609020204030204" pitchFamily="49" charset="0"/>
+            </a:endParaRPr>
+          </a:p>
+          <a:p>
+            <a:pPr marL="0" indent="0">
+              <a:buNone/>
+            </a:pPr>
+            <a:r>
+              <a:rPr lang="en-US" sz="2000" dirty="0" smtClean="0">
+                <a:latin typeface="Consolas" panose="020B0609020204030204" pitchFamily="49" charset="0"/>
+                <a:cs typeface="Consolas" panose="020B0609020204030204" pitchFamily="49" charset="0"/>
+              </a:rPr>
+              <a:t>//Add an AngularJS controller</a:t>
+            </a:r>
+          </a:p>
+          <a:p>
+            <a:pPr marL="0" indent="0">
+              <a:buNone/>
+            </a:pPr>
+            <a:r>
+              <a:rPr lang="en-US" sz="2000" dirty="0" err="1" smtClean="0">
+                <a:latin typeface="Consolas" panose="020B0609020204030204" pitchFamily="49" charset="0"/>
+                <a:cs typeface="Consolas" panose="020B0609020204030204" pitchFamily="49" charset="0"/>
+              </a:rPr>
+              <a:t>app.controller</a:t>
+            </a:r>
+            <a:r>
+              <a:rPr lang="en-US" sz="2000" dirty="0">
+                <a:latin typeface="Consolas" panose="020B0609020204030204" pitchFamily="49" charset="0"/>
+                <a:cs typeface="Consolas" panose="020B0609020204030204" pitchFamily="49" charset="0"/>
+              </a:rPr>
+              <a:t>("</a:t>
+            </a:r>
+            <a:r>
+              <a:rPr lang="en-US" sz="2000" dirty="0" err="1">
+                <a:latin typeface="Consolas" panose="020B0609020204030204" pitchFamily="49" charset="0"/>
+                <a:cs typeface="Consolas" panose="020B0609020204030204" pitchFamily="49" charset="0"/>
+              </a:rPr>
               <a:t>MyController</a:t>
             </a:r>
             <a:r>
+              <a:rPr lang="en-US" sz="2000" dirty="0">
+                <a:latin typeface="Consolas" panose="020B0609020204030204" pitchFamily="49" charset="0"/>
+                <a:cs typeface="Consolas" panose="020B0609020204030204" pitchFamily="49" charset="0"/>
+              </a:rPr>
+              <a:t>", ["$scope", "$</a:t>
+            </a:r>
+            <a:r>
+              <a:rPr lang="en-US" sz="2000" dirty="0" err="1">
+                <a:latin typeface="Consolas" panose="020B0609020204030204" pitchFamily="49" charset="0"/>
+                <a:cs typeface="Consolas" panose="020B0609020204030204" pitchFamily="49" charset="0"/>
+              </a:rPr>
+              <a:t>mdDialog</a:t>
+            </a:r>
+            <a:r>
+              <a:rPr lang="en-US" sz="2000" dirty="0">
+                <a:latin typeface="Consolas" panose="020B0609020204030204" pitchFamily="49" charset="0"/>
+                <a:cs typeface="Consolas" panose="020B0609020204030204" pitchFamily="49" charset="0"/>
+              </a:rPr>
+              <a:t>", </a:t>
+            </a:r>
+            <a:r>
+              <a:rPr lang="en-US" sz="2000" dirty="0" err="1">
+                <a:latin typeface="Consolas" panose="020B0609020204030204" pitchFamily="49" charset="0"/>
+                <a:cs typeface="Consolas" panose="020B0609020204030204" pitchFamily="49" charset="0"/>
+              </a:rPr>
+              <a:t>MyController</a:t>
+            </a:r>
+            <a:r>
               <a:rPr lang="en-US" sz="2000" dirty="0" smtClean="0">
                 <a:latin typeface="Consolas" panose="020B0609020204030204" pitchFamily="49" charset="0"/>
                 <a:cs typeface="Consolas" panose="020B0609020204030204" pitchFamily="49" charset="0"/>
               </a:rPr>
-              <a:t> {</a:t>
-            </a:r>
-          </a:p>
-          <a:p>
-            <a:pPr marL="0" indent="0">
-              <a:buNone/>
-            </a:pPr>
-            <a:r>
-              <a:rPr lang="en-US" sz="2000" dirty="0">
-                <a:latin typeface="Consolas" panose="020B0609020204030204" pitchFamily="49" charset="0"/>
-                <a:cs typeface="Consolas" panose="020B0609020204030204" pitchFamily="49" charset="0"/>
-              </a:rPr>
-              <a:t>	</a:t>
-            </a:r>
-            <a:r>
-              <a:rPr lang="en-US" sz="2000" dirty="0" smtClean="0">
-                <a:latin typeface="Consolas" panose="020B0609020204030204" pitchFamily="49" charset="0"/>
-                <a:cs typeface="Consolas" panose="020B0609020204030204" pitchFamily="49" charset="0"/>
-              </a:rPr>
-              <a:t>//$scope and $</a:t>
-            </a:r>
-            <a:r>
-              <a:rPr lang="en-US" sz="2000" dirty="0" err="1" smtClean="0">
-                <a:latin typeface="Consolas" panose="020B0609020204030204" pitchFamily="49" charset="0"/>
-                <a:cs typeface="Consolas" panose="020B0609020204030204" pitchFamily="49" charset="0"/>
-              </a:rPr>
-              <a:t>mdDialog</a:t>
-            </a:r>
-            <a:r>
-              <a:rPr lang="en-US" sz="2000" dirty="0" smtClean="0">
-                <a:latin typeface="Consolas" panose="020B0609020204030204" pitchFamily="49" charset="0"/>
-                <a:cs typeface="Consolas" panose="020B0609020204030204" pitchFamily="49" charset="0"/>
-              </a:rPr>
-              <a:t> gets injected by AngularJS</a:t>
-            </a:r>
-          </a:p>
-          <a:p>
-            <a:pPr marL="0" indent="0">
-              <a:buNone/>
-            </a:pPr>
-            <a:r>
-              <a:rPr lang="en-US" sz="2000" dirty="0" smtClean="0">
-                <a:latin typeface="Consolas" panose="020B0609020204030204" pitchFamily="49" charset="0"/>
-                <a:cs typeface="Consolas" panose="020B0609020204030204" pitchFamily="49" charset="0"/>
-              </a:rPr>
-              <a:t>	private </a:t>
-            </a:r>
-            <a:r>
-              <a:rPr lang="en-US" sz="2000" dirty="0" err="1" smtClean="0">
-                <a:latin typeface="Consolas" panose="020B0609020204030204" pitchFamily="49" charset="0"/>
-                <a:cs typeface="Consolas" panose="020B0609020204030204" pitchFamily="49" charset="0"/>
-              </a:rPr>
-              <a:t>var</a:t>
-            </a:r>
-            <a:r>
-              <a:rPr lang="en-US" sz="2000" dirty="0" smtClean="0">
-                <a:latin typeface="Consolas" panose="020B0609020204030204" pitchFamily="49" charset="0"/>
-                <a:cs typeface="Consolas" panose="020B0609020204030204" pitchFamily="49" charset="0"/>
-              </a:rPr>
-              <a:t> $</a:t>
-            </a:r>
-            <a:r>
-              <a:rPr lang="en-US" sz="2000" dirty="0" err="1" smtClean="0">
-                <a:latin typeface="Consolas" panose="020B0609020204030204" pitchFamily="49" charset="0"/>
-                <a:cs typeface="Consolas" panose="020B0609020204030204" pitchFamily="49" charset="0"/>
-              </a:rPr>
-              <a:t>scope:IScope</a:t>
-            </a:r>
-            <a:r>
-              <a:rPr lang="en-US" sz="2000" dirty="0" smtClean="0">
-                <a:latin typeface="Consolas" panose="020B0609020204030204" pitchFamily="49" charset="0"/>
-                <a:cs typeface="Consolas" panose="020B0609020204030204" pitchFamily="49" charset="0"/>
-              </a:rPr>
-              <a:t>;</a:t>
-            </a:r>
-          </a:p>
-          <a:p>
-            <a:pPr marL="0" indent="0">
-              <a:buNone/>
-            </a:pPr>
-            <a:r>
-              <a:rPr lang="en-US" sz="2000" dirty="0" smtClean="0">
-                <a:latin typeface="Consolas" panose="020B0609020204030204" pitchFamily="49" charset="0"/>
-                <a:cs typeface="Consolas" panose="020B0609020204030204" pitchFamily="49" charset="0"/>
-              </a:rPr>
-              <a:t>	private </a:t>
-            </a:r>
-            <a:r>
-              <a:rPr lang="en-US" sz="2000" dirty="0" err="1" smtClean="0">
-                <a:latin typeface="Consolas" panose="020B0609020204030204" pitchFamily="49" charset="0"/>
-                <a:cs typeface="Consolas" panose="020B0609020204030204" pitchFamily="49" charset="0"/>
-              </a:rPr>
-              <a:t>var</a:t>
-            </a:r>
-            <a:r>
-              <a:rPr lang="en-US" sz="2000" dirty="0" smtClean="0">
-                <a:latin typeface="Consolas" panose="020B0609020204030204" pitchFamily="49" charset="0"/>
-                <a:cs typeface="Consolas" panose="020B0609020204030204" pitchFamily="49" charset="0"/>
-              </a:rPr>
-              <a:t> $</a:t>
-            </a:r>
-            <a:r>
-              <a:rPr lang="en-US" sz="2000" dirty="0" err="1" smtClean="0">
-                <a:latin typeface="Consolas" panose="020B0609020204030204" pitchFamily="49" charset="0"/>
-                <a:cs typeface="Consolas" panose="020B0609020204030204" pitchFamily="49" charset="0"/>
-              </a:rPr>
-              <a:t>mdDialog:MDDialogService</a:t>
-            </a:r>
-            <a:r>
-              <a:rPr lang="en-US" sz="2000" dirty="0" smtClean="0">
-                <a:latin typeface="Consolas" panose="020B0609020204030204" pitchFamily="49" charset="0"/>
-                <a:cs typeface="Consolas" panose="020B0609020204030204" pitchFamily="49" charset="0"/>
-              </a:rPr>
-              <a:t>;</a:t>
-            </a:r>
-          </a:p>
-          <a:p>
-            <a:pPr marL="0" indent="0">
-              <a:buNone/>
-            </a:pPr>
-            <a:r>
-              <a:rPr lang="en-US" sz="2000" dirty="0" smtClean="0">
-                <a:latin typeface="Consolas" panose="020B0609020204030204" pitchFamily="49" charset="0"/>
-                <a:cs typeface="Consolas" panose="020B0609020204030204" pitchFamily="49" charset="0"/>
-              </a:rPr>
-              <a:t>		</a:t>
-            </a:r>
-          </a:p>
-          <a:p>
-            <a:pPr marL="0" indent="0">
-              <a:buNone/>
-            </a:pPr>
-            <a:r>
-              <a:rPr lang="en-US" sz="2000" dirty="0" smtClean="0">
-                <a:latin typeface="Consolas" panose="020B0609020204030204" pitchFamily="49" charset="0"/>
-                <a:cs typeface="Consolas" panose="020B0609020204030204" pitchFamily="49" charset="0"/>
-              </a:rPr>
-              <a:t>	public function </a:t>
-            </a:r>
-            <a:r>
-              <a:rPr lang="en-US" sz="2000" dirty="0" err="1" smtClean="0">
-                <a:latin typeface="Consolas" panose="020B0609020204030204" pitchFamily="49" charset="0"/>
-                <a:cs typeface="Consolas" panose="020B0609020204030204" pitchFamily="49" charset="0"/>
-              </a:rPr>
-              <a:t>MyController</a:t>
-            </a:r>
-            <a:r>
-              <a:rPr lang="en-US" sz="2000" dirty="0" smtClean="0">
-                <a:latin typeface="Consolas" panose="020B0609020204030204" pitchFamily="49" charset="0"/>
-                <a:cs typeface="Consolas" panose="020B0609020204030204" pitchFamily="49" charset="0"/>
-              </a:rPr>
-              <a:t>(</a:t>
-            </a:r>
-            <a:r>
-              <a:rPr lang="en-US" sz="2000" dirty="0" err="1" smtClean="0">
-                <a:latin typeface="Consolas" panose="020B0609020204030204" pitchFamily="49" charset="0"/>
-                <a:cs typeface="Consolas" panose="020B0609020204030204" pitchFamily="49" charset="0"/>
-              </a:rPr>
-              <a:t>scope:IScope,mdDialog:MDDialogService</a:t>
-            </a:r>
-            <a:r>
-              <a:rPr lang="en-US" sz="2000" dirty="0" smtClean="0">
-                <a:latin typeface="Consolas" panose="020B0609020204030204" pitchFamily="49" charset="0"/>
-                <a:cs typeface="Consolas" panose="020B0609020204030204" pitchFamily="49" charset="0"/>
-              </a:rPr>
-              <a:t>) {</a:t>
-            </a:r>
-          </a:p>
-          <a:p>
-            <a:pPr marL="0" indent="0">
-              <a:buNone/>
-            </a:pPr>
-            <a:r>
-              <a:rPr lang="en-US" sz="2000" dirty="0" smtClean="0">
-                <a:latin typeface="Consolas" panose="020B0609020204030204" pitchFamily="49" charset="0"/>
-                <a:cs typeface="Consolas" panose="020B0609020204030204" pitchFamily="49" charset="0"/>
-              </a:rPr>
-              <a:t>	</a:t>
-            </a:r>
-            <a:r>
-              <a:rPr lang="en-US" sz="2000" dirty="0" err="1" smtClean="0">
-                <a:latin typeface="Consolas" panose="020B0609020204030204" pitchFamily="49" charset="0"/>
-                <a:cs typeface="Consolas" panose="020B0609020204030204" pitchFamily="49" charset="0"/>
-              </a:rPr>
-              <a:t>this.$scope</a:t>
-            </a:r>
-            <a:r>
-              <a:rPr lang="en-US" sz="2000" dirty="0" smtClean="0">
-                <a:latin typeface="Consolas" panose="020B0609020204030204" pitchFamily="49" charset="0"/>
-                <a:cs typeface="Consolas" panose="020B0609020204030204" pitchFamily="49" charset="0"/>
-              </a:rPr>
-              <a:t> = scope;</a:t>
-            </a:r>
-          </a:p>
-          <a:p>
-            <a:pPr marL="0" indent="0">
-              <a:buNone/>
-            </a:pPr>
-            <a:r>
-              <a:rPr lang="en-US" sz="2000" dirty="0" smtClean="0">
-                <a:latin typeface="Consolas" panose="020B0609020204030204" pitchFamily="49" charset="0"/>
-                <a:cs typeface="Consolas" panose="020B0609020204030204" pitchFamily="49" charset="0"/>
-              </a:rPr>
-              <a:t>	this.$</a:t>
-            </a:r>
-            <a:r>
-              <a:rPr lang="en-US" sz="2000" dirty="0" err="1" smtClean="0">
-                <a:latin typeface="Consolas" panose="020B0609020204030204" pitchFamily="49" charset="0"/>
-                <a:cs typeface="Consolas" panose="020B0609020204030204" pitchFamily="49" charset="0"/>
-              </a:rPr>
-              <a:t>mdDialog</a:t>
-            </a:r>
-            <a:r>
-              <a:rPr lang="en-US" sz="2000" dirty="0" smtClean="0">
-                <a:latin typeface="Consolas" panose="020B0609020204030204" pitchFamily="49" charset="0"/>
-                <a:cs typeface="Consolas" panose="020B0609020204030204" pitchFamily="49" charset="0"/>
-              </a:rPr>
-              <a:t> = </a:t>
-            </a:r>
-            <a:r>
-              <a:rPr lang="en-US" sz="2000" dirty="0" err="1" smtClean="0">
-                <a:latin typeface="Consolas" panose="020B0609020204030204" pitchFamily="49" charset="0"/>
-                <a:cs typeface="Consolas" panose="020B0609020204030204" pitchFamily="49" charset="0"/>
-              </a:rPr>
-              <a:t>mdDialog</a:t>
-            </a:r>
-            <a:r>
-              <a:rPr lang="en-US" sz="2000" dirty="0" smtClean="0">
-                <a:latin typeface="Consolas" panose="020B0609020204030204" pitchFamily="49" charset="0"/>
-                <a:cs typeface="Consolas" panose="020B0609020204030204" pitchFamily="49" charset="0"/>
-              </a:rPr>
-              <a:t>;</a:t>
+              <a:t>]);</a:t>
             </a:r>
           </a:p>
           <a:p>
@@ -4808,202 +4474,63 @@
                 <a:latin typeface="Consolas" panose="020B0609020204030204" pitchFamily="49" charset="0"/>
                 <a:cs typeface="Consolas" panose="020B0609020204030204" pitchFamily="49" charset="0"/>
               </a:rPr>
-              <a:t>//Anything added to $scope is available for databinding from html</a:t>
-            </a:r>
-          </a:p>
-          <a:p>
-            <a:pPr marL="0" indent="0">
-              <a:buNone/>
-            </a:pPr>
+              <a:t>//Set ng-app attribute on the body element</a:t>
+            </a:r>
+            <a:endParaRPr lang="en-US" sz="2000" dirty="0">
+              <a:latin typeface="Consolas" panose="020B0609020204030204" pitchFamily="49" charset="0"/>
+              <a:cs typeface="Consolas" panose="020B0609020204030204" pitchFamily="49" charset="0"/>
+            </a:endParaRPr>
+          </a:p>
+          <a:p>
+            <a:pPr marL="0" indent="0">
+              <a:buNone/>
+            </a:pPr>
+            <a:r>
+              <a:rPr lang="en-US" sz="2000" dirty="0" err="1">
+                <a:latin typeface="Consolas" panose="020B0609020204030204" pitchFamily="49" charset="0"/>
+                <a:cs typeface="Consolas" panose="020B0609020204030204" pitchFamily="49" charset="0"/>
+              </a:rPr>
+              <a:t>document.body.setAttribute</a:t>
+            </a:r>
+            <a:r>
+              <a:rPr lang="en-US" sz="2000" dirty="0">
+                <a:latin typeface="Consolas" panose="020B0609020204030204" pitchFamily="49" charset="0"/>
+                <a:cs typeface="Consolas" panose="020B0609020204030204" pitchFamily="49" charset="0"/>
+              </a:rPr>
+              <a:t>("ng-app", "app</a:t>
+            </a:r>
             <a:r>
               <a:rPr lang="en-US" sz="2000" dirty="0" smtClean="0">
                 <a:latin typeface="Consolas" panose="020B0609020204030204" pitchFamily="49" charset="0"/>
                 <a:cs typeface="Consolas" panose="020B0609020204030204" pitchFamily="49" charset="0"/>
               </a:rPr>
-              <a:t>	</a:t>
-            </a:r>
-            <a:r>
-              <a:rPr lang="en-US" sz="2000" dirty="0" err="1" smtClean="0">
-                <a:latin typeface="Consolas" panose="020B0609020204030204" pitchFamily="49" charset="0"/>
-                <a:cs typeface="Consolas" panose="020B0609020204030204" pitchFamily="49" charset="0"/>
-              </a:rPr>
-              <a:t>this.$scope</a:t>
-            </a:r>
-            <a:r>
-              <a:rPr lang="en-US" sz="2000" dirty="0" smtClean="0">
-                <a:latin typeface="Consolas" panose="020B0609020204030204" pitchFamily="49" charset="0"/>
-                <a:cs typeface="Consolas" panose="020B0609020204030204" pitchFamily="49" charset="0"/>
-              </a:rPr>
-              <a:t>["</a:t>
-            </a:r>
-            <a:r>
-              <a:rPr lang="en-US" sz="2000" dirty="0" err="1" smtClean="0">
-                <a:latin typeface="Consolas" panose="020B0609020204030204" pitchFamily="49" charset="0"/>
-                <a:cs typeface="Consolas" panose="020B0609020204030204" pitchFamily="49" charset="0"/>
-              </a:rPr>
-              <a:t>handleBtnClick</a:t>
-            </a:r>
-            <a:r>
-              <a:rPr lang="en-US" sz="2000" dirty="0" smtClean="0">
-                <a:latin typeface="Consolas" panose="020B0609020204030204" pitchFamily="49" charset="0"/>
-                <a:cs typeface="Consolas" panose="020B0609020204030204" pitchFamily="49" charset="0"/>
-              </a:rPr>
-              <a:t>"] = </a:t>
-            </a:r>
-            <a:r>
-              <a:rPr lang="en-US" sz="2000" dirty="0" err="1" smtClean="0">
-                <a:latin typeface="Consolas" panose="020B0609020204030204" pitchFamily="49" charset="0"/>
-                <a:cs typeface="Consolas" panose="020B0609020204030204" pitchFamily="49" charset="0"/>
-              </a:rPr>
-              <a:t>this.handleBtnClick</a:t>
-            </a:r>
-            <a:r>
-              <a:rPr lang="en-US" sz="2000" dirty="0" smtClean="0">
-                <a:latin typeface="Consolas" panose="020B0609020204030204" pitchFamily="49" charset="0"/>
-                <a:cs typeface="Consolas" panose="020B0609020204030204" pitchFamily="49" charset="0"/>
-              </a:rPr>
-              <a:t>;</a:t>
-            </a:r>
-          </a:p>
-          <a:p>
-            <a:pPr marL="0" indent="0">
-              <a:buNone/>
-            </a:pPr>
-            <a:r>
-              <a:rPr lang="en-US" sz="2000" dirty="0" smtClean="0">
-                <a:latin typeface="Consolas" panose="020B0609020204030204" pitchFamily="49" charset="0"/>
-                <a:cs typeface="Consolas" panose="020B0609020204030204" pitchFamily="49" charset="0"/>
-              </a:rPr>
-              <a:t>	</a:t>
-            </a:r>
-            <a:r>
-              <a:rPr lang="en-US" sz="2000" dirty="0" err="1" smtClean="0">
-                <a:latin typeface="Consolas" panose="020B0609020204030204" pitchFamily="49" charset="0"/>
-                <a:cs typeface="Consolas" panose="020B0609020204030204" pitchFamily="49" charset="0"/>
-              </a:rPr>
-              <a:t>this.$scope</a:t>
-            </a:r>
-            <a:r>
-              <a:rPr lang="en-US" sz="2000" dirty="0" smtClean="0">
-                <a:latin typeface="Consolas" panose="020B0609020204030204" pitchFamily="49" charset="0"/>
-                <a:cs typeface="Consolas" panose="020B0609020204030204" pitchFamily="49" charset="0"/>
-              </a:rPr>
-              <a:t>["close"] = </a:t>
-            </a:r>
-            <a:r>
-              <a:rPr lang="en-US" sz="2000" dirty="0" err="1" smtClean="0">
-                <a:latin typeface="Consolas" panose="020B0609020204030204" pitchFamily="49" charset="0"/>
-                <a:cs typeface="Consolas" panose="020B0609020204030204" pitchFamily="49" charset="0"/>
-              </a:rPr>
-              <a:t>this.close</a:t>
-            </a:r>
-            <a:r>
-              <a:rPr lang="en-US" sz="2000" dirty="0" smtClean="0">
-                <a:latin typeface="Consolas" panose="020B0609020204030204" pitchFamily="49" charset="0"/>
-                <a:cs typeface="Consolas" panose="020B0609020204030204" pitchFamily="49" charset="0"/>
-              </a:rPr>
-              <a:t>;</a:t>
-            </a:r>
-          </a:p>
-          <a:p>
-            <a:pPr marL="0" indent="0">
-              <a:buNone/>
-            </a:pPr>
-            <a:r>
-              <a:rPr lang="en-US" sz="2000" dirty="0" smtClean="0">
-                <a:latin typeface="Consolas" panose="020B0609020204030204" pitchFamily="49" charset="0"/>
-                <a:cs typeface="Consolas" panose="020B0609020204030204" pitchFamily="49" charset="0"/>
-              </a:rPr>
-              <a:t>	</a:t>
-            </a:r>
-            <a:r>
-              <a:rPr lang="en-US" sz="2000" dirty="0" err="1" smtClean="0">
-                <a:latin typeface="Consolas" panose="020B0609020204030204" pitchFamily="49" charset="0"/>
-                <a:cs typeface="Consolas" panose="020B0609020204030204" pitchFamily="49" charset="0"/>
-              </a:rPr>
-              <a:t>this.$scope</a:t>
-            </a:r>
-            <a:r>
-              <a:rPr lang="en-US" sz="2000" dirty="0" smtClean="0">
-                <a:latin typeface="Consolas" panose="020B0609020204030204" pitchFamily="49" charset="0"/>
-                <a:cs typeface="Consolas" panose="020B0609020204030204" pitchFamily="49" charset="0"/>
-              </a:rPr>
-              <a:t>["</a:t>
-            </a:r>
-            <a:r>
-              <a:rPr lang="en-US" sz="2000" dirty="0" err="1" smtClean="0">
-                <a:latin typeface="Consolas" panose="020B0609020204030204" pitchFamily="49" charset="0"/>
-                <a:cs typeface="Consolas" panose="020B0609020204030204" pitchFamily="49" charset="0"/>
-              </a:rPr>
-              <a:t>myDate</a:t>
-            </a:r>
-            <a:r>
-              <a:rPr lang="en-US" sz="2000" dirty="0" smtClean="0">
-                <a:latin typeface="Consolas" panose="020B0609020204030204" pitchFamily="49" charset="0"/>
-                <a:cs typeface="Consolas" panose="020B0609020204030204" pitchFamily="49" charset="0"/>
-              </a:rPr>
-              <a:t>"] = new Date();</a:t>
-            </a:r>
-          </a:p>
-          <a:p>
-            <a:pPr marL="0" indent="0">
-              <a:buNone/>
-            </a:pPr>
-            <a:r>
-              <a:rPr lang="en-US" sz="2000" dirty="0" smtClean="0">
-                <a:latin typeface="Consolas" panose="020B0609020204030204" pitchFamily="49" charset="0"/>
-                <a:cs typeface="Consolas" panose="020B0609020204030204" pitchFamily="49" charset="0"/>
-              </a:rPr>
-              <a:t>	</a:t>
-            </a:r>
-            <a:r>
-              <a:rPr lang="en-US" sz="2000" dirty="0" err="1" smtClean="0">
-                <a:latin typeface="Consolas" panose="020B0609020204030204" pitchFamily="49" charset="0"/>
-                <a:cs typeface="Consolas" panose="020B0609020204030204" pitchFamily="49" charset="0"/>
-              </a:rPr>
-              <a:t>this.$scope</a:t>
-            </a:r>
-            <a:r>
-              <a:rPr lang="en-US" sz="2000" dirty="0" smtClean="0">
-                <a:latin typeface="Consolas" panose="020B0609020204030204" pitchFamily="49" charset="0"/>
-                <a:cs typeface="Consolas" panose="020B0609020204030204" pitchFamily="49" charset="0"/>
-              </a:rPr>
-              <a:t>["</a:t>
-            </a:r>
-            <a:r>
-              <a:rPr lang="en-US" sz="2000" dirty="0" err="1" smtClean="0">
-                <a:latin typeface="Consolas" panose="020B0609020204030204" pitchFamily="49" charset="0"/>
-                <a:cs typeface="Consolas" panose="020B0609020204030204" pitchFamily="49" charset="0"/>
-              </a:rPr>
-              <a:t>btnLabelStr</a:t>
-            </a:r>
-            <a:r>
-              <a:rPr lang="en-US" sz="2000" dirty="0" smtClean="0">
-                <a:latin typeface="Consolas" panose="020B0609020204030204" pitchFamily="49" charset="0"/>
-                <a:cs typeface="Consolas" panose="020B0609020204030204" pitchFamily="49" charset="0"/>
-              </a:rPr>
-              <a:t>"] = "Click me";</a:t>
-            </a:r>
-          </a:p>
-          <a:p>
-            <a:pPr marL="0" indent="0">
-              <a:buNone/>
-            </a:pPr>
-            <a:r>
-              <a:rPr lang="en-US" sz="2000" dirty="0" smtClean="0">
-                <a:latin typeface="Consolas" panose="020B0609020204030204" pitchFamily="49" charset="0"/>
-                <a:cs typeface="Consolas" panose="020B0609020204030204" pitchFamily="49" charset="0"/>
-              </a:rPr>
-              <a:t>}</a:t>
-            </a:r>
-            <a:endParaRPr lang="en-US" sz="3000" dirty="0"/>
+              <a:t>");</a:t>
+            </a:r>
+          </a:p>
+          <a:p>
+            <a:pPr marL="0" indent="0">
+              <a:buNone/>
+            </a:pPr>
+            <a:endParaRPr lang="en-US" sz="2000" dirty="0">
+              <a:latin typeface="Consolas" panose="020B0609020204030204" pitchFamily="49" charset="0"/>
+              <a:cs typeface="Consolas" panose="020B0609020204030204" pitchFamily="49" charset="0"/>
+            </a:endParaRPr>
+          </a:p>
+          <a:p>
+            <a:pPr marL="0" indent="0" algn="ctr">
+              <a:buNone/>
+            </a:pPr>
+            <a:r>
+              <a:rPr lang="en-US" sz="3000" dirty="0"/>
+              <a:t>Your AngularJS app is ready!</a:t>
+            </a:r>
           </a:p>
         </p:txBody>
       </p:sp>
     </p:spTree>
     <p:extLst>
       <p:ext uri="{BB962C8B-B14F-4D97-AF65-F5344CB8AC3E}">
-        <p14:creationId xmlns:p14="http://schemas.microsoft.com/office/powerpoint/2010/main" val="2153161457"/>
+        <p14:creationId xmlns:p14="http://schemas.microsoft.com/office/powerpoint/2010/main" val="1091432470"/>
       </p:ext>
     </p:extLst>
   </p:cSld>
@@ -5061,9 +4588,8 @@
           <a:p>
             <a:r>
               <a:rPr lang="en-US" dirty="0" smtClean="0"/>
-              <a:t>Externs – Material Design</a:t>
-            </a:r>
-            <a:endParaRPr lang="en-US" dirty="0" smtClean="0"/>
+              <a:t>Externs - AngularJS</a:t>
+            </a:r>
           </a:p>
         </p:txBody>
       </p:sp>
@@ -5079,48 +4605,288 @@
         </p:nvSpPr>
         <p:spPr>
           <a:xfrm>
-            <a:off x="457200" y="1828800"/>
-            <a:ext cx="8229600" cy="4876800"/>
+            <a:off x="457200" y="1295400"/>
+            <a:ext cx="8229600" cy="5410200"/>
           </a:xfrm>
         </p:spPr>
         <p:txBody>
           <a:bodyPr>
-            <a:normAutofit/>
+            <a:normAutofit fontScale="92500" lnSpcReduction="20000"/>
           </a:bodyPr>
           <a:lstStyle/>
           <a:p>
-            <a:r>
-              <a:rPr lang="en-US" dirty="0" smtClean="0"/>
-              <a:t>Just add a Material Design directive to the DOM</a:t>
-            </a:r>
-          </a:p>
-          <a:p>
-            <a:r>
-              <a:rPr lang="en-US" dirty="0" smtClean="0"/>
-              <a:t>AngularJS + Material Design takes care of the rest</a:t>
-            </a:r>
-          </a:p>
-          <a:p>
-            <a:endParaRPr lang="en-US" dirty="0"/>
-          </a:p>
-          <a:p>
-            <a:pPr marL="0" indent="0">
-              <a:buNone/>
-            </a:pPr>
-            <a:r>
-              <a:rPr lang="en-US" sz="2000" dirty="0" err="1">
-                <a:latin typeface="Consolas" panose="020B0609020204030204" pitchFamily="49" charset="0"/>
-                <a:cs typeface="Consolas" panose="020B0609020204030204" pitchFamily="49" charset="0"/>
-              </a:rPr>
-              <a:t>div.innerHTML</a:t>
-            </a:r>
+            <a:pPr marL="0" indent="0">
+              <a:buNone/>
+            </a:pPr>
+            <a:r>
+              <a:rPr lang="en-US" sz="2000" dirty="0" smtClean="0">
+                <a:latin typeface="Consolas" panose="020B0609020204030204" pitchFamily="49" charset="0"/>
+                <a:cs typeface="Consolas" panose="020B0609020204030204" pitchFamily="49" charset="0"/>
+              </a:rPr>
+              <a:t>//AngularJS Controller class (yes, a proper class!)	</a:t>
+            </a:r>
+          </a:p>
+          <a:p>
+            <a:pPr marL="0" indent="0">
+              <a:buNone/>
+            </a:pPr>
+            <a:r>
+              <a:rPr lang="en-US" sz="2000" dirty="0" smtClean="0">
+                <a:latin typeface="Consolas" panose="020B0609020204030204" pitchFamily="49" charset="0"/>
+                <a:cs typeface="Consolas" panose="020B0609020204030204" pitchFamily="49" charset="0"/>
+              </a:rPr>
+              <a:t>public class </a:t>
+            </a:r>
+            <a:r>
+              <a:rPr lang="en-US" sz="2000" dirty="0" err="1" smtClean="0">
+                <a:latin typeface="Consolas" panose="020B0609020204030204" pitchFamily="49" charset="0"/>
+                <a:cs typeface="Consolas" panose="020B0609020204030204" pitchFamily="49" charset="0"/>
+              </a:rPr>
+              <a:t>MyController</a:t>
+            </a:r>
+            <a:r>
+              <a:rPr lang="en-US" sz="2000" dirty="0" smtClean="0">
+                <a:latin typeface="Consolas" panose="020B0609020204030204" pitchFamily="49" charset="0"/>
+                <a:cs typeface="Consolas" panose="020B0609020204030204" pitchFamily="49" charset="0"/>
+              </a:rPr>
+              <a:t> {</a:t>
+            </a:r>
+          </a:p>
+          <a:p>
+            <a:pPr marL="0" indent="0">
+              <a:buNone/>
+            </a:pPr>
             <a:r>
               <a:rPr lang="en-US" sz="2000" dirty="0">
                 <a:latin typeface="Consolas" panose="020B0609020204030204" pitchFamily="49" charset="0"/>
                 <a:cs typeface="Consolas" panose="020B0609020204030204" pitchFamily="49" charset="0"/>
               </a:rPr>
-              <a:t> += '&lt;md-button </a:t>
-            </a:r>
+              <a:t>	</a:t>
+            </a:r>
+            <a:r>
+              <a:rPr lang="en-US" sz="2000" dirty="0" smtClean="0">
+                <a:latin typeface="Consolas" panose="020B0609020204030204" pitchFamily="49" charset="0"/>
+                <a:cs typeface="Consolas" panose="020B0609020204030204" pitchFamily="49" charset="0"/>
+              </a:rPr>
+              <a:t>//$scope and $</a:t>
+            </a:r>
+            <a:r>
+              <a:rPr lang="en-US" sz="2000" dirty="0" err="1" smtClean="0">
+                <a:latin typeface="Consolas" panose="020B0609020204030204" pitchFamily="49" charset="0"/>
+                <a:cs typeface="Consolas" panose="020B0609020204030204" pitchFamily="49" charset="0"/>
+              </a:rPr>
+              <a:t>mdDialog</a:t>
+            </a:r>
+            <a:r>
+              <a:rPr lang="en-US" sz="2000" dirty="0" smtClean="0">
+                <a:latin typeface="Consolas" panose="020B0609020204030204" pitchFamily="49" charset="0"/>
+                <a:cs typeface="Consolas" panose="020B0609020204030204" pitchFamily="49" charset="0"/>
+              </a:rPr>
+              <a:t> gets injected by AngularJS</a:t>
+            </a:r>
+          </a:p>
+          <a:p>
+            <a:pPr marL="0" indent="0">
+              <a:buNone/>
+            </a:pPr>
+            <a:r>
+              <a:rPr lang="en-US" sz="2000" dirty="0" smtClean="0">
+                <a:latin typeface="Consolas" panose="020B0609020204030204" pitchFamily="49" charset="0"/>
+                <a:cs typeface="Consolas" panose="020B0609020204030204" pitchFamily="49" charset="0"/>
+              </a:rPr>
+              <a:t>	private </a:t>
+            </a:r>
+            <a:r>
+              <a:rPr lang="en-US" sz="2000" dirty="0" err="1" smtClean="0">
+                <a:latin typeface="Consolas" panose="020B0609020204030204" pitchFamily="49" charset="0"/>
+                <a:cs typeface="Consolas" panose="020B0609020204030204" pitchFamily="49" charset="0"/>
+              </a:rPr>
+              <a:t>var</a:t>
+            </a:r>
+            <a:r>
+              <a:rPr lang="en-US" sz="2000" dirty="0" smtClean="0">
+                <a:latin typeface="Consolas" panose="020B0609020204030204" pitchFamily="49" charset="0"/>
+                <a:cs typeface="Consolas" panose="020B0609020204030204" pitchFamily="49" charset="0"/>
+              </a:rPr>
+              <a:t> $</a:t>
+            </a:r>
+            <a:r>
+              <a:rPr lang="en-US" sz="2000" dirty="0" err="1" smtClean="0">
+                <a:latin typeface="Consolas" panose="020B0609020204030204" pitchFamily="49" charset="0"/>
+                <a:cs typeface="Consolas" panose="020B0609020204030204" pitchFamily="49" charset="0"/>
+              </a:rPr>
+              <a:t>scope:IScope</a:t>
+            </a:r>
+            <a:r>
+              <a:rPr lang="en-US" sz="2000" dirty="0" smtClean="0">
+                <a:latin typeface="Consolas" panose="020B0609020204030204" pitchFamily="49" charset="0"/>
+                <a:cs typeface="Consolas" panose="020B0609020204030204" pitchFamily="49" charset="0"/>
+              </a:rPr>
+              <a:t>;</a:t>
+            </a:r>
+          </a:p>
+          <a:p>
+            <a:pPr marL="0" indent="0">
+              <a:buNone/>
+            </a:pPr>
+            <a:r>
+              <a:rPr lang="en-US" sz="2000" dirty="0" smtClean="0">
+                <a:latin typeface="Consolas" panose="020B0609020204030204" pitchFamily="49" charset="0"/>
+                <a:cs typeface="Consolas" panose="020B0609020204030204" pitchFamily="49" charset="0"/>
+              </a:rPr>
+              <a:t>	private </a:t>
+            </a:r>
+            <a:r>
+              <a:rPr lang="en-US" sz="2000" dirty="0" err="1" smtClean="0">
+                <a:latin typeface="Consolas" panose="020B0609020204030204" pitchFamily="49" charset="0"/>
+                <a:cs typeface="Consolas" panose="020B0609020204030204" pitchFamily="49" charset="0"/>
+              </a:rPr>
+              <a:t>var</a:t>
+            </a:r>
+            <a:r>
+              <a:rPr lang="en-US" sz="2000" dirty="0" smtClean="0">
+                <a:latin typeface="Consolas" panose="020B0609020204030204" pitchFamily="49" charset="0"/>
+                <a:cs typeface="Consolas" panose="020B0609020204030204" pitchFamily="49" charset="0"/>
+              </a:rPr>
+              <a:t> $</a:t>
+            </a:r>
+            <a:r>
+              <a:rPr lang="en-US" sz="2000" dirty="0" err="1" smtClean="0">
+                <a:latin typeface="Consolas" panose="020B0609020204030204" pitchFamily="49" charset="0"/>
+                <a:cs typeface="Consolas" panose="020B0609020204030204" pitchFamily="49" charset="0"/>
+              </a:rPr>
+              <a:t>mdDialog:MDDialogService</a:t>
+            </a:r>
+            <a:r>
+              <a:rPr lang="en-US" sz="2000" dirty="0" smtClean="0">
+                <a:latin typeface="Consolas" panose="020B0609020204030204" pitchFamily="49" charset="0"/>
+                <a:cs typeface="Consolas" panose="020B0609020204030204" pitchFamily="49" charset="0"/>
+              </a:rPr>
+              <a:t>;</a:t>
+            </a:r>
+          </a:p>
+          <a:p>
+            <a:pPr marL="0" indent="0">
+              <a:buNone/>
+            </a:pPr>
+            <a:r>
+              <a:rPr lang="en-US" sz="2000" dirty="0" smtClean="0">
+                <a:latin typeface="Consolas" panose="020B0609020204030204" pitchFamily="49" charset="0"/>
+                <a:cs typeface="Consolas" panose="020B0609020204030204" pitchFamily="49" charset="0"/>
+              </a:rPr>
+              <a:t>		</a:t>
+            </a:r>
+          </a:p>
+          <a:p>
+            <a:pPr marL="0" indent="0">
+              <a:buNone/>
+            </a:pPr>
+            <a:r>
+              <a:rPr lang="en-US" sz="2000" dirty="0" smtClean="0">
+                <a:latin typeface="Consolas" panose="020B0609020204030204" pitchFamily="49" charset="0"/>
+                <a:cs typeface="Consolas" panose="020B0609020204030204" pitchFamily="49" charset="0"/>
+              </a:rPr>
+              <a:t>	public function </a:t>
+            </a:r>
+            <a:r>
+              <a:rPr lang="en-US" sz="2000" dirty="0" err="1" smtClean="0">
+                <a:latin typeface="Consolas" panose="020B0609020204030204" pitchFamily="49" charset="0"/>
+                <a:cs typeface="Consolas" panose="020B0609020204030204" pitchFamily="49" charset="0"/>
+              </a:rPr>
+              <a:t>MyController</a:t>
+            </a:r>
+            <a:r>
+              <a:rPr lang="en-US" sz="2000" dirty="0" smtClean="0">
+                <a:latin typeface="Consolas" panose="020B0609020204030204" pitchFamily="49" charset="0"/>
+                <a:cs typeface="Consolas" panose="020B0609020204030204" pitchFamily="49" charset="0"/>
+              </a:rPr>
+              <a:t>(</a:t>
+            </a:r>
+            <a:r>
+              <a:rPr lang="en-US" sz="2000" dirty="0" err="1" smtClean="0">
+                <a:latin typeface="Consolas" panose="020B0609020204030204" pitchFamily="49" charset="0"/>
+                <a:cs typeface="Consolas" panose="020B0609020204030204" pitchFamily="49" charset="0"/>
+              </a:rPr>
+              <a:t>scope:IScope,mdDialog:MDDialogService</a:t>
+            </a:r>
+            <a:r>
+              <a:rPr lang="en-US" sz="2000" dirty="0" smtClean="0">
+                <a:latin typeface="Consolas" panose="020B0609020204030204" pitchFamily="49" charset="0"/>
+                <a:cs typeface="Consolas" panose="020B0609020204030204" pitchFamily="49" charset="0"/>
+              </a:rPr>
+              <a:t>) {</a:t>
+            </a:r>
+          </a:p>
+          <a:p>
+            <a:pPr marL="0" indent="0">
+              <a:buNone/>
+            </a:pPr>
+            <a:r>
+              <a:rPr lang="en-US" sz="2000" dirty="0" smtClean="0">
+                <a:latin typeface="Consolas" panose="020B0609020204030204" pitchFamily="49" charset="0"/>
+                <a:cs typeface="Consolas" panose="020B0609020204030204" pitchFamily="49" charset="0"/>
+              </a:rPr>
+              <a:t>	</a:t>
+            </a:r>
+            <a:r>
+              <a:rPr lang="en-US" sz="2000" dirty="0" err="1" smtClean="0">
+                <a:latin typeface="Consolas" panose="020B0609020204030204" pitchFamily="49" charset="0"/>
+                <a:cs typeface="Consolas" panose="020B0609020204030204" pitchFamily="49" charset="0"/>
+              </a:rPr>
+              <a:t>this.$scope</a:t>
+            </a:r>
+            <a:r>
+              <a:rPr lang="en-US" sz="2000" dirty="0" smtClean="0">
+                <a:latin typeface="Consolas" panose="020B0609020204030204" pitchFamily="49" charset="0"/>
+                <a:cs typeface="Consolas" panose="020B0609020204030204" pitchFamily="49" charset="0"/>
+              </a:rPr>
+              <a:t> = scope;</a:t>
+            </a:r>
+          </a:p>
+          <a:p>
+            <a:pPr marL="0" indent="0">
+              <a:buNone/>
+            </a:pPr>
+            <a:r>
+              <a:rPr lang="en-US" sz="2000" dirty="0" smtClean="0">
+                <a:latin typeface="Consolas" panose="020B0609020204030204" pitchFamily="49" charset="0"/>
+                <a:cs typeface="Consolas" panose="020B0609020204030204" pitchFamily="49" charset="0"/>
+              </a:rPr>
+              <a:t>	this.$</a:t>
+            </a:r>
+            <a:r>
+              <a:rPr lang="en-US" sz="2000" dirty="0" err="1" smtClean="0">
+                <a:latin typeface="Consolas" panose="020B0609020204030204" pitchFamily="49" charset="0"/>
+                <a:cs typeface="Consolas" panose="020B0609020204030204" pitchFamily="49" charset="0"/>
+              </a:rPr>
+              <a:t>mdDialog</a:t>
+            </a:r>
+            <a:r>
+              <a:rPr lang="en-US" sz="2000" dirty="0" smtClean="0">
+                <a:latin typeface="Consolas" panose="020B0609020204030204" pitchFamily="49" charset="0"/>
+                <a:cs typeface="Consolas" panose="020B0609020204030204" pitchFamily="49" charset="0"/>
+              </a:rPr>
+              <a:t> = </a:t>
+            </a:r>
+            <a:r>
+              <a:rPr lang="en-US" sz="2000" dirty="0" err="1" smtClean="0">
+                <a:latin typeface="Consolas" panose="020B0609020204030204" pitchFamily="49" charset="0"/>
+                <a:cs typeface="Consolas" panose="020B0609020204030204" pitchFamily="49" charset="0"/>
+              </a:rPr>
+              <a:t>mdDialog</a:t>
+            </a:r>
+            <a:r>
+              <a:rPr lang="en-US" sz="2000" dirty="0" smtClean="0">
+                <a:latin typeface="Consolas" panose="020B0609020204030204" pitchFamily="49" charset="0"/>
+                <a:cs typeface="Consolas" panose="020B0609020204030204" pitchFamily="49" charset="0"/>
+              </a:rPr>
+              <a:t>;</a:t>
+            </a:r>
+          </a:p>
+          <a:p>
+            <a:pPr marL="0" indent="0">
+              <a:buNone/>
+            </a:pPr>
             <a:endParaRPr lang="en-US" sz="2000" dirty="0" smtClean="0">
               <a:latin typeface="Consolas" panose="020B0609020204030204" pitchFamily="49" charset="0"/>
               <a:cs typeface="Consolas" panose="020B0609020204030204" pitchFamily="49" charset="0"/>
@@ -5131,116 +4897,174 @@
               <a:buNone/>
             </a:pPr>
             <a:r>
-              <a:rPr lang="en-US" sz="2000" dirty="0">
+              <a:rPr lang="en-US" sz="2000" dirty="0" smtClean="0">
+                <a:latin typeface="Consolas" panose="020B0609020204030204" pitchFamily="49" charset="0"/>
+                <a:cs typeface="Consolas" panose="020B0609020204030204" pitchFamily="49" charset="0"/>
+              </a:rPr>
+              <a:t>//Anything added to $scope is available for databinding from html</a:t>
+            </a:r>
+          </a:p>
+          <a:p>
+            <a:pPr marL="0" indent="0">
+              <a:buNone/>
+            </a:pPr>
+            <a:r>
+              <a:rPr lang="en-US" sz="2000" dirty="0" smtClean="0">
                 <a:latin typeface="Consolas" panose="020B0609020204030204" pitchFamily="49" charset="0"/>
                 <a:cs typeface="Consolas" panose="020B0609020204030204" pitchFamily="49" charset="0"/>
               </a:rPr>
               <a:t>	</a:t>
             </a:r>
             <a:r>
+              <a:rPr lang="en-US" sz="2000" dirty="0" err="1" smtClean="0">
+                <a:latin typeface="Consolas" panose="020B0609020204030204" pitchFamily="49" charset="0"/>
+                <a:cs typeface="Consolas" panose="020B0609020204030204" pitchFamily="49" charset="0"/>
+              </a:rPr>
+              <a:t>this.$scope</a:t>
+            </a:r>
+            <a:r>
               <a:rPr lang="en-US" sz="2000" dirty="0" smtClean="0">
                 <a:latin typeface="Consolas" panose="020B0609020204030204" pitchFamily="49" charset="0"/>
                 <a:cs typeface="Consolas" panose="020B0609020204030204" pitchFamily="49" charset="0"/>
               </a:rPr>
-              <a:t>		id</a:t>
-            </a:r>
-            <a:r>
-              <a:rPr lang="en-US" sz="2000" dirty="0">
-                <a:latin typeface="Consolas" panose="020B0609020204030204" pitchFamily="49" charset="0"/>
-                <a:cs typeface="Consolas" panose="020B0609020204030204" pitchFamily="49" charset="0"/>
-              </a:rPr>
-              <a:t>="</a:t>
-            </a:r>
-            <a:r>
-              <a:rPr lang="en-US" sz="2000" dirty="0" err="1">
-                <a:latin typeface="Consolas" panose="020B0609020204030204" pitchFamily="49" charset="0"/>
-                <a:cs typeface="Consolas" panose="020B0609020204030204" pitchFamily="49" charset="0"/>
-              </a:rPr>
-              <a:t>myBtn</a:t>
-            </a:r>
-            <a:r>
-              <a:rPr lang="en-US" sz="2000" dirty="0">
-                <a:latin typeface="Consolas" panose="020B0609020204030204" pitchFamily="49" charset="0"/>
-                <a:cs typeface="Consolas" panose="020B0609020204030204" pitchFamily="49" charset="0"/>
-              </a:rPr>
-              <a:t>" </a:t>
-            </a:r>
-            <a:endParaRPr lang="en-US" sz="2000" dirty="0" smtClean="0">
-              <a:latin typeface="Consolas" panose="020B0609020204030204" pitchFamily="49" charset="0"/>
-              <a:cs typeface="Consolas" panose="020B0609020204030204" pitchFamily="49" charset="0"/>
-            </a:endParaRPr>
-          </a:p>
-          <a:p>
-            <a:pPr marL="0" indent="0">
-              <a:buNone/>
-            </a:pPr>
-            <a:r>
-              <a:rPr lang="en-US" sz="2000" dirty="0">
+              <a:t>["</a:t>
+            </a:r>
+            <a:r>
+              <a:rPr lang="en-US" sz="2000" dirty="0" err="1" smtClean="0">
+                <a:latin typeface="Consolas" panose="020B0609020204030204" pitchFamily="49" charset="0"/>
+                <a:cs typeface="Consolas" panose="020B0609020204030204" pitchFamily="49" charset="0"/>
+              </a:rPr>
+              <a:t>handleBtnClick</a:t>
+            </a:r>
+            <a:r>
+              <a:rPr lang="en-US" sz="2000" dirty="0" smtClean="0">
+                <a:latin typeface="Consolas" panose="020B0609020204030204" pitchFamily="49" charset="0"/>
+                <a:cs typeface="Consolas" panose="020B0609020204030204" pitchFamily="49" charset="0"/>
+              </a:rPr>
+              <a:t>"] = </a:t>
+            </a:r>
+            <a:r>
+              <a:rPr lang="en-US" sz="2000" dirty="0" err="1" smtClean="0">
+                <a:latin typeface="Consolas" panose="020B0609020204030204" pitchFamily="49" charset="0"/>
+                <a:cs typeface="Consolas" panose="020B0609020204030204" pitchFamily="49" charset="0"/>
+              </a:rPr>
+              <a:t>this.handleBtnClick</a:t>
+            </a:r>
+            <a:r>
+              <a:rPr lang="en-US" sz="2000" dirty="0" smtClean="0">
+                <a:latin typeface="Consolas" panose="020B0609020204030204" pitchFamily="49" charset="0"/>
+                <a:cs typeface="Consolas" panose="020B0609020204030204" pitchFamily="49" charset="0"/>
+              </a:rPr>
+              <a:t>;</a:t>
+            </a:r>
+          </a:p>
+          <a:p>
+            <a:pPr marL="0" indent="0">
+              <a:buNone/>
+            </a:pPr>
+            <a:r>
+              <a:rPr lang="en-US" sz="2000" dirty="0" smtClean="0">
                 <a:latin typeface="Consolas" panose="020B0609020204030204" pitchFamily="49" charset="0"/>
                 <a:cs typeface="Consolas" panose="020B0609020204030204" pitchFamily="49" charset="0"/>
               </a:rPr>
               <a:t>	</a:t>
             </a:r>
             <a:r>
+              <a:rPr lang="en-US" sz="2000" dirty="0" err="1" smtClean="0">
+                <a:latin typeface="Consolas" panose="020B0609020204030204" pitchFamily="49" charset="0"/>
+                <a:cs typeface="Consolas" panose="020B0609020204030204" pitchFamily="49" charset="0"/>
+              </a:rPr>
+              <a:t>this.$scope</a:t>
+            </a:r>
+            <a:r>
               <a:rPr lang="en-US" sz="2000" dirty="0" smtClean="0">
                 <a:latin typeface="Consolas" panose="020B0609020204030204" pitchFamily="49" charset="0"/>
                 <a:cs typeface="Consolas" panose="020B0609020204030204" pitchFamily="49" charset="0"/>
               </a:rPr>
-              <a:t>		class</a:t>
-            </a:r>
-            <a:r>
-              <a:rPr lang="en-US" sz="2000" dirty="0">
-                <a:latin typeface="Consolas" panose="020B0609020204030204" pitchFamily="49" charset="0"/>
-                <a:cs typeface="Consolas" panose="020B0609020204030204" pitchFamily="49" charset="0"/>
-              </a:rPr>
-              <a:t>="md-primary md-raised" </a:t>
-            </a:r>
-            <a:endParaRPr lang="en-US" sz="2000" dirty="0" smtClean="0">
-              <a:latin typeface="Consolas" panose="020B0609020204030204" pitchFamily="49" charset="0"/>
-              <a:cs typeface="Consolas" panose="020B0609020204030204" pitchFamily="49" charset="0"/>
-            </a:endParaRPr>
-          </a:p>
-          <a:p>
-            <a:pPr marL="0" indent="0">
-              <a:buNone/>
-            </a:pPr>
-            <a:r>
-              <a:rPr lang="en-US" sz="2000" dirty="0">
+              <a:t>["close"] = </a:t>
+            </a:r>
+            <a:r>
+              <a:rPr lang="en-US" sz="2000" dirty="0" err="1" smtClean="0">
+                <a:latin typeface="Consolas" panose="020B0609020204030204" pitchFamily="49" charset="0"/>
+                <a:cs typeface="Consolas" panose="020B0609020204030204" pitchFamily="49" charset="0"/>
+              </a:rPr>
+              <a:t>this.close</a:t>
+            </a:r>
+            <a:r>
+              <a:rPr lang="en-US" sz="2000" dirty="0" smtClean="0">
+                <a:latin typeface="Consolas" panose="020B0609020204030204" pitchFamily="49" charset="0"/>
+                <a:cs typeface="Consolas" panose="020B0609020204030204" pitchFamily="49" charset="0"/>
+              </a:rPr>
+              <a:t>;</a:t>
+            </a:r>
+          </a:p>
+          <a:p>
+            <a:pPr marL="0" indent="0">
+              <a:buNone/>
+            </a:pPr>
+            <a:r>
+              <a:rPr lang="en-US" sz="2000" dirty="0" smtClean="0">
                 <a:latin typeface="Consolas" panose="020B0609020204030204" pitchFamily="49" charset="0"/>
                 <a:cs typeface="Consolas" panose="020B0609020204030204" pitchFamily="49" charset="0"/>
               </a:rPr>
               <a:t>	</a:t>
             </a:r>
             <a:r>
+              <a:rPr lang="en-US" sz="2000" dirty="0" err="1" smtClean="0">
+                <a:latin typeface="Consolas" panose="020B0609020204030204" pitchFamily="49" charset="0"/>
+                <a:cs typeface="Consolas" panose="020B0609020204030204" pitchFamily="49" charset="0"/>
+              </a:rPr>
+              <a:t>this.$scope</a:t>
+            </a:r>
+            <a:r>
               <a:rPr lang="en-US" sz="2000" dirty="0" smtClean="0">
                 <a:latin typeface="Consolas" panose="020B0609020204030204" pitchFamily="49" charset="0"/>
                 <a:cs typeface="Consolas" panose="020B0609020204030204" pitchFamily="49" charset="0"/>
               </a:rPr>
-              <a:t>		ng-click</a:t>
-            </a:r>
-            <a:r>
-              <a:rPr lang="en-US" sz="2000" dirty="0">
-                <a:latin typeface="Consolas" panose="020B0609020204030204" pitchFamily="49" charset="0"/>
-                <a:cs typeface="Consolas" panose="020B0609020204030204" pitchFamily="49" charset="0"/>
-              </a:rPr>
-              <a:t>="</a:t>
-            </a:r>
-            <a:r>
-              <a:rPr lang="en-US" sz="2000" dirty="0" err="1">
-                <a:latin typeface="Consolas" panose="020B0609020204030204" pitchFamily="49" charset="0"/>
-                <a:cs typeface="Consolas" panose="020B0609020204030204" pitchFamily="49" charset="0"/>
-              </a:rPr>
-              <a:t>handleBtnClick</a:t>
+              <a:t>["</a:t>
+            </a:r>
+            <a:r>
+              <a:rPr lang="en-US" sz="2000" dirty="0" err="1" smtClean="0">
+                <a:latin typeface="Consolas" panose="020B0609020204030204" pitchFamily="49" charset="0"/>
+                <a:cs typeface="Consolas" panose="020B0609020204030204" pitchFamily="49" charset="0"/>
+              </a:rPr>
+              <a:t>myDate</a:t>
             </a:r>
             <a:r>
               <a:rPr lang="en-US" sz="2000" dirty="0" smtClean="0">
                 <a:latin typeface="Consolas" panose="020B0609020204030204" pitchFamily="49" charset="0"/>
                 <a:cs typeface="Consolas" panose="020B0609020204030204" pitchFamily="49" charset="0"/>
               </a:rPr>
-              <a:t>()"&gt; 					{{</a:t>
-            </a:r>
-            <a:r>
-              <a:rPr lang="en-US" sz="2000" dirty="0" err="1">
+              <a:t>"] = new Date();</a:t>
+            </a:r>
+          </a:p>
+          <a:p>
+            <a:pPr marL="0" indent="0">
+              <a:buNone/>
+            </a:pPr>
+            <a:r>
+              <a:rPr lang="en-US" sz="2000" dirty="0" smtClean="0">
+                <a:latin typeface="Consolas" panose="020B0609020204030204" pitchFamily="49" charset="0"/>
+                <a:cs typeface="Consolas" panose="020B0609020204030204" pitchFamily="49" charset="0"/>
+              </a:rPr>
+              <a:t>	</a:t>
+            </a:r>
+            <a:r>
+              <a:rPr lang="en-US" sz="2000" dirty="0" err="1" smtClean="0">
+                <a:latin typeface="Consolas" panose="020B0609020204030204" pitchFamily="49" charset="0"/>
+                <a:cs typeface="Consolas" panose="020B0609020204030204" pitchFamily="49" charset="0"/>
+              </a:rPr>
+              <a:t>this.$scope</a:t>
+            </a:r>
+            <a:r>
+              <a:rPr lang="en-US" sz="2000" dirty="0" smtClean="0">
+                <a:latin typeface="Consolas" panose="020B0609020204030204" pitchFamily="49" charset="0"/>
+                <a:cs typeface="Consolas" panose="020B0609020204030204" pitchFamily="49" charset="0"/>
+              </a:rPr>
+              <a:t>["</a:t>
+            </a:r>
+            <a:r>
+              <a:rPr lang="en-US" sz="2000" dirty="0" err="1" smtClean="0">
                 <a:latin typeface="Consolas" panose="020B0609020204030204" pitchFamily="49" charset="0"/>
                 <a:cs typeface="Consolas" panose="020B0609020204030204" pitchFamily="49" charset="0"/>
               </a:rPr>
@@ -5251,7 +5075,7 @@
                 <a:latin typeface="Consolas" panose="020B0609020204030204" pitchFamily="49" charset="0"/>
                 <a:cs typeface="Consolas" panose="020B0609020204030204" pitchFamily="49" charset="0"/>
               </a:rPr>
-              <a:t>}}</a:t>
+              <a:t>"] = "Click me";</a:t>
             </a:r>
           </a:p>
           <a:p>
@@ -5263,26 +5087,16 @@
                 <a:latin typeface="Consolas" panose="020B0609020204030204" pitchFamily="49" charset="0"/>
                 <a:cs typeface="Consolas" panose="020B0609020204030204" pitchFamily="49" charset="0"/>
               </a:rPr>
-              <a:t>			&lt;/</a:t>
-            </a:r>
-            <a:r>
-              <a:rPr lang="en-US" sz="2000" dirty="0">
-                <a:latin typeface="Consolas" panose="020B0609020204030204" pitchFamily="49" charset="0"/>
-                <a:cs typeface="Consolas" panose="020B0609020204030204" pitchFamily="49" charset="0"/>
-              </a:rPr>
-              <a:t>md-button&gt;';</a:t>
-            </a:r>
-            <a:endParaRPr lang="en-US" sz="2000" dirty="0" smtClean="0">
-              <a:latin typeface="Consolas" panose="020B0609020204030204" pitchFamily="49" charset="0"/>
-              <a:cs typeface="Consolas" panose="020B0609020204030204" pitchFamily="49" charset="0"/>
-            </a:endParaRPr>
+              <a:t>}</a:t>
+            </a:r>
+            <a:endParaRPr lang="en-US" sz="3000" dirty="0"/>
           </a:p>
         </p:txBody>
       </p:sp>
     </p:spTree>
     <p:extLst>
       <p:ext uri="{BB962C8B-B14F-4D97-AF65-F5344CB8AC3E}">
-        <p14:creationId xmlns:p14="http://schemas.microsoft.com/office/powerpoint/2010/main" val="3916596199"/>
+        <p14:creationId xmlns:p14="http://schemas.microsoft.com/office/powerpoint/2010/main" val="2153161457"/>
       </p:ext>
     </p:extLst>
   </p:cSld>
@@ -5334,15 +5148,14 @@
         </p:spPr>
         <p:txBody>
           <a:bodyPr>
-            <a:normAutofit fontScale="90000"/>
+            <a:normAutofit/>
           </a:bodyPr>
           <a:lstStyle/>
           <a:p>
             <a:r>
               <a:rPr lang="en-US" dirty="0" smtClean="0"/>
-              <a:t>Web Components: Custom Elements</a:t>
-            </a:r>
-            <a:endParaRPr lang="en-US" dirty="0" smtClean="0"/>
+              <a:t>Externs – Material Design</a:t>
+            </a:r>
           </a:p>
         </p:txBody>
       </p:sp>
@@ -5369,70 +5182,199 @@
           <a:lstStyle/>
           <a:p>
             <a:r>
-              <a:rPr lang="en-US" b="1" dirty="0"/>
-              <a:t>Custom Elements</a:t>
-            </a:r>
-            <a:r>
-              <a:rPr lang="en-US" dirty="0"/>
-              <a:t> allow web developers to define new types of HTML </a:t>
-            </a:r>
-            <a:r>
               <a:rPr lang="en-US" dirty="0" smtClean="0"/>
-              <a:t>elements</a:t>
-            </a:r>
-          </a:p>
-          <a:p>
-            <a:r>
-              <a:rPr lang="en-US" dirty="0"/>
-              <a:t>The spec is one of several new API primitives landing under the </a:t>
-            </a:r>
-            <a:r>
-              <a:rPr lang="en-US" b="1" dirty="0"/>
-              <a:t>Web Components</a:t>
-            </a:r>
-            <a:r>
-              <a:rPr lang="en-US" dirty="0"/>
-              <a:t> </a:t>
-            </a:r>
+              <a:t>Just add a Material Design directive to the DOM</a:t>
+            </a:r>
+          </a:p>
+          <a:p>
             <a:r>
               <a:rPr lang="en-US" dirty="0" smtClean="0"/>
-              <a:t>umbrella</a:t>
-            </a:r>
-          </a:p>
-          <a:p>
-            <a:r>
-              <a:rPr lang="en-US" dirty="0" smtClean="0"/>
-              <a:t>Lets us create custom HTML elements</a:t>
-            </a:r>
-          </a:p>
-          <a:p>
-            <a:r>
-              <a:rPr lang="en-US" dirty="0" smtClean="0"/>
-              <a:t>Supported by </a:t>
-            </a:r>
-            <a:r>
-              <a:rPr lang="en-US" dirty="0" err="1" smtClean="0"/>
-              <a:t>js.swc</a:t>
-            </a:r>
-            <a:r>
-              <a:rPr lang="en-US" dirty="0" smtClean="0"/>
-              <a:t> extern library</a:t>
-            </a:r>
-            <a:endParaRPr lang="en-US" dirty="0" smtClean="0"/>
-          </a:p>
-          <a:p>
-            <a:r>
-              <a:rPr lang="en-US" dirty="0" smtClean="0"/>
-              <a:t>It’s changing constantly, so this stuff might not work in a few months!</a:t>
-            </a:r>
-            <a:endParaRPr lang="en-US" dirty="0" smtClean="0"/>
+              <a:t>AngularJS + Material Design takes care of the rest</a:t>
+            </a:r>
+          </a:p>
+          <a:p>
+            <a:endParaRPr lang="en-US" dirty="0"/>
+          </a:p>
+          <a:p>
+            <a:pPr marL="0" indent="0">
+              <a:buNone/>
+            </a:pPr>
+            <a:r>
+              <a:rPr lang="en-US" sz="2000" dirty="0" err="1">
+                <a:latin typeface="Consolas" panose="020B0609020204030204" pitchFamily="49" charset="0"/>
+                <a:cs typeface="Consolas" panose="020B0609020204030204" pitchFamily="49" charset="0"/>
+              </a:rPr>
+              <a:t>div.innerHTML</a:t>
+            </a:r>
+            <a:r>
+              <a:rPr lang="en-US" sz="2000" dirty="0">
+                <a:latin typeface="Consolas" panose="020B0609020204030204" pitchFamily="49" charset="0"/>
+                <a:cs typeface="Consolas" panose="020B0609020204030204" pitchFamily="49" charset="0"/>
+              </a:rPr>
+              <a:t> += '&lt;md-button </a:t>
+            </a:r>
+            <a:endParaRPr lang="en-US" sz="2000" dirty="0" smtClean="0">
+              <a:latin typeface="Consolas" panose="020B0609020204030204" pitchFamily="49" charset="0"/>
+              <a:cs typeface="Consolas" panose="020B0609020204030204" pitchFamily="49" charset="0"/>
+            </a:endParaRPr>
+          </a:p>
+          <a:p>
+            <a:pPr marL="0" indent="0">
+              <a:buNone/>
+            </a:pPr>
+            <a:r>
+              <a:rPr lang="en-US" sz="2000" dirty="0">
+                <a:latin typeface="Consolas" panose="020B0609020204030204" pitchFamily="49" charset="0"/>
+                <a:cs typeface="Consolas" panose="020B0609020204030204" pitchFamily="49" charset="0"/>
+              </a:rPr>
+              <a:t>	</a:t>
+            </a:r>
+            <a:r>
+              <a:rPr lang="en-US" sz="2000" dirty="0" smtClean="0">
+                <a:latin typeface="Consolas" panose="020B0609020204030204" pitchFamily="49" charset="0"/>
+                <a:cs typeface="Consolas" panose="020B0609020204030204" pitchFamily="49" charset="0"/>
+              </a:rPr>
+              <a:t>		id</a:t>
+            </a:r>
+            <a:r>
+              <a:rPr lang="en-US" sz="2000" dirty="0">
+                <a:latin typeface="Consolas" panose="020B0609020204030204" pitchFamily="49" charset="0"/>
+                <a:cs typeface="Consolas" panose="020B0609020204030204" pitchFamily="49" charset="0"/>
+              </a:rPr>
+              <a:t>="</a:t>
+            </a:r>
+            <a:r>
+              <a:rPr lang="en-US" sz="2000" dirty="0" err="1">
+                <a:latin typeface="Consolas" panose="020B0609020204030204" pitchFamily="49" charset="0"/>
+                <a:cs typeface="Consolas" panose="020B0609020204030204" pitchFamily="49" charset="0"/>
+              </a:rPr>
+              <a:t>myBtn</a:t>
+            </a:r>
+            <a:r>
+              <a:rPr lang="en-US" sz="2000" dirty="0">
+                <a:latin typeface="Consolas" panose="020B0609020204030204" pitchFamily="49" charset="0"/>
+                <a:cs typeface="Consolas" panose="020B0609020204030204" pitchFamily="49" charset="0"/>
+              </a:rPr>
+              <a:t>" </a:t>
+            </a:r>
+            <a:endParaRPr lang="en-US" sz="2000" dirty="0" smtClean="0">
+              <a:latin typeface="Consolas" panose="020B0609020204030204" pitchFamily="49" charset="0"/>
+              <a:cs typeface="Consolas" panose="020B0609020204030204" pitchFamily="49" charset="0"/>
+            </a:endParaRPr>
+          </a:p>
+          <a:p>
+            <a:pPr marL="0" indent="0">
+              <a:buNone/>
+            </a:pPr>
+            <a:r>
+              <a:rPr lang="en-US" sz="2000" dirty="0">
+                <a:latin typeface="Consolas" panose="020B0609020204030204" pitchFamily="49" charset="0"/>
+                <a:cs typeface="Consolas" panose="020B0609020204030204" pitchFamily="49" charset="0"/>
+              </a:rPr>
+              <a:t>	</a:t>
+            </a:r>
+            <a:r>
+              <a:rPr lang="en-US" sz="2000" dirty="0" smtClean="0">
+                <a:latin typeface="Consolas" panose="020B0609020204030204" pitchFamily="49" charset="0"/>
+                <a:cs typeface="Consolas" panose="020B0609020204030204" pitchFamily="49" charset="0"/>
+              </a:rPr>
+              <a:t>		class</a:t>
+            </a:r>
+            <a:r>
+              <a:rPr lang="en-US" sz="2000" dirty="0">
+                <a:latin typeface="Consolas" panose="020B0609020204030204" pitchFamily="49" charset="0"/>
+                <a:cs typeface="Consolas" panose="020B0609020204030204" pitchFamily="49" charset="0"/>
+              </a:rPr>
+              <a:t>="md-primary md-raised" </a:t>
+            </a:r>
+            <a:endParaRPr lang="en-US" sz="2000" dirty="0" smtClean="0">
+              <a:latin typeface="Consolas" panose="020B0609020204030204" pitchFamily="49" charset="0"/>
+              <a:cs typeface="Consolas" panose="020B0609020204030204" pitchFamily="49" charset="0"/>
+            </a:endParaRPr>
+          </a:p>
+          <a:p>
+            <a:pPr marL="0" indent="0">
+              <a:buNone/>
+            </a:pPr>
+            <a:r>
+              <a:rPr lang="en-US" sz="2000" dirty="0">
+                <a:latin typeface="Consolas" panose="020B0609020204030204" pitchFamily="49" charset="0"/>
+                <a:cs typeface="Consolas" panose="020B0609020204030204" pitchFamily="49" charset="0"/>
+              </a:rPr>
+              <a:t>	</a:t>
+            </a:r>
+            <a:r>
+              <a:rPr lang="en-US" sz="2000" dirty="0" smtClean="0">
+                <a:latin typeface="Consolas" panose="020B0609020204030204" pitchFamily="49" charset="0"/>
+                <a:cs typeface="Consolas" panose="020B0609020204030204" pitchFamily="49" charset="0"/>
+              </a:rPr>
+              <a:t>		ng-click</a:t>
+            </a:r>
+            <a:r>
+              <a:rPr lang="en-US" sz="2000" dirty="0">
+                <a:latin typeface="Consolas" panose="020B0609020204030204" pitchFamily="49" charset="0"/>
+                <a:cs typeface="Consolas" panose="020B0609020204030204" pitchFamily="49" charset="0"/>
+              </a:rPr>
+              <a:t>="</a:t>
+            </a:r>
+            <a:r>
+              <a:rPr lang="en-US" sz="2000" dirty="0" err="1">
+                <a:latin typeface="Consolas" panose="020B0609020204030204" pitchFamily="49" charset="0"/>
+                <a:cs typeface="Consolas" panose="020B0609020204030204" pitchFamily="49" charset="0"/>
+              </a:rPr>
+              <a:t>handleBtnClick</a:t>
+            </a:r>
+            <a:r>
+              <a:rPr lang="en-US" sz="2000" dirty="0" smtClean="0">
+                <a:latin typeface="Consolas" panose="020B0609020204030204" pitchFamily="49" charset="0"/>
+                <a:cs typeface="Consolas" panose="020B0609020204030204" pitchFamily="49" charset="0"/>
+              </a:rPr>
+              <a:t>()"&gt; 					{{</a:t>
+            </a:r>
+            <a:r>
+              <a:rPr lang="en-US" sz="2000" dirty="0" err="1">
+                <a:latin typeface="Consolas" panose="020B0609020204030204" pitchFamily="49" charset="0"/>
+                <a:cs typeface="Consolas" panose="020B0609020204030204" pitchFamily="49" charset="0"/>
+              </a:rPr>
+              <a:t>btnLabelStr</a:t>
+            </a:r>
+            <a:r>
+              <a:rPr lang="en-US" sz="2000" dirty="0" smtClean="0">
+                <a:latin typeface="Consolas" panose="020B0609020204030204" pitchFamily="49" charset="0"/>
+                <a:cs typeface="Consolas" panose="020B0609020204030204" pitchFamily="49" charset="0"/>
+              </a:rPr>
+              <a:t>}}</a:t>
+            </a:r>
+          </a:p>
+          <a:p>
+            <a:pPr marL="0" indent="0">
+              <a:buNone/>
+            </a:pPr>
+            <a:r>
+              <a:rPr lang="en-US" sz="2000" dirty="0" smtClean="0">
+                <a:latin typeface="Consolas" panose="020B0609020204030204" pitchFamily="49" charset="0"/>
+                <a:cs typeface="Consolas" panose="020B0609020204030204" pitchFamily="49" charset="0"/>
+              </a:rPr>
+              <a:t>			&lt;/</a:t>
+            </a:r>
+            <a:r>
+              <a:rPr lang="en-US" sz="2000" dirty="0">
+                <a:latin typeface="Consolas" panose="020B0609020204030204" pitchFamily="49" charset="0"/>
+                <a:cs typeface="Consolas" panose="020B0609020204030204" pitchFamily="49" charset="0"/>
+              </a:rPr>
+              <a:t>md-button&gt;';</a:t>
+            </a:r>
+            <a:endParaRPr lang="en-US" sz="2000" dirty="0" smtClean="0">
+              <a:latin typeface="Consolas" panose="020B0609020204030204" pitchFamily="49" charset="0"/>
+              <a:cs typeface="Consolas" panose="020B0609020204030204" pitchFamily="49" charset="0"/>
+            </a:endParaRPr>
           </a:p>
         </p:txBody>
       </p:sp>
     </p:spTree>
     <p:extLst>
       <p:ext uri="{BB962C8B-B14F-4D97-AF65-F5344CB8AC3E}">
-        <p14:creationId xmlns:p14="http://schemas.microsoft.com/office/powerpoint/2010/main" val="988670833"/>
+        <p14:creationId xmlns:p14="http://schemas.microsoft.com/office/powerpoint/2010/main" val="3916596199"/>
       </p:ext>
     </p:extLst>
   </p:cSld>
@@ -5492,7 +5434,6 @@
               <a:rPr lang="en-US" dirty="0" smtClean="0"/>
               <a:t>Web Components: Custom Elements</a:t>
             </a:r>
-            <a:endParaRPr lang="en-US" dirty="0" smtClean="0"/>
           </a:p>
         </p:txBody>
       </p:sp>
@@ -5508,8 +5449,8 @@
         </p:nvSpPr>
         <p:spPr>
           <a:xfrm>
-            <a:off x="304800" y="1295400"/>
-            <a:ext cx="8610600" cy="5410200"/>
+            <a:off x="457200" y="1828800"/>
+            <a:ext cx="8229600" cy="4876800"/>
           </a:xfrm>
         </p:spPr>
         <p:txBody>
@@ -5518,385 +5459,69 @@
           </a:bodyPr>
           <a:lstStyle/>
           <a:p>
-            <a:pPr marL="0" indent="0">
-              <a:buNone/>
-            </a:pPr>
-            <a:r>
-              <a:rPr lang="en-US" sz="1800" b="1" dirty="0">
-                <a:latin typeface="Consolas" panose="020B0609020204030204" pitchFamily="49" charset="0"/>
-                <a:cs typeface="Consolas" panose="020B0609020204030204" pitchFamily="49" charset="0"/>
-              </a:rPr>
-              <a:t>public class </a:t>
-            </a:r>
-            <a:r>
-              <a:rPr lang="en-US" sz="1800" b="1" dirty="0" err="1">
-                <a:latin typeface="Consolas" panose="020B0609020204030204" pitchFamily="49" charset="0"/>
-                <a:cs typeface="Consolas" panose="020B0609020204030204" pitchFamily="49" charset="0"/>
-              </a:rPr>
-              <a:t>WebComponent</a:t>
-            </a:r>
-            <a:r>
-              <a:rPr lang="en-US" sz="1800" b="1" dirty="0">
-                <a:latin typeface="Consolas" panose="020B0609020204030204" pitchFamily="49" charset="0"/>
-                <a:cs typeface="Consolas" panose="020B0609020204030204" pitchFamily="49" charset="0"/>
-              </a:rPr>
-              <a:t> extends </a:t>
-            </a:r>
-            <a:r>
-              <a:rPr lang="en-US" sz="1800" b="1" dirty="0" err="1">
-                <a:latin typeface="Consolas" panose="020B0609020204030204" pitchFamily="49" charset="0"/>
-                <a:cs typeface="Consolas" panose="020B0609020204030204" pitchFamily="49" charset="0"/>
-              </a:rPr>
-              <a:t>HTMLElement</a:t>
-            </a:r>
-            <a:r>
-              <a:rPr lang="en-US" sz="1800" b="1" dirty="0">
-                <a:latin typeface="Consolas" panose="020B0609020204030204" pitchFamily="49" charset="0"/>
-                <a:cs typeface="Consolas" panose="020B0609020204030204" pitchFamily="49" charset="0"/>
-              </a:rPr>
-              <a:t> implements </a:t>
-            </a:r>
-            <a:r>
-              <a:rPr lang="en-US" sz="1800" b="1" dirty="0" err="1">
-                <a:latin typeface="Consolas" panose="020B0609020204030204" pitchFamily="49" charset="0"/>
-                <a:cs typeface="Consolas" panose="020B0609020204030204" pitchFamily="49" charset="0"/>
-              </a:rPr>
-              <a:t>IWebComponent</a:t>
-            </a:r>
-            <a:r>
-              <a:rPr lang="en-US" sz="1800" b="1" dirty="0">
-                <a:latin typeface="Consolas" panose="020B0609020204030204" pitchFamily="49" charset="0"/>
-                <a:cs typeface="Consolas" panose="020B0609020204030204" pitchFamily="49" charset="0"/>
-              </a:rPr>
-              <a:t> {</a:t>
-            </a:r>
-          </a:p>
-          <a:p>
-            <a:pPr marL="0" indent="0">
-              <a:buNone/>
-            </a:pPr>
-            <a:endParaRPr lang="en-US" sz="1800" dirty="0">
-              <a:latin typeface="Consolas" panose="020B0609020204030204" pitchFamily="49" charset="0"/>
-              <a:cs typeface="Consolas" panose="020B0609020204030204" pitchFamily="49" charset="0"/>
-            </a:endParaRPr>
-          </a:p>
-          <a:p>
-            <a:pPr marL="0" indent="0">
-              <a:buNone/>
-            </a:pPr>
-            <a:r>
-              <a:rPr lang="en-US" sz="1800" b="1" dirty="0" smtClean="0">
-                <a:latin typeface="Consolas" panose="020B0609020204030204" pitchFamily="49" charset="0"/>
-                <a:cs typeface="Consolas" panose="020B0609020204030204" pitchFamily="49" charset="0"/>
-              </a:rPr>
-              <a:t>	protected </a:t>
-            </a:r>
-            <a:r>
-              <a:rPr lang="en-US" sz="1800" b="1" dirty="0" err="1">
-                <a:latin typeface="Consolas" panose="020B0609020204030204" pitchFamily="49" charset="0"/>
-                <a:cs typeface="Consolas" panose="020B0609020204030204" pitchFamily="49" charset="0"/>
-              </a:rPr>
-              <a:t>var</a:t>
-            </a:r>
-            <a:r>
-              <a:rPr lang="en-US" sz="1800" b="1" dirty="0">
-                <a:latin typeface="Consolas" panose="020B0609020204030204" pitchFamily="49" charset="0"/>
-                <a:cs typeface="Consolas" panose="020B0609020204030204" pitchFamily="49" charset="0"/>
-              </a:rPr>
-              <a:t> </a:t>
-            </a:r>
-            <a:r>
-              <a:rPr lang="en-US" sz="1800" b="1" dirty="0" err="1" smtClean="0">
-                <a:latin typeface="Consolas" panose="020B0609020204030204" pitchFamily="49" charset="0"/>
-                <a:cs typeface="Consolas" panose="020B0609020204030204" pitchFamily="49" charset="0"/>
-              </a:rPr>
-              <a:t>shadowRoot</a:t>
-            </a:r>
-            <a:r>
-              <a:rPr lang="en-US" sz="1800" b="1" dirty="0" smtClean="0">
-                <a:latin typeface="Consolas" panose="020B0609020204030204" pitchFamily="49" charset="0"/>
-                <a:cs typeface="Consolas" panose="020B0609020204030204" pitchFamily="49" charset="0"/>
-              </a:rPr>
-              <a:t> </a:t>
-            </a:r>
-            <a:r>
-              <a:rPr lang="en-US" sz="1800" b="1" dirty="0">
-                <a:latin typeface="Consolas" panose="020B0609020204030204" pitchFamily="49" charset="0"/>
-                <a:cs typeface="Consolas" panose="020B0609020204030204" pitchFamily="49" charset="0"/>
-              </a:rPr>
-              <a:t>: </a:t>
-            </a:r>
-            <a:r>
-              <a:rPr lang="en-US" sz="1800" b="1" dirty="0" err="1">
-                <a:latin typeface="Consolas" panose="020B0609020204030204" pitchFamily="49" charset="0"/>
-                <a:cs typeface="Consolas" panose="020B0609020204030204" pitchFamily="49" charset="0"/>
-              </a:rPr>
-              <a:t>ShadowRoot</a:t>
-            </a:r>
-            <a:r>
-              <a:rPr lang="en-US" sz="1800" b="1" dirty="0">
-                <a:latin typeface="Consolas" panose="020B0609020204030204" pitchFamily="49" charset="0"/>
-                <a:cs typeface="Consolas" panose="020B0609020204030204" pitchFamily="49" charset="0"/>
-              </a:rPr>
-              <a:t>;</a:t>
-            </a:r>
-          </a:p>
-          <a:p>
-            <a:pPr marL="0" indent="0">
-              <a:buNone/>
-            </a:pPr>
-            <a:r>
-              <a:rPr lang="en-US" sz="1800" dirty="0" smtClean="0">
-                <a:latin typeface="Consolas" panose="020B0609020204030204" pitchFamily="49" charset="0"/>
-                <a:cs typeface="Consolas" panose="020B0609020204030204" pitchFamily="49" charset="0"/>
-              </a:rPr>
-              <a:t>	</a:t>
-            </a:r>
-          </a:p>
-          <a:p>
-            <a:pPr marL="0" indent="0">
-              <a:buNone/>
-            </a:pPr>
-            <a:r>
-              <a:rPr lang="en-US" sz="1800" dirty="0">
-                <a:latin typeface="Consolas" panose="020B0609020204030204" pitchFamily="49" charset="0"/>
-                <a:cs typeface="Consolas" panose="020B0609020204030204" pitchFamily="49" charset="0"/>
-              </a:rPr>
-              <a:t>	</a:t>
-            </a:r>
-            <a:r>
-              <a:rPr lang="en-US" sz="1800" dirty="0" smtClean="0">
-                <a:latin typeface="Consolas" panose="020B0609020204030204" pitchFamily="49" charset="0"/>
-                <a:cs typeface="Consolas" panose="020B0609020204030204" pitchFamily="49" charset="0"/>
-              </a:rPr>
-              <a:t>//Lifecycle method</a:t>
-            </a:r>
-            <a:endParaRPr lang="en-US" sz="1800" dirty="0">
-              <a:latin typeface="Consolas" panose="020B0609020204030204" pitchFamily="49" charset="0"/>
-              <a:cs typeface="Consolas" panose="020B0609020204030204" pitchFamily="49" charset="0"/>
-            </a:endParaRPr>
-          </a:p>
-          <a:p>
-            <a:pPr marL="0" indent="0">
-              <a:buNone/>
-            </a:pPr>
-            <a:r>
-              <a:rPr lang="en-US" sz="1800" b="1" dirty="0" smtClean="0">
-                <a:latin typeface="Consolas" panose="020B0609020204030204" pitchFamily="49" charset="0"/>
-                <a:cs typeface="Consolas" panose="020B0609020204030204" pitchFamily="49" charset="0"/>
-              </a:rPr>
-              <a:t>	public </a:t>
-            </a:r>
-            <a:r>
-              <a:rPr lang="en-US" sz="1800" b="1" dirty="0">
-                <a:latin typeface="Consolas" panose="020B0609020204030204" pitchFamily="49" charset="0"/>
-                <a:cs typeface="Consolas" panose="020B0609020204030204" pitchFamily="49" charset="0"/>
-              </a:rPr>
-              <a:t>function </a:t>
-            </a:r>
-            <a:r>
-              <a:rPr lang="en-US" sz="1800" b="1" dirty="0" err="1">
-                <a:latin typeface="Consolas" panose="020B0609020204030204" pitchFamily="49" charset="0"/>
-                <a:cs typeface="Consolas" panose="020B0609020204030204" pitchFamily="49" charset="0"/>
-              </a:rPr>
-              <a:t>createdCallback</a:t>
-            </a:r>
-            <a:r>
-              <a:rPr lang="en-US" sz="1800" b="1" dirty="0">
-                <a:latin typeface="Consolas" panose="020B0609020204030204" pitchFamily="49" charset="0"/>
-                <a:cs typeface="Consolas" panose="020B0609020204030204" pitchFamily="49" charset="0"/>
-              </a:rPr>
-              <a:t>() : void {</a:t>
-            </a:r>
-          </a:p>
-          <a:p>
-            <a:pPr marL="0" indent="0">
-              <a:buNone/>
-            </a:pPr>
-            <a:r>
-              <a:rPr lang="en-US" sz="1800" dirty="0" smtClean="0">
-                <a:latin typeface="Consolas" panose="020B0609020204030204" pitchFamily="49" charset="0"/>
-                <a:cs typeface="Consolas" panose="020B0609020204030204" pitchFamily="49" charset="0"/>
-              </a:rPr>
-              <a:t>		</a:t>
-            </a:r>
-            <a:r>
-              <a:rPr lang="en-US" sz="1800" dirty="0" err="1" smtClean="0">
-                <a:latin typeface="Consolas" panose="020B0609020204030204" pitchFamily="49" charset="0"/>
-                <a:cs typeface="Consolas" panose="020B0609020204030204" pitchFamily="49" charset="0"/>
-              </a:rPr>
-              <a:t>shadowRoot</a:t>
-            </a:r>
-            <a:r>
-              <a:rPr lang="en-US" sz="1800" dirty="0" smtClean="0">
-                <a:latin typeface="Consolas" panose="020B0609020204030204" pitchFamily="49" charset="0"/>
-                <a:cs typeface="Consolas" panose="020B0609020204030204" pitchFamily="49" charset="0"/>
-              </a:rPr>
-              <a:t> = </a:t>
-            </a:r>
-            <a:r>
-              <a:rPr lang="en-US" sz="1800" b="1" dirty="0">
-                <a:latin typeface="Consolas" panose="020B0609020204030204" pitchFamily="49" charset="0"/>
-                <a:cs typeface="Consolas" panose="020B0609020204030204" pitchFamily="49" charset="0"/>
-              </a:rPr>
-              <a:t>this['</a:t>
-            </a:r>
-            <a:r>
-              <a:rPr lang="en-US" sz="1800" b="1" dirty="0" err="1">
-                <a:latin typeface="Consolas" panose="020B0609020204030204" pitchFamily="49" charset="0"/>
-                <a:cs typeface="Consolas" panose="020B0609020204030204" pitchFamily="49" charset="0"/>
-              </a:rPr>
-              <a:t>createShadowRoot</a:t>
-            </a:r>
-            <a:r>
-              <a:rPr lang="en-US" sz="1800" b="1" dirty="0">
-                <a:latin typeface="Consolas" panose="020B0609020204030204" pitchFamily="49" charset="0"/>
-                <a:cs typeface="Consolas" panose="020B0609020204030204" pitchFamily="49" charset="0"/>
-              </a:rPr>
-              <a:t>']();</a:t>
-            </a:r>
-          </a:p>
-          <a:p>
-            <a:pPr marL="0" indent="0">
-              <a:buNone/>
-            </a:pPr>
-            <a:r>
-              <a:rPr lang="en-US" sz="1800" dirty="0" smtClean="0">
-                <a:latin typeface="Consolas" panose="020B0609020204030204" pitchFamily="49" charset="0"/>
-                <a:cs typeface="Consolas" panose="020B0609020204030204" pitchFamily="49" charset="0"/>
-              </a:rPr>
-              <a:t>		</a:t>
-            </a:r>
-            <a:r>
-              <a:rPr lang="en-US" sz="1800" dirty="0" err="1" smtClean="0">
-                <a:latin typeface="Consolas" panose="020B0609020204030204" pitchFamily="49" charset="0"/>
-                <a:cs typeface="Consolas" panose="020B0609020204030204" pitchFamily="49" charset="0"/>
-              </a:rPr>
-              <a:t>setupComponent</a:t>
-            </a:r>
-            <a:r>
-              <a:rPr lang="en-US" sz="1800" dirty="0">
-                <a:latin typeface="Consolas" panose="020B0609020204030204" pitchFamily="49" charset="0"/>
-                <a:cs typeface="Consolas" panose="020B0609020204030204" pitchFamily="49" charset="0"/>
-              </a:rPr>
-              <a:t>();</a:t>
-            </a:r>
-          </a:p>
-          <a:p>
-            <a:pPr marL="0" indent="0">
-              <a:buNone/>
-            </a:pPr>
-            <a:r>
-              <a:rPr lang="en-US" sz="1800" dirty="0" smtClean="0">
-                <a:latin typeface="Consolas" panose="020B0609020204030204" pitchFamily="49" charset="0"/>
-                <a:cs typeface="Consolas" panose="020B0609020204030204" pitchFamily="49" charset="0"/>
-              </a:rPr>
-              <a:t>	}</a:t>
-            </a:r>
-            <a:endParaRPr lang="en-US" sz="1800" dirty="0">
-              <a:latin typeface="Consolas" panose="020B0609020204030204" pitchFamily="49" charset="0"/>
-              <a:cs typeface="Consolas" panose="020B0609020204030204" pitchFamily="49" charset="0"/>
-            </a:endParaRPr>
-          </a:p>
-          <a:p>
-            <a:pPr marL="0" indent="0">
-              <a:buNone/>
-            </a:pPr>
-            <a:endParaRPr lang="en-US" sz="1800" dirty="0">
-              <a:latin typeface="Consolas" panose="020B0609020204030204" pitchFamily="49" charset="0"/>
-              <a:cs typeface="Consolas" panose="020B0609020204030204" pitchFamily="49" charset="0"/>
-            </a:endParaRPr>
-          </a:p>
-          <a:p>
-            <a:pPr marL="0" indent="0">
-              <a:buNone/>
-            </a:pPr>
-            <a:r>
-              <a:rPr lang="en-US" sz="1800" b="1" dirty="0" smtClean="0">
-                <a:latin typeface="Consolas" panose="020B0609020204030204" pitchFamily="49" charset="0"/>
-                <a:cs typeface="Consolas" panose="020B0609020204030204" pitchFamily="49" charset="0"/>
-              </a:rPr>
-              <a:t>	public </a:t>
-            </a:r>
-            <a:r>
-              <a:rPr lang="en-US" sz="1800" b="1" dirty="0">
-                <a:latin typeface="Consolas" panose="020B0609020204030204" pitchFamily="49" charset="0"/>
-                <a:cs typeface="Consolas" panose="020B0609020204030204" pitchFamily="49" charset="0"/>
-              </a:rPr>
-              <a:t>function </a:t>
-            </a:r>
-            <a:r>
-              <a:rPr lang="en-US" sz="1800" b="1" dirty="0" err="1">
-                <a:latin typeface="Consolas" panose="020B0609020204030204" pitchFamily="49" charset="0"/>
-                <a:cs typeface="Consolas" panose="020B0609020204030204" pitchFamily="49" charset="0"/>
-              </a:rPr>
-              <a:t>setupComponent</a:t>
-            </a:r>
-            <a:r>
-              <a:rPr lang="en-US" sz="1800" b="1" dirty="0">
-                <a:latin typeface="Consolas" panose="020B0609020204030204" pitchFamily="49" charset="0"/>
-                <a:cs typeface="Consolas" panose="020B0609020204030204" pitchFamily="49" charset="0"/>
-              </a:rPr>
-              <a:t>() : void {</a:t>
-            </a:r>
-          </a:p>
-          <a:p>
-            <a:pPr marL="0" indent="0">
-              <a:buNone/>
-            </a:pPr>
-            <a:r>
-              <a:rPr lang="en-US" sz="1800" dirty="0" smtClean="0">
-                <a:latin typeface="Consolas" panose="020B0609020204030204" pitchFamily="49" charset="0"/>
-                <a:cs typeface="Consolas" panose="020B0609020204030204" pitchFamily="49" charset="0"/>
-              </a:rPr>
-              <a:t>	//</a:t>
-            </a:r>
-            <a:r>
-              <a:rPr lang="en-US" sz="1800" dirty="0">
-                <a:latin typeface="Consolas" panose="020B0609020204030204" pitchFamily="49" charset="0"/>
-                <a:cs typeface="Consolas" panose="020B0609020204030204" pitchFamily="49" charset="0"/>
-              </a:rPr>
-              <a:t>override in subclass</a:t>
-            </a:r>
-          </a:p>
-          <a:p>
-            <a:pPr marL="0" indent="0">
-              <a:buNone/>
-            </a:pPr>
-            <a:r>
-              <a:rPr lang="en-US" sz="1800" dirty="0" smtClean="0">
-                <a:latin typeface="Consolas" panose="020B0609020204030204" pitchFamily="49" charset="0"/>
-                <a:cs typeface="Consolas" panose="020B0609020204030204" pitchFamily="49" charset="0"/>
-              </a:rPr>
-              <a:t>	}</a:t>
-            </a:r>
-            <a:endParaRPr lang="en-US" sz="1800" dirty="0">
-              <a:latin typeface="Consolas" panose="020B0609020204030204" pitchFamily="49" charset="0"/>
-              <a:cs typeface="Consolas" panose="020B0609020204030204" pitchFamily="49" charset="0"/>
-            </a:endParaRPr>
-          </a:p>
-          <a:p>
-            <a:pPr marL="0" indent="0">
-              <a:buNone/>
-            </a:pPr>
-            <a:r>
-              <a:rPr lang="en-US" sz="1800" dirty="0">
-                <a:latin typeface="Consolas" panose="020B0609020204030204" pitchFamily="49" charset="0"/>
-                <a:cs typeface="Consolas" panose="020B0609020204030204" pitchFamily="49" charset="0"/>
-              </a:rPr>
-              <a:t>}</a:t>
-            </a:r>
-            <a:endParaRPr lang="en-US" sz="1800" dirty="0" smtClean="0">
-              <a:latin typeface="Consolas" panose="020B0609020204030204" pitchFamily="49" charset="0"/>
-              <a:cs typeface="Consolas" panose="020B0609020204030204" pitchFamily="49" charset="0"/>
-            </a:endParaRPr>
+            <a:r>
+              <a:rPr lang="en-US" b="1" dirty="0"/>
+              <a:t>Custom Elements</a:t>
+            </a:r>
+            <a:r>
+              <a:rPr lang="en-US" dirty="0"/>
+              <a:t> allow web developers to define new types of HTML </a:t>
+            </a:r>
+            <a:r>
+              <a:rPr lang="en-US" dirty="0" smtClean="0"/>
+              <a:t>elements</a:t>
+            </a:r>
+          </a:p>
+          <a:p>
+            <a:r>
+              <a:rPr lang="en-US" dirty="0"/>
+              <a:t>The spec is one of several new API primitives landing under the </a:t>
+            </a:r>
+            <a:r>
+              <a:rPr lang="en-US" b="1" dirty="0"/>
+              <a:t>Web Components</a:t>
+            </a:r>
+            <a:r>
+              <a:rPr lang="en-US" dirty="0"/>
+              <a:t> </a:t>
+            </a:r>
+            <a:r>
+              <a:rPr lang="en-US" dirty="0" smtClean="0"/>
+              <a:t>umbrella</a:t>
+            </a:r>
+          </a:p>
+          <a:p>
+            <a:r>
+              <a:rPr lang="en-US" dirty="0" smtClean="0"/>
+              <a:t>Lets us create custom HTML elements</a:t>
+            </a:r>
+          </a:p>
+          <a:p>
+            <a:r>
+              <a:rPr lang="en-US" dirty="0" smtClean="0"/>
+              <a:t>Supported by </a:t>
+            </a:r>
+            <a:r>
+              <a:rPr lang="en-US" dirty="0" err="1" smtClean="0"/>
+              <a:t>js.swc</a:t>
+            </a:r>
+            <a:r>
+              <a:rPr lang="en-US" dirty="0" smtClean="0"/>
+              <a:t> extern library</a:t>
+            </a:r>
+          </a:p>
+          <a:p>
+            <a:r>
+              <a:rPr lang="en-US" dirty="0" smtClean="0"/>
+              <a:t>It’s changing constantly, so this stuff might not work in a few months!</a:t>
+            </a:r>
           </a:p>
         </p:txBody>
       </p:sp>
     </p:spTree>
     <p:extLst>
       <p:ext uri="{BB962C8B-B14F-4D97-AF65-F5344CB8AC3E}">
-        <p14:creationId xmlns:p14="http://schemas.microsoft.com/office/powerpoint/2010/main" val="1300928850"/>
+        <p14:creationId xmlns:p14="http://schemas.microsoft.com/office/powerpoint/2010/main" val="988670833"/>
       </p:ext>
     </p:extLst>
   </p:cSld>
@@ -5956,7 +5581,6 @@
               <a:rPr lang="en-US" dirty="0" smtClean="0"/>
               <a:t>Web Components: Custom Elements</a:t>
             </a:r>
-            <a:endParaRPr lang="en-US" dirty="0" smtClean="0"/>
           </a:p>
         </p:txBody>
       </p:sp>
@@ -5986,33 +5610,59 @@
               <a:buNone/>
             </a:pPr>
             <a:r>
-              <a:rPr lang="en-US" sz="1800" dirty="0">
+              <a:rPr lang="en-US" sz="1800" b="1" dirty="0">
                 <a:latin typeface="Consolas" panose="020B0609020204030204" pitchFamily="49" charset="0"/>
                 <a:cs typeface="Consolas" panose="020B0609020204030204" pitchFamily="49" charset="0"/>
               </a:rPr>
               <a:t>public class </a:t>
             </a:r>
             <a:r>
-              <a:rPr lang="en-US" sz="1800" dirty="0" err="1">
-                <a:latin typeface="Consolas" panose="020B0609020204030204" pitchFamily="49" charset="0"/>
-                <a:cs typeface="Consolas" panose="020B0609020204030204" pitchFamily="49" charset="0"/>
-              </a:rPr>
-              <a:t>MDButton</a:t>
-            </a:r>
-            <a:r>
-              <a:rPr lang="en-US" sz="1800" dirty="0">
+              <a:rPr lang="en-US" sz="1800" b="1" dirty="0" err="1">
+                <a:latin typeface="Consolas" panose="020B0609020204030204" pitchFamily="49" charset="0"/>
+                <a:cs typeface="Consolas" panose="020B0609020204030204" pitchFamily="49" charset="0"/>
+              </a:rPr>
+              <a:t>WebComponent</a:t>
+            </a:r>
+            <a:r>
+              <a:rPr lang="en-US" sz="1800" b="1" dirty="0">
                 <a:latin typeface="Consolas" panose="020B0609020204030204" pitchFamily="49" charset="0"/>
                 <a:cs typeface="Consolas" panose="020B0609020204030204" pitchFamily="49" charset="0"/>
               </a:rPr>
               <a:t> extends </a:t>
             </a:r>
             <a:r>
-              <a:rPr lang="en-US" sz="1800" dirty="0" err="1">
-                <a:latin typeface="Consolas" panose="020B0609020204030204" pitchFamily="49" charset="0"/>
-                <a:cs typeface="Consolas" panose="020B0609020204030204" pitchFamily="49" charset="0"/>
-              </a:rPr>
-              <a:t>WebComponent</a:t>
-            </a:r>
+              <a:rPr lang="en-US" sz="1800" b="1" dirty="0" err="1">
+                <a:latin typeface="Consolas" panose="020B0609020204030204" pitchFamily="49" charset="0"/>
+                <a:cs typeface="Consolas" panose="020B0609020204030204" pitchFamily="49" charset="0"/>
+              </a:rPr>
+              <a:t>HTMLElement</a:t>
+            </a:r>
+            <a:r>
+              <a:rPr lang="en-US" sz="1800" b="1" dirty="0">
+                <a:latin typeface="Consolas" panose="020B0609020204030204" pitchFamily="49" charset="0"/>
+                <a:cs typeface="Consolas" panose="020B0609020204030204" pitchFamily="49" charset="0"/>
+              </a:rPr>
+              <a:t> implements </a:t>
+            </a:r>
+            <a:r>
+              <a:rPr lang="en-US" sz="1800" b="1" dirty="0" err="1">
+                <a:latin typeface="Consolas" panose="020B0609020204030204" pitchFamily="49" charset="0"/>
+                <a:cs typeface="Consolas" panose="020B0609020204030204" pitchFamily="49" charset="0"/>
+              </a:rPr>
+              <a:t>IWebComponent</a:t>
+            </a:r>
+            <a:r>
+              <a:rPr lang="en-US" sz="1800" b="1" dirty="0">
+                <a:latin typeface="Consolas" panose="020B0609020204030204" pitchFamily="49" charset="0"/>
+                <a:cs typeface="Consolas" panose="020B0609020204030204" pitchFamily="49" charset="0"/>
+              </a:rPr>
+              <a:t> {</a:t>
+            </a:r>
+          </a:p>
+          <a:p>
+            <a:pPr marL="0" indent="0">
+              <a:buNone/>
+            </a:pPr>
             <a:endParaRPr lang="en-US" sz="1800" dirty="0">
               <a:latin typeface="Consolas" panose="020B0609020204030204" pitchFamily="49" charset="0"/>
               <a:cs typeface="Consolas" panose="020B0609020204030204" pitchFamily="49" charset="0"/>
@@ -6023,308 +5673,318 @@
               <a:buNone/>
             </a:pPr>
             <a:r>
+              <a:rPr lang="en-US" sz="1800" b="1" dirty="0" smtClean="0">
+                <a:latin typeface="Consolas" panose="020B0609020204030204" pitchFamily="49" charset="0"/>
+                <a:cs typeface="Consolas" panose="020B0609020204030204" pitchFamily="49" charset="0"/>
+              </a:rPr>
+              <a:t>	protected </a:t>
+            </a:r>
+            <a:r>
+              <a:rPr lang="en-US" sz="1800" b="1" dirty="0" err="1">
+                <a:latin typeface="Consolas" panose="020B0609020204030204" pitchFamily="49" charset="0"/>
+                <a:cs typeface="Consolas" panose="020B0609020204030204" pitchFamily="49" charset="0"/>
+              </a:rPr>
+              <a:t>var</a:t>
+            </a:r>
+            <a:r>
+              <a:rPr lang="en-US" sz="1800" b="1" dirty="0">
+                <a:latin typeface="Consolas" panose="020B0609020204030204" pitchFamily="49" charset="0"/>
+                <a:cs typeface="Consolas" panose="020B0609020204030204" pitchFamily="49" charset="0"/>
+              </a:rPr>
+              <a:t> </a:t>
+            </a:r>
+            <a:r>
+              <a:rPr lang="en-US" sz="1800" b="1" dirty="0" err="1" smtClean="0">
+                <a:latin typeface="Consolas" panose="020B0609020204030204" pitchFamily="49" charset="0"/>
+                <a:cs typeface="Consolas" panose="020B0609020204030204" pitchFamily="49" charset="0"/>
+              </a:rPr>
+              <a:t>shadowRoot</a:t>
+            </a:r>
+            <a:r>
+              <a:rPr lang="en-US" sz="1800" b="1" dirty="0" smtClean="0">
+                <a:latin typeface="Consolas" panose="020B0609020204030204" pitchFamily="49" charset="0"/>
+                <a:cs typeface="Consolas" panose="020B0609020204030204" pitchFamily="49" charset="0"/>
+              </a:rPr>
+              <a:t> </a:t>
+            </a:r>
+            <a:r>
+              <a:rPr lang="en-US" sz="1800" b="1" dirty="0">
+                <a:latin typeface="Consolas" panose="020B0609020204030204" pitchFamily="49" charset="0"/>
+                <a:cs typeface="Consolas" panose="020B0609020204030204" pitchFamily="49" charset="0"/>
+              </a:rPr>
+              <a:t>: </a:t>
+            </a:r>
+            <a:r>
+              <a:rPr lang="en-US" sz="1800" b="1" dirty="0" err="1">
+                <a:latin typeface="Consolas" panose="020B0609020204030204" pitchFamily="49" charset="0"/>
+                <a:cs typeface="Consolas" panose="020B0609020204030204" pitchFamily="49" charset="0"/>
+              </a:rPr>
+              <a:t>ShadowRoot</a:t>
+            </a:r>
+            <a:r>
+              <a:rPr lang="en-US" sz="1800" b="1" dirty="0">
+                <a:latin typeface="Consolas" panose="020B0609020204030204" pitchFamily="49" charset="0"/>
+                <a:cs typeface="Consolas" panose="020B0609020204030204" pitchFamily="49" charset="0"/>
+              </a:rPr>
+              <a:t>;</a:t>
+            </a:r>
+          </a:p>
+          <a:p>
+            <a:pPr marL="0" indent="0">
+              <a:buNone/>
+            </a:pPr>
+            <a:r>
+              <a:rPr lang="en-US" sz="1800" dirty="0" smtClean="0">
+                <a:latin typeface="Consolas" panose="020B0609020204030204" pitchFamily="49" charset="0"/>
+                <a:cs typeface="Consolas" panose="020B0609020204030204" pitchFamily="49" charset="0"/>
+              </a:rPr>
+              <a:t>	</a:t>
+            </a:r>
+          </a:p>
+          <a:p>
+            <a:pPr marL="0" indent="0">
+              <a:buNone/>
+            </a:pPr>
+            <a:r>
               <a:rPr lang="en-US" sz="1800" dirty="0">
                 <a:latin typeface="Consolas" panose="020B0609020204030204" pitchFamily="49" charset="0"/>
                 <a:cs typeface="Consolas" panose="020B0609020204030204" pitchFamily="49" charset="0"/>
               </a:rPr>
-              <a:t>{</a:t>
+              <a:t>	</a:t>
+            </a:r>
+            <a:r>
+              <a:rPr lang="en-US" sz="1800" dirty="0" smtClean="0">
+                <a:latin typeface="Consolas" panose="020B0609020204030204" pitchFamily="49" charset="0"/>
+                <a:cs typeface="Consolas" panose="020B0609020204030204" pitchFamily="49" charset="0"/>
+              </a:rPr>
+              <a:t>//Lifecycle method</a:t>
+            </a:r>
+            <a:endParaRPr lang="en-US" sz="1800" dirty="0">
+              <a:latin typeface="Consolas" panose="020B0609020204030204" pitchFamily="49" charset="0"/>
+              <a:cs typeface="Consolas" panose="020B0609020204030204" pitchFamily="49" charset="0"/>
+            </a:endParaRPr>
+          </a:p>
+          <a:p>
+            <a:pPr marL="0" indent="0">
+              <a:buNone/>
+            </a:pPr>
+            <a:r>
+              <a:rPr lang="en-US" sz="1800" b="1" dirty="0" smtClean="0">
+                <a:latin typeface="Consolas" panose="020B0609020204030204" pitchFamily="49" charset="0"/>
+                <a:cs typeface="Consolas" panose="020B0609020204030204" pitchFamily="49" charset="0"/>
+              </a:rPr>
+              <a:t>	public </a:t>
+            </a:r>
+            <a:r>
+              <a:rPr lang="en-US" sz="1800" b="1" dirty="0">
+                <a:latin typeface="Consolas" panose="020B0609020204030204" pitchFamily="49" charset="0"/>
+                <a:cs typeface="Consolas" panose="020B0609020204030204" pitchFamily="49" charset="0"/>
+              </a:rPr>
+              <a:t>function </a:t>
+            </a:r>
+            <a:r>
+              <a:rPr lang="en-US" sz="1800" b="1" dirty="0" err="1">
+                <a:latin typeface="Consolas" panose="020B0609020204030204" pitchFamily="49" charset="0"/>
+                <a:cs typeface="Consolas" panose="020B0609020204030204" pitchFamily="49" charset="0"/>
+              </a:rPr>
+              <a:t>createdCallback</a:t>
+            </a:r>
+            <a:r>
+              <a:rPr lang="en-US" sz="1800" b="1" dirty="0">
+                <a:latin typeface="Consolas" panose="020B0609020204030204" pitchFamily="49" charset="0"/>
+                <a:cs typeface="Consolas" panose="020B0609020204030204" pitchFamily="49" charset="0"/>
+              </a:rPr>
+              <a:t>() : void {</a:t>
+            </a:r>
+          </a:p>
+          <a:p>
+            <a:pPr marL="0" indent="0">
+              <a:buNone/>
+            </a:pPr>
+            <a:r>
+              <a:rPr lang="en-US" sz="1800" dirty="0" smtClean="0">
+                <a:latin typeface="Consolas" panose="020B0609020204030204" pitchFamily="49" charset="0"/>
+                <a:cs typeface="Consolas" panose="020B0609020204030204" pitchFamily="49" charset="0"/>
+              </a:rPr>
+              <a:t>		</a:t>
+            </a:r>
+            <a:r>
+              <a:rPr lang="en-US" sz="1800" dirty="0" err="1" smtClean="0">
+                <a:latin typeface="Consolas" panose="020B0609020204030204" pitchFamily="49" charset="0"/>
+                <a:cs typeface="Consolas" panose="020B0609020204030204" pitchFamily="49" charset="0"/>
+              </a:rPr>
+              <a:t>shadowRoot</a:t>
+            </a:r>
+            <a:r>
+              <a:rPr lang="en-US" sz="1800" dirty="0" smtClean="0">
+                <a:latin typeface="Consolas" panose="020B0609020204030204" pitchFamily="49" charset="0"/>
+                <a:cs typeface="Consolas" panose="020B0609020204030204" pitchFamily="49" charset="0"/>
+              </a:rPr>
+              <a:t> = </a:t>
+            </a:r>
+            <a:r>
+              <a:rPr lang="en-US" sz="1800" b="1" dirty="0">
+                <a:latin typeface="Consolas" panose="020B0609020204030204" pitchFamily="49" charset="0"/>
+                <a:cs typeface="Consolas" panose="020B0609020204030204" pitchFamily="49" charset="0"/>
+              </a:rPr>
+              <a:t>this['</a:t>
+            </a:r>
+            <a:r>
+              <a:rPr lang="en-US" sz="1800" b="1" dirty="0" err="1">
+                <a:latin typeface="Consolas" panose="020B0609020204030204" pitchFamily="49" charset="0"/>
+                <a:cs typeface="Consolas" panose="020B0609020204030204" pitchFamily="49" charset="0"/>
+              </a:rPr>
+              <a:t>createShadowRoot</a:t>
+            </a:r>
+            <a:r>
+              <a:rPr lang="en-US" sz="1800" b="1" dirty="0">
+                <a:latin typeface="Consolas" panose="020B0609020204030204" pitchFamily="49" charset="0"/>
+                <a:cs typeface="Consolas" panose="020B0609020204030204" pitchFamily="49" charset="0"/>
+              </a:rPr>
+              <a:t>']();</a:t>
+            </a:r>
+          </a:p>
+          <a:p>
+            <a:pPr marL="0" indent="0">
+              <a:buNone/>
+            </a:pPr>
+            <a:r>
+              <a:rPr lang="en-US" sz="1800" dirty="0" smtClean="0">
+                <a:latin typeface="Consolas" panose="020B0609020204030204" pitchFamily="49" charset="0"/>
+                <a:cs typeface="Consolas" panose="020B0609020204030204" pitchFamily="49" charset="0"/>
+              </a:rPr>
+              <a:t>		</a:t>
+            </a:r>
+            <a:r>
+              <a:rPr lang="en-US" sz="1800" dirty="0" err="1" smtClean="0">
+                <a:latin typeface="Consolas" panose="020B0609020204030204" pitchFamily="49" charset="0"/>
+                <a:cs typeface="Consolas" panose="020B0609020204030204" pitchFamily="49" charset="0"/>
+              </a:rPr>
+              <a:t>setupComponent</a:t>
+            </a:r>
+            <a:r>
+              <a:rPr lang="en-US" sz="1800" dirty="0">
+                <a:latin typeface="Consolas" panose="020B0609020204030204" pitchFamily="49" charset="0"/>
+                <a:cs typeface="Consolas" panose="020B0609020204030204" pitchFamily="49" charset="0"/>
+              </a:rPr>
+              <a:t>();</a:t>
+            </a:r>
+          </a:p>
+          <a:p>
+            <a:pPr marL="0" indent="0">
+              <a:buNone/>
+            </a:pPr>
+            <a:r>
+              <a:rPr lang="en-US" sz="1800" dirty="0" smtClean="0">
+                <a:latin typeface="Consolas" panose="020B0609020204030204" pitchFamily="49" charset="0"/>
+                <a:cs typeface="Consolas" panose="020B0609020204030204" pitchFamily="49" charset="0"/>
+              </a:rPr>
+              <a:t>	}</a:t>
+            </a:r>
+            <a:endParaRPr lang="en-US" sz="1800" dirty="0">
+              <a:latin typeface="Consolas" panose="020B0609020204030204" pitchFamily="49" charset="0"/>
+              <a:cs typeface="Consolas" panose="020B0609020204030204" pitchFamily="49" charset="0"/>
+            </a:endParaRPr>
+          </a:p>
+          <a:p>
+            <a:pPr marL="0" indent="0">
+              <a:buNone/>
+            </a:pPr>
+            <a:endParaRPr lang="en-US" sz="1800" dirty="0">
+              <a:latin typeface="Consolas" panose="020B0609020204030204" pitchFamily="49" charset="0"/>
+              <a:cs typeface="Consolas" panose="020B0609020204030204" pitchFamily="49" charset="0"/>
+            </a:endParaRPr>
+          </a:p>
+          <a:p>
+            <a:pPr marL="0" indent="0">
+              <a:buNone/>
+            </a:pPr>
+            <a:r>
+              <a:rPr lang="en-US" sz="1800" b="1" dirty="0" smtClean="0">
+                <a:latin typeface="Consolas" panose="020B0609020204030204" pitchFamily="49" charset="0"/>
+                <a:cs typeface="Consolas" panose="020B0609020204030204" pitchFamily="49" charset="0"/>
+              </a:rPr>
+              <a:t>	public </a:t>
+            </a:r>
+            <a:r>
+              <a:rPr lang="en-US" sz="1800" b="1" dirty="0">
+                <a:latin typeface="Consolas" panose="020B0609020204030204" pitchFamily="49" charset="0"/>
+                <a:cs typeface="Consolas" panose="020B0609020204030204" pitchFamily="49" charset="0"/>
+              </a:rPr>
+              <a:t>function </a:t>
+            </a:r>
+            <a:r>
+              <a:rPr lang="en-US" sz="1800" b="1" dirty="0" err="1">
+                <a:latin typeface="Consolas" panose="020B0609020204030204" pitchFamily="49" charset="0"/>
+                <a:cs typeface="Consolas" panose="020B0609020204030204" pitchFamily="49" charset="0"/>
+              </a:rPr>
+              <a:t>setupComponent</a:t>
+            </a:r>
+            <a:r>
+              <a:rPr lang="en-US" sz="1800" b="1" dirty="0">
+                <a:latin typeface="Consolas" panose="020B0609020204030204" pitchFamily="49" charset="0"/>
+                <a:cs typeface="Consolas" panose="020B0609020204030204" pitchFamily="49" charset="0"/>
+              </a:rPr>
+              <a:t>() : void {</a:t>
+            </a:r>
+          </a:p>
+          <a:p>
+            <a:pPr marL="0" indent="0">
+              <a:buNone/>
+            </a:pPr>
+            <a:r>
+              <a:rPr lang="en-US" sz="1800" dirty="0" smtClean="0">
+                <a:latin typeface="Consolas" panose="020B0609020204030204" pitchFamily="49" charset="0"/>
+                <a:cs typeface="Consolas" panose="020B0609020204030204" pitchFamily="49" charset="0"/>
+              </a:rPr>
+              <a:t>	//</a:t>
+            </a:r>
+            <a:r>
+              <a:rPr lang="en-US" sz="1800" dirty="0">
+                <a:latin typeface="Consolas" panose="020B0609020204030204" pitchFamily="49" charset="0"/>
+                <a:cs typeface="Consolas" panose="020B0609020204030204" pitchFamily="49" charset="0"/>
+              </a:rPr>
+              <a:t>override in subclass</a:t>
+            </a:r>
+          </a:p>
+          <a:p>
+            <a:pPr marL="0" indent="0">
+              <a:buNone/>
+            </a:pPr>
+            <a:r>
+              <a:rPr lang="en-US" sz="1800" dirty="0" smtClean="0">
+                <a:latin typeface="Consolas" panose="020B0609020204030204" pitchFamily="49" charset="0"/>
+                <a:cs typeface="Consolas" panose="020B0609020204030204" pitchFamily="49" charset="0"/>
+              </a:rPr>
+              <a:t>	}</a:t>
+            </a:r>
+            <a:endParaRPr lang="en-US" sz="1800" dirty="0">
+              <a:latin typeface="Consolas" panose="020B0609020204030204" pitchFamily="49" charset="0"/>
+              <a:cs typeface="Consolas" panose="020B0609020204030204" pitchFamily="49" charset="0"/>
+            </a:endParaRPr>
+          </a:p>
+          <a:p>
+            <a:pPr marL="0" indent="0">
+              <a:buNone/>
+            </a:pPr>
+            <a:r>
+              <a:rPr lang="en-US" sz="1800" dirty="0">
+                <a:latin typeface="Consolas" panose="020B0609020204030204" pitchFamily="49" charset="0"/>
+                <a:cs typeface="Consolas" panose="020B0609020204030204" pitchFamily="49" charset="0"/>
+              </a:rPr>
+              <a:t>}</a:t>
             </a:r>
             <a:endParaRPr lang="en-US" sz="1800" dirty="0" smtClean="0">
               <a:latin typeface="Consolas" panose="020B0609020204030204" pitchFamily="49" charset="0"/>
               <a:cs typeface="Consolas" panose="020B0609020204030204" pitchFamily="49" charset="0"/>
             </a:endParaRPr>
           </a:p>
-          <a:p>
-            <a:pPr marL="0" indent="0">
-              <a:buNone/>
-            </a:pPr>
-            <a:r>
-              <a:rPr lang="en-US" sz="1800" dirty="0" smtClean="0">
-                <a:latin typeface="Consolas" panose="020B0609020204030204" pitchFamily="49" charset="0"/>
-                <a:cs typeface="Consolas" panose="020B0609020204030204" pitchFamily="49" charset="0"/>
-              </a:rPr>
-              <a:t>…</a:t>
-            </a:r>
-            <a:endParaRPr lang="en-US" sz="1800" dirty="0">
-              <a:latin typeface="Consolas" panose="020B0609020204030204" pitchFamily="49" charset="0"/>
-              <a:cs typeface="Consolas" panose="020B0609020204030204" pitchFamily="49" charset="0"/>
-            </a:endParaRPr>
-          </a:p>
-          <a:p>
-            <a:pPr marL="0" indent="0">
-              <a:buNone/>
-            </a:pPr>
-            <a:r>
-              <a:rPr lang="en-US" sz="1800" dirty="0" smtClean="0">
-                <a:latin typeface="Consolas" panose="020B0609020204030204" pitchFamily="49" charset="0"/>
-                <a:cs typeface="Consolas" panose="020B0609020204030204" pitchFamily="49" charset="0"/>
-              </a:rPr>
-              <a:t>	override </a:t>
-            </a:r>
-            <a:r>
-              <a:rPr lang="en-US" sz="1800" dirty="0">
-                <a:latin typeface="Consolas" panose="020B0609020204030204" pitchFamily="49" charset="0"/>
-                <a:cs typeface="Consolas" panose="020B0609020204030204" pitchFamily="49" charset="0"/>
-              </a:rPr>
-              <a:t>public function </a:t>
-            </a:r>
-            <a:r>
-              <a:rPr lang="en-US" sz="1800" dirty="0" err="1">
-                <a:latin typeface="Consolas" panose="020B0609020204030204" pitchFamily="49" charset="0"/>
-                <a:cs typeface="Consolas" panose="020B0609020204030204" pitchFamily="49" charset="0"/>
-              </a:rPr>
-              <a:t>setupComponent</a:t>
-            </a:r>
-            <a:r>
-              <a:rPr lang="en-US" sz="1800" dirty="0">
-                <a:latin typeface="Consolas" panose="020B0609020204030204" pitchFamily="49" charset="0"/>
-                <a:cs typeface="Consolas" panose="020B0609020204030204" pitchFamily="49" charset="0"/>
-              </a:rPr>
-              <a:t>():void {</a:t>
-            </a:r>
-          </a:p>
-          <a:p>
-            <a:pPr marL="0" indent="0">
-              <a:buNone/>
-            </a:pPr>
-            <a:r>
-              <a:rPr lang="en-US" sz="1800" dirty="0" smtClean="0">
-                <a:latin typeface="Consolas" panose="020B0609020204030204" pitchFamily="49" charset="0"/>
-                <a:cs typeface="Consolas" panose="020B0609020204030204" pitchFamily="49" charset="0"/>
-              </a:rPr>
-              <a:t>		</a:t>
-            </a:r>
-            <a:r>
-              <a:rPr lang="en-US" sz="1800" dirty="0" err="1" smtClean="0">
-                <a:latin typeface="Consolas" panose="020B0609020204030204" pitchFamily="49" charset="0"/>
-                <a:cs typeface="Consolas" panose="020B0609020204030204" pitchFamily="49" charset="0"/>
-              </a:rPr>
-              <a:t>createLabel</a:t>
-            </a:r>
-            <a:r>
-              <a:rPr lang="en-US" sz="1800" dirty="0">
-                <a:latin typeface="Consolas" panose="020B0609020204030204" pitchFamily="49" charset="0"/>
-                <a:cs typeface="Consolas" panose="020B0609020204030204" pitchFamily="49" charset="0"/>
-              </a:rPr>
-              <a:t>();</a:t>
-            </a:r>
-          </a:p>
-          <a:p>
-            <a:pPr marL="0" indent="0">
-              <a:buNone/>
-            </a:pPr>
-            <a:r>
-              <a:rPr lang="en-US" sz="1800" dirty="0" smtClean="0">
-                <a:latin typeface="Consolas" panose="020B0609020204030204" pitchFamily="49" charset="0"/>
-                <a:cs typeface="Consolas" panose="020B0609020204030204" pitchFamily="49" charset="0"/>
-              </a:rPr>
-              <a:t>		</a:t>
-            </a:r>
-            <a:r>
-              <a:rPr lang="en-US" sz="1800" dirty="0" err="1" smtClean="0">
-                <a:latin typeface="Consolas" panose="020B0609020204030204" pitchFamily="49" charset="0"/>
-                <a:cs typeface="Consolas" panose="020B0609020204030204" pitchFamily="49" charset="0"/>
-              </a:rPr>
-              <a:t>createIcon</a:t>
-            </a:r>
-            <a:r>
-              <a:rPr lang="en-US" sz="1800" dirty="0">
-                <a:latin typeface="Consolas" panose="020B0609020204030204" pitchFamily="49" charset="0"/>
-                <a:cs typeface="Consolas" panose="020B0609020204030204" pitchFamily="49" charset="0"/>
-              </a:rPr>
-              <a:t>();</a:t>
-            </a:r>
-          </a:p>
-          <a:p>
-            <a:pPr marL="0" indent="0">
-              <a:buNone/>
-            </a:pPr>
-            <a:r>
-              <a:rPr lang="en-US" sz="1800" dirty="0" smtClean="0">
-                <a:latin typeface="Consolas" panose="020B0609020204030204" pitchFamily="49" charset="0"/>
-                <a:cs typeface="Consolas" panose="020B0609020204030204" pitchFamily="49" charset="0"/>
-              </a:rPr>
-              <a:t>	}</a:t>
-            </a:r>
-            <a:endParaRPr lang="en-US" sz="1800" dirty="0">
-              <a:latin typeface="Consolas" panose="020B0609020204030204" pitchFamily="49" charset="0"/>
-              <a:cs typeface="Consolas" panose="020B0609020204030204" pitchFamily="49" charset="0"/>
-            </a:endParaRPr>
-          </a:p>
-          <a:p>
-            <a:pPr marL="0" indent="0">
-              <a:buNone/>
-            </a:pPr>
-            <a:endParaRPr lang="en-US" sz="1800" dirty="0">
-              <a:latin typeface="Consolas" panose="020B0609020204030204" pitchFamily="49" charset="0"/>
-              <a:cs typeface="Consolas" panose="020B0609020204030204" pitchFamily="49" charset="0"/>
-            </a:endParaRPr>
-          </a:p>
-          <a:p>
-            <a:pPr marL="0" indent="0">
-              <a:buNone/>
-            </a:pPr>
-            <a:r>
-              <a:rPr lang="en-US" sz="1800" dirty="0" smtClean="0">
-                <a:latin typeface="Consolas" panose="020B0609020204030204" pitchFamily="49" charset="0"/>
-                <a:cs typeface="Consolas" panose="020B0609020204030204" pitchFamily="49" charset="0"/>
-              </a:rPr>
-              <a:t>	protected </a:t>
-            </a:r>
-            <a:r>
-              <a:rPr lang="en-US" sz="1800" dirty="0">
-                <a:latin typeface="Consolas" panose="020B0609020204030204" pitchFamily="49" charset="0"/>
-                <a:cs typeface="Consolas" panose="020B0609020204030204" pitchFamily="49" charset="0"/>
-              </a:rPr>
-              <a:t>function </a:t>
-            </a:r>
-            <a:r>
-              <a:rPr lang="en-US" sz="1800" dirty="0" err="1">
-                <a:latin typeface="Consolas" panose="020B0609020204030204" pitchFamily="49" charset="0"/>
-                <a:cs typeface="Consolas" panose="020B0609020204030204" pitchFamily="49" charset="0"/>
-              </a:rPr>
-              <a:t>createLabel</a:t>
-            </a:r>
-            <a:r>
-              <a:rPr lang="en-US" sz="1800" dirty="0">
-                <a:latin typeface="Consolas" panose="020B0609020204030204" pitchFamily="49" charset="0"/>
-                <a:cs typeface="Consolas" panose="020B0609020204030204" pitchFamily="49" charset="0"/>
-              </a:rPr>
-              <a:t>():void</a:t>
-            </a:r>
-          </a:p>
-          <a:p>
-            <a:pPr marL="0" indent="0">
-              <a:buNone/>
-            </a:pPr>
-            <a:r>
-              <a:rPr lang="en-US" sz="1800" dirty="0" smtClean="0">
-                <a:latin typeface="Consolas" panose="020B0609020204030204" pitchFamily="49" charset="0"/>
-                <a:cs typeface="Consolas" panose="020B0609020204030204" pitchFamily="49" charset="0"/>
-              </a:rPr>
-              <a:t>	{</a:t>
-            </a:r>
-            <a:endParaRPr lang="en-US" sz="1800" dirty="0">
-              <a:latin typeface="Consolas" panose="020B0609020204030204" pitchFamily="49" charset="0"/>
-              <a:cs typeface="Consolas" panose="020B0609020204030204" pitchFamily="49" charset="0"/>
-            </a:endParaRPr>
-          </a:p>
-          <a:p>
-            <a:pPr marL="0" indent="0">
-              <a:buNone/>
-            </a:pPr>
-            <a:r>
-              <a:rPr lang="en-US" sz="1800" dirty="0" smtClean="0">
-                <a:latin typeface="Consolas" panose="020B0609020204030204" pitchFamily="49" charset="0"/>
-                <a:cs typeface="Consolas" panose="020B0609020204030204" pitchFamily="49" charset="0"/>
-              </a:rPr>
-              <a:t>		label </a:t>
-            </a:r>
-            <a:r>
-              <a:rPr lang="en-US" sz="1800" dirty="0">
-                <a:latin typeface="Consolas" panose="020B0609020204030204" pitchFamily="49" charset="0"/>
-                <a:cs typeface="Consolas" panose="020B0609020204030204" pitchFamily="49" charset="0"/>
-              </a:rPr>
-              <a:t>= </a:t>
-            </a:r>
-            <a:r>
-              <a:rPr lang="en-US" sz="1800" dirty="0" err="1">
-                <a:latin typeface="Consolas" panose="020B0609020204030204" pitchFamily="49" charset="0"/>
-                <a:cs typeface="Consolas" panose="020B0609020204030204" pitchFamily="49" charset="0"/>
-              </a:rPr>
-              <a:t>ownerDocument.createTextNode</a:t>
-            </a:r>
-            <a:r>
-              <a:rPr lang="en-US" sz="1800" dirty="0">
-                <a:latin typeface="Consolas" panose="020B0609020204030204" pitchFamily="49" charset="0"/>
-                <a:cs typeface="Consolas" panose="020B0609020204030204" pitchFamily="49" charset="0"/>
-              </a:rPr>
-              <a:t>("");</a:t>
-            </a:r>
-          </a:p>
-          <a:p>
-            <a:pPr marL="0" indent="0">
-              <a:buNone/>
-            </a:pPr>
-            <a:r>
-              <a:rPr lang="en-US" sz="1800" dirty="0" smtClean="0">
-                <a:latin typeface="Consolas" panose="020B0609020204030204" pitchFamily="49" charset="0"/>
-                <a:cs typeface="Consolas" panose="020B0609020204030204" pitchFamily="49" charset="0"/>
-              </a:rPr>
-              <a:t>		</a:t>
-            </a:r>
-            <a:r>
-              <a:rPr lang="en-US" sz="1800" dirty="0" err="1" smtClean="0">
-                <a:latin typeface="Consolas" panose="020B0609020204030204" pitchFamily="49" charset="0"/>
-                <a:cs typeface="Consolas" panose="020B0609020204030204" pitchFamily="49" charset="0"/>
-              </a:rPr>
-              <a:t>shadowRoot.appendChild</a:t>
-            </a:r>
-            <a:r>
-              <a:rPr lang="en-US" sz="1800" dirty="0" smtClean="0">
-                <a:latin typeface="Consolas" panose="020B0609020204030204" pitchFamily="49" charset="0"/>
-                <a:cs typeface="Consolas" panose="020B0609020204030204" pitchFamily="49" charset="0"/>
-              </a:rPr>
-              <a:t>(Node(label</a:t>
-            </a:r>
-            <a:r>
-              <a:rPr lang="en-US" sz="1800" dirty="0">
-                <a:latin typeface="Consolas" panose="020B0609020204030204" pitchFamily="49" charset="0"/>
-                <a:cs typeface="Consolas" panose="020B0609020204030204" pitchFamily="49" charset="0"/>
-              </a:rPr>
-              <a:t>));</a:t>
-            </a:r>
-          </a:p>
-          <a:p>
-            <a:pPr marL="0" indent="0">
-              <a:buNone/>
-            </a:pPr>
-            <a:r>
-              <a:rPr lang="en-US" sz="1800" dirty="0" smtClean="0">
-                <a:latin typeface="Consolas" panose="020B0609020204030204" pitchFamily="49" charset="0"/>
-                <a:cs typeface="Consolas" panose="020B0609020204030204" pitchFamily="49" charset="0"/>
-              </a:rPr>
-              <a:t>	}</a:t>
-            </a:r>
-          </a:p>
-          <a:p>
-            <a:pPr marL="0" indent="0">
-              <a:buNone/>
-            </a:pPr>
-            <a:r>
-              <a:rPr lang="en-US" sz="1800" dirty="0" smtClean="0">
-                <a:latin typeface="Consolas" panose="020B0609020204030204" pitchFamily="49" charset="0"/>
-                <a:cs typeface="Consolas" panose="020B0609020204030204" pitchFamily="49" charset="0"/>
-              </a:rPr>
-              <a:t>…</a:t>
-            </a:r>
-            <a:endParaRPr lang="en-US" sz="1800" dirty="0">
-              <a:latin typeface="Consolas" panose="020B0609020204030204" pitchFamily="49" charset="0"/>
-              <a:cs typeface="Consolas" panose="020B0609020204030204" pitchFamily="49" charset="0"/>
-            </a:endParaRPr>
-          </a:p>
-          <a:p>
-            <a:pPr marL="0" indent="0">
-              <a:buNone/>
-            </a:pPr>
-            <a:r>
-              <a:rPr lang="en-US" sz="1800" dirty="0" smtClean="0">
-                <a:latin typeface="Consolas" panose="020B0609020204030204" pitchFamily="49" charset="0"/>
-                <a:cs typeface="Consolas" panose="020B0609020204030204" pitchFamily="49" charset="0"/>
-              </a:rPr>
-              <a:t>}</a:t>
-            </a:r>
-            <a:endParaRPr lang="en-US" sz="1800" dirty="0" smtClean="0">
-              <a:latin typeface="Consolas" panose="020B0609020204030204" pitchFamily="49" charset="0"/>
-              <a:cs typeface="Consolas" panose="020B0609020204030204" pitchFamily="49" charset="0"/>
-            </a:endParaRPr>
-          </a:p>
         </p:txBody>
       </p:sp>
     </p:spTree>
     <p:extLst>
       <p:ext uri="{BB962C8B-B14F-4D97-AF65-F5344CB8AC3E}">
-        <p14:creationId xmlns:p14="http://schemas.microsoft.com/office/powerpoint/2010/main" val="2672388699"/>
+        <p14:creationId xmlns:p14="http://schemas.microsoft.com/office/powerpoint/2010/main" val="1300928850"/>
       </p:ext>
     </p:extLst>
   </p:cSld>
@@ -6376,15 +6036,14 @@
         </p:spPr>
         <p:txBody>
           <a:bodyPr>
-            <a:normAutofit/>
+            <a:normAutofit fontScale="90000"/>
           </a:bodyPr>
           <a:lstStyle/>
           <a:p>
             <a:r>
               <a:rPr lang="en-US" dirty="0" smtClean="0"/>
-              <a:t>Everything comes together</a:t>
-            </a:r>
-            <a:endParaRPr lang="en-US" dirty="0" smtClean="0"/>
+              <a:t>Web Components: Custom Elements</a:t>
+            </a:r>
           </a:p>
         </p:txBody>
       </p:sp>
@@ -6410,52 +6069,177 @@
           </a:bodyPr>
           <a:lstStyle/>
           <a:p>
-            <a:pPr marL="0" indent="0" algn="ctr">
-              <a:buNone/>
-            </a:pPr>
+            <a:pPr marL="0" indent="0">
+              <a:buNone/>
+            </a:pPr>
+            <a:r>
+              <a:rPr lang="en-US" sz="1800" dirty="0">
+                <a:latin typeface="Consolas" panose="020B0609020204030204" pitchFamily="49" charset="0"/>
+                <a:cs typeface="Consolas" panose="020B0609020204030204" pitchFamily="49" charset="0"/>
+              </a:rPr>
+              <a:t>public class </a:t>
+            </a:r>
+            <a:r>
+              <a:rPr lang="en-US" sz="1800" dirty="0" err="1">
+                <a:latin typeface="Consolas" panose="020B0609020204030204" pitchFamily="49" charset="0"/>
+                <a:cs typeface="Consolas" panose="020B0609020204030204" pitchFamily="49" charset="0"/>
+              </a:rPr>
+              <a:t>MDButton</a:t>
+            </a:r>
+            <a:r>
+              <a:rPr lang="en-US" sz="1800" dirty="0">
+                <a:latin typeface="Consolas" panose="020B0609020204030204" pitchFamily="49" charset="0"/>
+                <a:cs typeface="Consolas" panose="020B0609020204030204" pitchFamily="49" charset="0"/>
+              </a:rPr>
+              <a:t> extends </a:t>
+            </a:r>
+            <a:r>
+              <a:rPr lang="en-US" sz="1800" dirty="0" err="1">
+                <a:latin typeface="Consolas" panose="020B0609020204030204" pitchFamily="49" charset="0"/>
+                <a:cs typeface="Consolas" panose="020B0609020204030204" pitchFamily="49" charset="0"/>
+              </a:rPr>
+              <a:t>WebComponent</a:t>
+            </a:r>
+            <a:endParaRPr lang="en-US" sz="1800" dirty="0">
+              <a:latin typeface="Consolas" panose="020B0609020204030204" pitchFamily="49" charset="0"/>
+              <a:cs typeface="Consolas" panose="020B0609020204030204" pitchFamily="49" charset="0"/>
+            </a:endParaRPr>
+          </a:p>
+          <a:p>
+            <a:pPr marL="0" indent="0">
+              <a:buNone/>
+            </a:pPr>
+            <a:r>
+              <a:rPr lang="en-US" sz="1800" dirty="0">
+                <a:latin typeface="Consolas" panose="020B0609020204030204" pitchFamily="49" charset="0"/>
+                <a:cs typeface="Consolas" panose="020B0609020204030204" pitchFamily="49" charset="0"/>
+              </a:rPr>
+              <a:t>{</a:t>
+            </a:r>
             <a:endParaRPr lang="en-US" sz="1800" dirty="0" smtClean="0">
               <a:latin typeface="Consolas" panose="020B0609020204030204" pitchFamily="49" charset="0"/>
               <a:cs typeface="Consolas" panose="020B0609020204030204" pitchFamily="49" charset="0"/>
             </a:endParaRPr>
           </a:p>
           <a:p>
-            <a:pPr marL="0" indent="0" algn="ctr">
-              <a:buNone/>
-            </a:pPr>
+            <a:pPr marL="0" indent="0">
+              <a:buNone/>
+            </a:pPr>
+            <a:r>
+              <a:rPr lang="en-US" sz="1800" dirty="0" smtClean="0">
+                <a:latin typeface="Consolas" panose="020B0609020204030204" pitchFamily="49" charset="0"/>
+                <a:cs typeface="Consolas" panose="020B0609020204030204" pitchFamily="49" charset="0"/>
+              </a:rPr>
+              <a:t>…</a:t>
+            </a:r>
             <a:endParaRPr lang="en-US" sz="1800" dirty="0">
               <a:latin typeface="Consolas" panose="020B0609020204030204" pitchFamily="49" charset="0"/>
               <a:cs typeface="Consolas" panose="020B0609020204030204" pitchFamily="49" charset="0"/>
             </a:endParaRPr>
           </a:p>
           <a:p>
-            <a:pPr marL="0" indent="0" algn="ctr">
-              <a:buNone/>
-            </a:pPr>
-            <a:endParaRPr lang="en-US" sz="1800" dirty="0" smtClean="0">
-              <a:latin typeface="Consolas" panose="020B0609020204030204" pitchFamily="49" charset="0"/>
-              <a:cs typeface="Consolas" panose="020B0609020204030204" pitchFamily="49" charset="0"/>
-            </a:endParaRPr>
-          </a:p>
-          <a:p>
-            <a:pPr marL="0" indent="0" algn="ctr">
-              <a:buNone/>
-            </a:pPr>
+            <a:pPr marL="0" indent="0">
+              <a:buNone/>
+            </a:pPr>
+            <a:r>
+              <a:rPr lang="en-US" sz="1800" dirty="0" smtClean="0">
+                <a:latin typeface="Consolas" panose="020B0609020204030204" pitchFamily="49" charset="0"/>
+                <a:cs typeface="Consolas" panose="020B0609020204030204" pitchFamily="49" charset="0"/>
+              </a:rPr>
+              <a:t>	override </a:t>
+            </a:r>
+            <a:r>
+              <a:rPr lang="en-US" sz="1800" dirty="0">
+                <a:latin typeface="Consolas" panose="020B0609020204030204" pitchFamily="49" charset="0"/>
+                <a:cs typeface="Consolas" panose="020B0609020204030204" pitchFamily="49" charset="0"/>
+              </a:rPr>
+              <a:t>public function </a:t>
+            </a:r>
+            <a:r>
+              <a:rPr lang="en-US" sz="1800" dirty="0" err="1">
+                <a:latin typeface="Consolas" panose="020B0609020204030204" pitchFamily="49" charset="0"/>
+                <a:cs typeface="Consolas" panose="020B0609020204030204" pitchFamily="49" charset="0"/>
+              </a:rPr>
+              <a:t>setupComponent</a:t>
+            </a:r>
+            <a:r>
+              <a:rPr lang="en-US" sz="1800" dirty="0">
+                <a:latin typeface="Consolas" panose="020B0609020204030204" pitchFamily="49" charset="0"/>
+                <a:cs typeface="Consolas" panose="020B0609020204030204" pitchFamily="49" charset="0"/>
+              </a:rPr>
+              <a:t>():void {</a:t>
+            </a:r>
+          </a:p>
+          <a:p>
+            <a:pPr marL="0" indent="0">
+              <a:buNone/>
+            </a:pPr>
+            <a:r>
+              <a:rPr lang="en-US" sz="1800" dirty="0" smtClean="0">
+                <a:latin typeface="Consolas" panose="020B0609020204030204" pitchFamily="49" charset="0"/>
+                <a:cs typeface="Consolas" panose="020B0609020204030204" pitchFamily="49" charset="0"/>
+              </a:rPr>
+              <a:t>		</a:t>
+            </a:r>
+            <a:r>
+              <a:rPr lang="en-US" sz="1800" dirty="0" err="1" smtClean="0">
+                <a:latin typeface="Consolas" panose="020B0609020204030204" pitchFamily="49" charset="0"/>
+                <a:cs typeface="Consolas" panose="020B0609020204030204" pitchFamily="49" charset="0"/>
+              </a:rPr>
+              <a:t>createLabel</a:t>
+            </a:r>
+            <a:r>
+              <a:rPr lang="en-US" sz="1800" dirty="0">
+                <a:latin typeface="Consolas" panose="020B0609020204030204" pitchFamily="49" charset="0"/>
+                <a:cs typeface="Consolas" panose="020B0609020204030204" pitchFamily="49" charset="0"/>
+              </a:rPr>
+              <a:t>();</a:t>
+            </a:r>
+          </a:p>
+          <a:p>
+            <a:pPr marL="0" indent="0">
+              <a:buNone/>
+            </a:pPr>
+            <a:r>
+              <a:rPr lang="en-US" sz="1800" dirty="0" smtClean="0">
+                <a:latin typeface="Consolas" panose="020B0609020204030204" pitchFamily="49" charset="0"/>
+                <a:cs typeface="Consolas" panose="020B0609020204030204" pitchFamily="49" charset="0"/>
+              </a:rPr>
+              <a:t>		</a:t>
+            </a:r>
+            <a:r>
+              <a:rPr lang="en-US" sz="1800" dirty="0" err="1" smtClean="0">
+                <a:latin typeface="Consolas" panose="020B0609020204030204" pitchFamily="49" charset="0"/>
+                <a:cs typeface="Consolas" panose="020B0609020204030204" pitchFamily="49" charset="0"/>
+              </a:rPr>
+              <a:t>createIcon</a:t>
+            </a:r>
+            <a:r>
+              <a:rPr lang="en-US" sz="1800" dirty="0">
+                <a:latin typeface="Consolas" panose="020B0609020204030204" pitchFamily="49" charset="0"/>
+                <a:cs typeface="Consolas" panose="020B0609020204030204" pitchFamily="49" charset="0"/>
+              </a:rPr>
+              <a:t>();</a:t>
+            </a:r>
+          </a:p>
+          <a:p>
+            <a:pPr marL="0" indent="0">
+              <a:buNone/>
+            </a:pPr>
+            <a:r>
+              <a:rPr lang="en-US" sz="1800" dirty="0" smtClean="0">
+                <a:latin typeface="Consolas" panose="020B0609020204030204" pitchFamily="49" charset="0"/>
+                <a:cs typeface="Consolas" panose="020B0609020204030204" pitchFamily="49" charset="0"/>
+              </a:rPr>
+              <a:t>	}</a:t>
+            </a:r>
             <a:endParaRPr lang="en-US" sz="1800" dirty="0">
               <a:latin typeface="Consolas" panose="020B0609020204030204" pitchFamily="49" charset="0"/>
               <a:cs typeface="Consolas" panose="020B0609020204030204" pitchFamily="49" charset="0"/>
             </a:endParaRPr>
           </a:p>
           <a:p>
-            <a:pPr marL="0" indent="0" algn="ctr">
-              <a:buNone/>
-            </a:pPr>
-            <a:endParaRPr lang="en-US" sz="1800" dirty="0" smtClean="0">
-              <a:latin typeface="Consolas" panose="020B0609020204030204" pitchFamily="49" charset="0"/>
-              <a:cs typeface="Consolas" panose="020B0609020204030204" pitchFamily="49" charset="0"/>
-            </a:endParaRPr>
-          </a:p>
-          <a:p>
-            <a:pPr marL="0" indent="0" algn="ctr">
+            <a:pPr marL="0" indent="0">
               <a:buNone/>
             </a:pPr>
             <a:endParaRPr lang="en-US" sz="1800" dirty="0">
@@ -6464,27 +6248,166 @@
             </a:endParaRPr>
           </a:p>
           <a:p>
-            <a:pPr marL="0" indent="0" algn="ctr">
-              <a:buNone/>
-            </a:pPr>
-            <a:r>
-              <a:rPr lang="en-US" sz="6000" b="1" dirty="0" smtClean="0">
-                <a:latin typeface="Consolas" panose="020B0609020204030204" pitchFamily="49" charset="0"/>
-                <a:cs typeface="Consolas" panose="020B0609020204030204" pitchFamily="49" charset="0"/>
-              </a:rPr>
-              <a:t>Demo</a:t>
-            </a:r>
-            <a:endParaRPr lang="en-US" sz="6000" b="1" dirty="0" smtClean="0">
+            <a:pPr marL="0" indent="0">
+              <a:buNone/>
+            </a:pPr>
+            <a:r>
+              <a:rPr lang="en-US" sz="1800" dirty="0" smtClean="0">
+                <a:latin typeface="Consolas" panose="020B0609020204030204" pitchFamily="49" charset="0"/>
+                <a:cs typeface="Consolas" panose="020B0609020204030204" pitchFamily="49" charset="0"/>
+              </a:rPr>
+              <a:t>	protected </a:t>
+            </a:r>
+            <a:r>
+              <a:rPr lang="en-US" sz="1800" dirty="0">
+                <a:latin typeface="Consolas" panose="020B0609020204030204" pitchFamily="49" charset="0"/>
+                <a:cs typeface="Consolas" panose="020B0609020204030204" pitchFamily="49" charset="0"/>
+              </a:rPr>
+              <a:t>function </a:t>
+            </a:r>
+            <a:r>
+              <a:rPr lang="en-US" sz="1800" dirty="0" err="1">
+                <a:latin typeface="Consolas" panose="020B0609020204030204" pitchFamily="49" charset="0"/>
+                <a:cs typeface="Consolas" panose="020B0609020204030204" pitchFamily="49" charset="0"/>
+              </a:rPr>
+              <a:t>createLabel</a:t>
+            </a:r>
+            <a:r>
+              <a:rPr lang="en-US" sz="1800" dirty="0">
+                <a:latin typeface="Consolas" panose="020B0609020204030204" pitchFamily="49" charset="0"/>
+                <a:cs typeface="Consolas" panose="020B0609020204030204" pitchFamily="49" charset="0"/>
+              </a:rPr>
+              <a:t>():void</a:t>
+            </a:r>
+          </a:p>
+          <a:p>
+            <a:pPr marL="0" indent="0">
+              <a:buNone/>
+            </a:pPr>
+            <a:r>
+              <a:rPr lang="en-US" sz="1800" dirty="0" smtClean="0">
+                <a:latin typeface="Consolas" panose="020B0609020204030204" pitchFamily="49" charset="0"/>
+                <a:cs typeface="Consolas" panose="020B0609020204030204" pitchFamily="49" charset="0"/>
+              </a:rPr>
+              <a:t>	{</a:t>
+            </a:r>
+            <a:endParaRPr lang="en-US" sz="1800" dirty="0">
               <a:latin typeface="Consolas" panose="020B0609020204030204" pitchFamily="49" charset="0"/>
               <a:cs typeface="Consolas" panose="020B0609020204030204" pitchFamily="49" charset="0"/>
             </a:endParaRPr>
           </a:p>
+          <a:p>
+            <a:pPr marL="0" indent="0">
+              <a:buNone/>
+            </a:pPr>
+            <a:r>
+              <a:rPr lang="en-US" sz="1800" dirty="0" smtClean="0">
+                <a:latin typeface="Consolas" panose="020B0609020204030204" pitchFamily="49" charset="0"/>
+                <a:cs typeface="Consolas" panose="020B0609020204030204" pitchFamily="49" charset="0"/>
+              </a:rPr>
+              <a:t>		label </a:t>
+            </a:r>
+            <a:r>
+              <a:rPr lang="en-US" sz="1800" dirty="0">
+                <a:latin typeface="Consolas" panose="020B0609020204030204" pitchFamily="49" charset="0"/>
+                <a:cs typeface="Consolas" panose="020B0609020204030204" pitchFamily="49" charset="0"/>
+              </a:rPr>
+              <a:t>= </a:t>
+            </a:r>
+            <a:r>
+              <a:rPr lang="en-US" sz="1800" dirty="0" err="1">
+                <a:latin typeface="Consolas" panose="020B0609020204030204" pitchFamily="49" charset="0"/>
+                <a:cs typeface="Consolas" panose="020B0609020204030204" pitchFamily="49" charset="0"/>
+              </a:rPr>
+              <a:t>ownerDocument.createTextNode</a:t>
+            </a:r>
+            <a:r>
+              <a:rPr lang="en-US" sz="1800" dirty="0">
+                <a:latin typeface="Consolas" panose="020B0609020204030204" pitchFamily="49" charset="0"/>
+                <a:cs typeface="Consolas" panose="020B0609020204030204" pitchFamily="49" charset="0"/>
+              </a:rPr>
+              <a:t>("");</a:t>
+            </a:r>
+          </a:p>
+          <a:p>
+            <a:pPr marL="0" indent="0">
+              <a:buNone/>
+            </a:pPr>
+            <a:r>
+              <a:rPr lang="en-US" sz="1800" dirty="0" smtClean="0">
+                <a:latin typeface="Consolas" panose="020B0609020204030204" pitchFamily="49" charset="0"/>
+                <a:cs typeface="Consolas" panose="020B0609020204030204" pitchFamily="49" charset="0"/>
+              </a:rPr>
+              <a:t>		</a:t>
+            </a:r>
+            <a:r>
+              <a:rPr lang="en-US" sz="1800" dirty="0" err="1" smtClean="0">
+                <a:latin typeface="Consolas" panose="020B0609020204030204" pitchFamily="49" charset="0"/>
+                <a:cs typeface="Consolas" panose="020B0609020204030204" pitchFamily="49" charset="0"/>
+              </a:rPr>
+              <a:t>shadowRoot.appendChild</a:t>
+            </a:r>
+            <a:r>
+              <a:rPr lang="en-US" sz="1800" dirty="0" smtClean="0">
+                <a:latin typeface="Consolas" panose="020B0609020204030204" pitchFamily="49" charset="0"/>
+                <a:cs typeface="Consolas" panose="020B0609020204030204" pitchFamily="49" charset="0"/>
+              </a:rPr>
+              <a:t>(Node(label</a:t>
+            </a:r>
+            <a:r>
+              <a:rPr lang="en-US" sz="1800" dirty="0">
+                <a:latin typeface="Consolas" panose="020B0609020204030204" pitchFamily="49" charset="0"/>
+                <a:cs typeface="Consolas" panose="020B0609020204030204" pitchFamily="49" charset="0"/>
+              </a:rPr>
+              <a:t>));</a:t>
+            </a:r>
+          </a:p>
+          <a:p>
+            <a:pPr marL="0" indent="0">
+              <a:buNone/>
+            </a:pPr>
+            <a:r>
+              <a:rPr lang="en-US" sz="1800" dirty="0" smtClean="0">
+                <a:latin typeface="Consolas" panose="020B0609020204030204" pitchFamily="49" charset="0"/>
+                <a:cs typeface="Consolas" panose="020B0609020204030204" pitchFamily="49" charset="0"/>
+              </a:rPr>
+              <a:t>	}</a:t>
+            </a:r>
+          </a:p>
+          <a:p>
+            <a:pPr marL="0" indent="0">
+              <a:buNone/>
+            </a:pPr>
+            <a:r>
+              <a:rPr lang="en-US" sz="1800" dirty="0" smtClean="0">
+                <a:latin typeface="Consolas" panose="020B0609020204030204" pitchFamily="49" charset="0"/>
+                <a:cs typeface="Consolas" panose="020B0609020204030204" pitchFamily="49" charset="0"/>
+              </a:rPr>
+              <a:t>…</a:t>
+            </a:r>
+            <a:endParaRPr lang="en-US" sz="1800" dirty="0">
+              <a:latin typeface="Consolas" panose="020B0609020204030204" pitchFamily="49" charset="0"/>
+              <a:cs typeface="Consolas" panose="020B0609020204030204" pitchFamily="49" charset="0"/>
+            </a:endParaRPr>
+          </a:p>
+          <a:p>
+            <a:pPr marL="0" indent="0">
+              <a:buNone/>
+            </a:pPr>
+            <a:r>
+              <a:rPr lang="en-US" sz="1800" dirty="0" smtClean="0">
+                <a:latin typeface="Consolas" panose="020B0609020204030204" pitchFamily="49" charset="0"/>
+                <a:cs typeface="Consolas" panose="020B0609020204030204" pitchFamily="49" charset="0"/>
+              </a:rPr>
+              <a:t>}</a:t>
+            </a:r>
+          </a:p>
         </p:txBody>
       </p:sp>
     </p:spTree>
     <p:extLst>
       <p:ext uri="{BB962C8B-B14F-4D97-AF65-F5344CB8AC3E}">
-        <p14:creationId xmlns:p14="http://schemas.microsoft.com/office/powerpoint/2010/main" val="231466012"/>
+        <p14:creationId xmlns:p14="http://schemas.microsoft.com/office/powerpoint/2010/main" val="2672388699"/>
       </p:ext>
     </p:extLst>
   </p:cSld>
@@ -6541,14 +6464,9 @@
           <a:lstStyle/>
           <a:p>
             <a:r>
-              <a:rPr lang="en-US" dirty="0"/>
-              <a:t>Questions</a:t>
-            </a:r>
-            <a:r>
               <a:rPr lang="en-US" dirty="0" smtClean="0"/>
-              <a:t>?</a:t>
-            </a:r>
-            <a:endParaRPr lang="en-US" dirty="0" smtClean="0"/>
+              <a:t>Everything comes together</a:t>
+            </a:r>
           </a:p>
         </p:txBody>
       </p:sp>
@@ -6564,8 +6482,8 @@
         </p:nvSpPr>
         <p:spPr>
           <a:xfrm>
-            <a:off x="457200" y="1828800"/>
-            <a:ext cx="8229600" cy="4876800"/>
+            <a:off x="304800" y="1295400"/>
+            <a:ext cx="8610600" cy="5410200"/>
           </a:xfrm>
         </p:spPr>
         <p:txBody>
@@ -6574,79 +6492,77 @@
           </a:bodyPr>
           <a:lstStyle/>
           <a:p>
-            <a:r>
-              <a:rPr lang="en-US" dirty="0" smtClean="0"/>
-              <a:t>Wiki page: </a:t>
-            </a:r>
-            <a:r>
-              <a:rPr lang="en-US" dirty="0" smtClean="0">
-                <a:hlinkClick r:id="rId2"/>
-              </a:rPr>
-              <a:t>s.apache.org/</a:t>
-            </a:r>
-            <a:r>
-              <a:rPr lang="en-US" dirty="0" err="1" smtClean="0">
-                <a:hlinkClick r:id="rId2"/>
-              </a:rPr>
-              <a:t>flexjswiki</a:t>
-            </a:r>
-            <a:endParaRPr lang="en-US" dirty="0" smtClean="0"/>
-          </a:p>
-          <a:p>
-            <a:r>
-              <a:rPr lang="en-US" dirty="0" smtClean="0"/>
-              <a:t>Mailing list : </a:t>
-            </a:r>
-            <a:r>
-              <a:rPr lang="en-US" dirty="0" smtClean="0">
-                <a:hlinkClick r:id="rId3" action="ppaction://hlinkfile"/>
-              </a:rPr>
-              <a:t>s.apache.org/flex-dev-forum</a:t>
-            </a:r>
-            <a:endParaRPr lang="en-US" dirty="0" smtClean="0"/>
-          </a:p>
-          <a:p>
-            <a:pPr marL="0" indent="0">
-              <a:buNone/>
-            </a:pPr>
-            <a:endParaRPr lang="en-US" dirty="0" smtClean="0"/>
-          </a:p>
-          <a:p>
-            <a:pPr marL="0" indent="0">
-              <a:buNone/>
-            </a:pPr>
-            <a:r>
-              <a:rPr lang="en-US" dirty="0" smtClean="0"/>
-              <a:t>Twitter: @</a:t>
-            </a:r>
-            <a:r>
-              <a:rPr lang="en-US" dirty="0" err="1" smtClean="0"/>
-              <a:t>bigosmallm</a:t>
-            </a:r>
-            <a:endParaRPr lang="en-US" dirty="0"/>
-          </a:p>
-          <a:p>
-            <a:pPr marL="0" indent="0">
-              <a:buNone/>
-            </a:pPr>
-            <a:endParaRPr lang="en-US" dirty="0" smtClean="0"/>
-          </a:p>
-          <a:p>
             <a:pPr marL="0" indent="0" algn="ctr">
               <a:buNone/>
             </a:pPr>
-            <a:r>
-              <a:rPr lang="en-US" sz="4000" b="1" dirty="0" smtClean="0"/>
-              <a:t>That’s all, folks!</a:t>
-            </a:r>
-            <a:endParaRPr lang="en-US" sz="4000" b="1" dirty="0"/>
+            <a:endParaRPr lang="en-US" sz="1800" dirty="0" smtClean="0">
+              <a:latin typeface="Consolas" panose="020B0609020204030204" pitchFamily="49" charset="0"/>
+              <a:cs typeface="Consolas" panose="020B0609020204030204" pitchFamily="49" charset="0"/>
+            </a:endParaRPr>
+          </a:p>
+          <a:p>
+            <a:pPr marL="0" indent="0" algn="ctr">
+              <a:buNone/>
+            </a:pPr>
+            <a:endParaRPr lang="en-US" sz="1800" dirty="0">
+              <a:latin typeface="Consolas" panose="020B0609020204030204" pitchFamily="49" charset="0"/>
+              <a:cs typeface="Consolas" panose="020B0609020204030204" pitchFamily="49" charset="0"/>
+            </a:endParaRPr>
+          </a:p>
+          <a:p>
+            <a:pPr marL="0" indent="0" algn="ctr">
+              <a:buNone/>
+            </a:pPr>
+            <a:endParaRPr lang="en-US" sz="1800" dirty="0" smtClean="0">
+              <a:latin typeface="Consolas" panose="020B0609020204030204" pitchFamily="49" charset="0"/>
+              <a:cs typeface="Consolas" panose="020B0609020204030204" pitchFamily="49" charset="0"/>
+            </a:endParaRPr>
+          </a:p>
+          <a:p>
+            <a:pPr marL="0" indent="0" algn="ctr">
+              <a:buNone/>
+            </a:pPr>
+            <a:endParaRPr lang="en-US" sz="1800" dirty="0">
+              <a:latin typeface="Consolas" panose="020B0609020204030204" pitchFamily="49" charset="0"/>
+              <a:cs typeface="Consolas" panose="020B0609020204030204" pitchFamily="49" charset="0"/>
+            </a:endParaRPr>
+          </a:p>
+          <a:p>
+            <a:pPr marL="0" indent="0" algn="ctr">
+              <a:buNone/>
+            </a:pPr>
+            <a:endParaRPr lang="en-US" sz="1800" dirty="0" smtClean="0">
+              <a:latin typeface="Consolas" panose="020B0609020204030204" pitchFamily="49" charset="0"/>
+              <a:cs typeface="Consolas" panose="020B0609020204030204" pitchFamily="49" charset="0"/>
+            </a:endParaRPr>
+          </a:p>
+          <a:p>
+            <a:pPr marL="0" indent="0" algn="ctr">
+              <a:buNone/>
+            </a:pPr>
+            <a:endParaRPr lang="en-US" sz="1800" dirty="0">
+              <a:latin typeface="Consolas" panose="020B0609020204030204" pitchFamily="49" charset="0"/>
+              <a:cs typeface="Consolas" panose="020B0609020204030204" pitchFamily="49" charset="0"/>
+            </a:endParaRPr>
+          </a:p>
+          <a:p>
+            <a:pPr marL="0" indent="0" algn="ctr">
+              <a:buNone/>
+            </a:pPr>
+            <a:r>
+              <a:rPr lang="en-US" sz="6000" b="1" dirty="0" smtClean="0">
+                <a:latin typeface="Consolas" panose="020B0609020204030204" pitchFamily="49" charset="0"/>
+                <a:cs typeface="Consolas" panose="020B0609020204030204" pitchFamily="49" charset="0"/>
+              </a:rPr>
+              <a:t>Demo</a:t>
+            </a:r>
           </a:p>
         </p:txBody>
       </p:sp>
     </p:spTree>
     <p:extLst>
       <p:ext uri="{BB962C8B-B14F-4D97-AF65-F5344CB8AC3E}">
-        <p14:creationId xmlns:p14="http://schemas.microsoft.com/office/powerpoint/2010/main" val="1983545541"/>
+        <p14:creationId xmlns:p14="http://schemas.microsoft.com/office/powerpoint/2010/main" val="231466012"/>
       </p:ext>
     </p:extLst>
   </p:cSld>
@@ -6767,7 +6683,6 @@
               <a:rPr lang="en-US" dirty="0" smtClean="0"/>
               <a:t>Web Components: Custom Elements</a:t>
             </a:r>
-            <a:endParaRPr lang="en-US" dirty="0" smtClean="0"/>
           </a:p>
           <a:p>
             <a:r>
@@ -6781,6 +6696,167 @@
     <p:extLst>
       <p:ext uri="{BB962C8B-B14F-4D97-AF65-F5344CB8AC3E}">
         <p14:creationId xmlns:p14="http://schemas.microsoft.com/office/powerpoint/2010/main" val="2684663955"/>
+      </p:ext>
+    </p:extLst>
+  </p:cSld>
+  <p:clrMapOvr>
+    <a:masterClrMapping/>
+  </p:clrMapOvr>
+  <p:timing>
+    <p:tnLst>
+      <p:par>
+        <p:cTn id="1" dur="indefinite" restart="never" nodeType="tmRoot"/>
+      </p:par>
+    </p:tnLst>
+  </p:timing>
+</p:sld>
+</file>
+
+<file path=ppt/slides/slide20.xml><?xml version="1.0" encoding="utf-8"?>
+<p:sld xmlns:a="http://schemas.openxmlformats.org/drawingml/2006/main" xmlns:r="http://schemas.openxmlformats.org/officeDocument/2006/relationships" xmlns:p="http://schemas.openxmlformats.org/presentationml/2006/main">
+  <p:cSld>
+    <p:spTree>
+      <p:nvGrpSpPr>
+        <p:cNvPr id="1" name=""/>
+        <p:cNvGrpSpPr/>
+        <p:nvPr/>
+      </p:nvGrpSpPr>
+      <p:grpSpPr>
+        <a:xfrm>
+          <a:off x="0" y="0"/>
+          <a:ext cx="0" cy="0"/>
+          <a:chOff x="0" y="0"/>
+          <a:chExt cx="0" cy="0"/>
+        </a:xfrm>
+      </p:grpSpPr>
+      <p:sp>
+        <p:nvSpPr>
+          <p:cNvPr id="2" name="Title 1"/>
+          <p:cNvSpPr>
+            <a:spLocks noGrp="1"/>
+          </p:cNvSpPr>
+          <p:nvPr>
+            <p:ph type="title"/>
+          </p:nvPr>
+        </p:nvSpPr>
+        <p:spPr>
+          <a:xfrm>
+            <a:off x="457200" y="274638"/>
+            <a:ext cx="8229600" cy="1249362"/>
+          </a:xfrm>
+        </p:spPr>
+        <p:txBody>
+          <a:bodyPr>
+            <a:normAutofit/>
+          </a:bodyPr>
+          <a:lstStyle/>
+          <a:p>
+            <a:r>
+              <a:rPr lang="en-US" dirty="0"/>
+              <a:t>Questions</a:t>
+            </a:r>
+            <a:r>
+              <a:rPr lang="en-US" dirty="0" smtClean="0"/>
+              <a:t>?</a:t>
+            </a:r>
+          </a:p>
+        </p:txBody>
+      </p:sp>
+      <p:sp>
+        <p:nvSpPr>
+          <p:cNvPr id="3" name="Content Placeholder 2"/>
+          <p:cNvSpPr>
+            <a:spLocks noGrp="1"/>
+          </p:cNvSpPr>
+          <p:nvPr>
+            <p:ph idx="1"/>
+          </p:nvPr>
+        </p:nvSpPr>
+        <p:spPr>
+          <a:xfrm>
+            <a:off x="457200" y="1828800"/>
+            <a:ext cx="8229600" cy="4876800"/>
+          </a:xfrm>
+        </p:spPr>
+        <p:txBody>
+          <a:bodyPr>
+            <a:normAutofit/>
+          </a:bodyPr>
+          <a:lstStyle/>
+          <a:p>
+            <a:r>
+              <a:rPr lang="en-US" dirty="0" smtClean="0"/>
+              <a:t>Wiki page: </a:t>
+            </a:r>
+            <a:r>
+              <a:rPr lang="en-US" dirty="0" smtClean="0">
+                <a:hlinkClick r:id="rId2"/>
+              </a:rPr>
+              <a:t>s.apache.org/</a:t>
+            </a:r>
+            <a:r>
+              <a:rPr lang="en-US" dirty="0" err="1" smtClean="0">
+                <a:hlinkClick r:id="rId2"/>
+              </a:rPr>
+              <a:t>flexjswiki</a:t>
+            </a:r>
+            <a:endParaRPr lang="en-US" dirty="0" smtClean="0"/>
+          </a:p>
+          <a:p>
+            <a:r>
+              <a:rPr lang="en-US" dirty="0" smtClean="0"/>
+              <a:t>Mailing list : </a:t>
+            </a:r>
+            <a:r>
+              <a:rPr lang="en-US" dirty="0" smtClean="0">
+                <a:hlinkClick r:id="rId3" action="ppaction://hlinkfile"/>
+              </a:rPr>
+              <a:t>s.apache.org/flex-dev-forum</a:t>
+            </a:r>
+            <a:endParaRPr lang="en-US" dirty="0" smtClean="0"/>
+          </a:p>
+          <a:p>
+            <a:pPr marL="0" indent="0">
+              <a:buNone/>
+            </a:pPr>
+            <a:endParaRPr lang="en-US" dirty="0" smtClean="0"/>
+          </a:p>
+          <a:p>
+            <a:pPr marL="0" indent="0">
+              <a:buNone/>
+            </a:pPr>
+            <a:r>
+              <a:rPr lang="en-US" dirty="0" smtClean="0"/>
+              <a:t>Twitter: @</a:t>
+            </a:r>
+            <a:r>
+              <a:rPr lang="en-US" dirty="0" err="1" smtClean="0"/>
+              <a:t>bigosmallm</a:t>
+            </a:r>
+            <a:endParaRPr lang="en-US" dirty="0"/>
+          </a:p>
+          <a:p>
+            <a:pPr marL="0" indent="0">
+              <a:buNone/>
+            </a:pPr>
+            <a:endParaRPr lang="en-US" dirty="0" smtClean="0"/>
+          </a:p>
+          <a:p>
+            <a:pPr marL="0" indent="0" algn="ctr">
+              <a:buNone/>
+            </a:pPr>
+            <a:r>
+              <a:rPr lang="en-US" sz="4000" b="1" dirty="0" smtClean="0"/>
+              <a:t>That’s all, folks!</a:t>
+            </a:r>
+            <a:endParaRPr lang="en-US" sz="4000" b="1" dirty="0"/>
+          </a:p>
+        </p:txBody>
+      </p:sp>
+    </p:spTree>
+    <p:extLst>
+      <p:ext uri="{BB962C8B-B14F-4D97-AF65-F5344CB8AC3E}">
+        <p14:creationId xmlns:p14="http://schemas.microsoft.com/office/powerpoint/2010/main" val="1983545541"/>
       </p:ext>
     </p:extLst>
   </p:cSld>
@@ -6835,7 +6911,6 @@
               <a:rPr lang="en-US" dirty="0" smtClean="0"/>
               <a:t>Why cross-compile ActionScript to JavaScript?</a:t>
             </a:r>
-            <a:endParaRPr lang="en-US" dirty="0" smtClean="0"/>
           </a:p>
         </p:txBody>
       </p:sp>
@@ -6967,7 +7042,6 @@
               <a:rPr lang="en-US" dirty="0" smtClean="0"/>
               <a:t>Why cross-compile ActionScript to JavaScript?</a:t>
             </a:r>
-            <a:endParaRPr lang="en-US" dirty="0" smtClean="0"/>
           </a:p>
         </p:txBody>
       </p:sp>
@@ -7110,7 +7184,6 @@
               <a:rPr lang="en-US" dirty="0" smtClean="0"/>
               <a:t>Why cross-compile ActionScript to JavaScript?</a:t>
             </a:r>
-            <a:endParaRPr lang="en-US" dirty="0" smtClean="0"/>
           </a:p>
         </p:txBody>
       </p:sp>
@@ -7244,7 +7317,6 @@
               <a:rPr lang="en-US" dirty="0" smtClean="0"/>
               <a:t>Manipulate HTML DOM</a:t>
             </a:r>
-            <a:endParaRPr lang="en-US" dirty="0" smtClean="0"/>
           </a:p>
         </p:txBody>
       </p:sp>
@@ -7386,10 +7458,6 @@
               </a:rPr>
               <a:t>(container);</a:t>
             </a:r>
-            <a:endParaRPr lang="en-US" sz="2800" b="1" dirty="0" smtClean="0">
-              <a:latin typeface="Consolas" panose="020B0609020204030204" pitchFamily="49" charset="0"/>
-              <a:cs typeface="Consolas" panose="020B0609020204030204" pitchFamily="49" charset="0"/>
-            </a:endParaRPr>
           </a:p>
         </p:txBody>
       </p:sp>
@@ -7451,7 +7519,6 @@
               <a:rPr lang="en-US" dirty="0" smtClean="0"/>
               <a:t>SVG!</a:t>
             </a:r>
-            <a:endParaRPr lang="en-US" dirty="0" smtClean="0"/>
           </a:p>
         </p:txBody>
       </p:sp>
@@ -7982,7 +8049,6 @@
               <a:rPr lang="en-US" dirty="0" smtClean="0"/>
               <a:t>Let’s Animate!</a:t>
             </a:r>
-            <a:endParaRPr lang="en-US" dirty="0" smtClean="0"/>
           </a:p>
         </p:txBody>
       </p:sp>
@@ -8369,12 +8435,7 @@
             <p:ph type="title"/>
           </p:nvPr>
         </p:nvSpPr>
-        <p:spPr>
-          <a:xfrm>
-            <a:off x="457200" y="274638"/>
-            <a:ext cx="8229600" cy="1249362"/>
-          </a:xfrm>
-        </p:spPr>
+        <p:spPr/>
         <p:txBody>
           <a:bodyPr>
             <a:normAutofit/>
@@ -8382,8 +8443,8 @@
           <a:lstStyle/>
           <a:p>
             <a:r>
-              <a:rPr lang="en-US" dirty="0" smtClean="0"/>
-              <a:t>Externs</a:t>
+              <a:rPr lang="en-US" dirty="0" err="1" smtClean="0"/>
+              <a:t>IndexedDB</a:t>
             </a:r>
             <a:endParaRPr lang="en-US" dirty="0" smtClean="0"/>
           </a:p>
@@ -8401,8 +8462,8 @@
         </p:nvSpPr>
         <p:spPr>
           <a:xfrm>
-            <a:off x="76200" y="1828800"/>
-            <a:ext cx="8915400" cy="4876800"/>
+            <a:off x="152400" y="1600200"/>
+            <a:ext cx="8915400" cy="5105400"/>
           </a:xfrm>
         </p:spPr>
         <p:txBody>
@@ -8411,32 +8472,151 @@
           </a:bodyPr>
           <a:lstStyle/>
           <a:p>
-            <a:r>
-              <a:rPr lang="en-US" dirty="0" smtClean="0"/>
-              <a:t>Externs are API signatures (interfaces) of third party libraries that can be directly accessed from ActionScript during compile time</a:t>
-            </a:r>
-          </a:p>
-          <a:p>
-            <a:r>
-              <a:rPr lang="en-US" dirty="0" smtClean="0"/>
-              <a:t>Runtime implementation comes from the 3</a:t>
-            </a:r>
-            <a:r>
-              <a:rPr lang="en-US" baseline="30000" dirty="0" smtClean="0"/>
-              <a:t>rd</a:t>
-            </a:r>
-            <a:r>
-              <a:rPr lang="en-US" dirty="0" smtClean="0"/>
-              <a:t> party library itself</a:t>
-            </a:r>
-            <a:endParaRPr lang="en-US" dirty="0" smtClean="0"/>
+            <a:pPr marL="0" indent="0">
+              <a:buNone/>
+            </a:pPr>
+            <a:r>
+              <a:rPr lang="en-US" sz="2800" dirty="0" err="1">
+                <a:latin typeface="Consolas" panose="020B0609020204030204" pitchFamily="49" charset="0"/>
+                <a:cs typeface="Consolas" panose="020B0609020204030204" pitchFamily="49" charset="0"/>
+              </a:rPr>
+              <a:t>var</a:t>
+            </a:r>
+            <a:r>
+              <a:rPr lang="en-US" sz="2800" dirty="0">
+                <a:latin typeface="Consolas" panose="020B0609020204030204" pitchFamily="49" charset="0"/>
+                <a:cs typeface="Consolas" panose="020B0609020204030204" pitchFamily="49" charset="0"/>
+              </a:rPr>
+              <a:t> </a:t>
+            </a:r>
+            <a:r>
+              <a:rPr lang="en-US" sz="2800" dirty="0" err="1">
+                <a:latin typeface="Consolas" panose="020B0609020204030204" pitchFamily="49" charset="0"/>
+                <a:cs typeface="Consolas" panose="020B0609020204030204" pitchFamily="49" charset="0"/>
+              </a:rPr>
+              <a:t>dbRequest:IDBOpenDBRequest</a:t>
+            </a:r>
+            <a:r>
+              <a:rPr lang="en-US" sz="2800" dirty="0">
+                <a:latin typeface="Consolas" panose="020B0609020204030204" pitchFamily="49" charset="0"/>
+                <a:cs typeface="Consolas" panose="020B0609020204030204" pitchFamily="49" charset="0"/>
+              </a:rPr>
+              <a:t> = </a:t>
+            </a:r>
+            <a:r>
+              <a:rPr lang="en-US" sz="2800" dirty="0" err="1">
+                <a:latin typeface="Consolas" panose="020B0609020204030204" pitchFamily="49" charset="0"/>
+                <a:cs typeface="Consolas" panose="020B0609020204030204" pitchFamily="49" charset="0"/>
+              </a:rPr>
+              <a:t>window.indexedDB.open</a:t>
+            </a:r>
+            <a:r>
+              <a:rPr lang="en-US" sz="2800" dirty="0">
+                <a:latin typeface="Consolas" panose="020B0609020204030204" pitchFamily="49" charset="0"/>
+                <a:cs typeface="Consolas" panose="020B0609020204030204" pitchFamily="49" charset="0"/>
+              </a:rPr>
+              <a:t>("</a:t>
+            </a:r>
+            <a:r>
+              <a:rPr lang="en-US" sz="2800" dirty="0" err="1">
+                <a:latin typeface="Consolas" panose="020B0609020204030204" pitchFamily="49" charset="0"/>
+                <a:cs typeface="Consolas" panose="020B0609020204030204" pitchFamily="49" charset="0"/>
+              </a:rPr>
+              <a:t>myDatabase</a:t>
+            </a:r>
+            <a:r>
+              <a:rPr lang="en-US" sz="2800" dirty="0" smtClean="0">
+                <a:latin typeface="Consolas" panose="020B0609020204030204" pitchFamily="49" charset="0"/>
+                <a:cs typeface="Consolas" panose="020B0609020204030204" pitchFamily="49" charset="0"/>
+              </a:rPr>
+              <a:t>");</a:t>
+            </a:r>
+          </a:p>
+          <a:p>
+            <a:pPr marL="0" indent="0">
+              <a:buNone/>
+            </a:pPr>
+            <a:endParaRPr lang="en-US" sz="2800" dirty="0">
+              <a:latin typeface="Consolas" panose="020B0609020204030204" pitchFamily="49" charset="0"/>
+              <a:cs typeface="Consolas" panose="020B0609020204030204" pitchFamily="49" charset="0"/>
+            </a:endParaRPr>
+          </a:p>
+          <a:p>
+            <a:pPr marL="0" indent="0">
+              <a:buNone/>
+            </a:pPr>
+            <a:r>
+              <a:rPr lang="en-US" sz="2800" dirty="0" err="1">
+                <a:latin typeface="Consolas" panose="020B0609020204030204" pitchFamily="49" charset="0"/>
+                <a:cs typeface="Consolas" panose="020B0609020204030204" pitchFamily="49" charset="0"/>
+              </a:rPr>
+              <a:t>dbRequest.onerror</a:t>
+            </a:r>
+            <a:r>
+              <a:rPr lang="en-US" sz="2800" dirty="0">
+                <a:latin typeface="Consolas" panose="020B0609020204030204" pitchFamily="49" charset="0"/>
+                <a:cs typeface="Consolas" panose="020B0609020204030204" pitchFamily="49" charset="0"/>
+              </a:rPr>
+              <a:t>(</a:t>
+            </a:r>
+            <a:r>
+              <a:rPr lang="en-US" sz="2800" u="sng" dirty="0" err="1">
+                <a:latin typeface="Consolas" panose="020B0609020204030204" pitchFamily="49" charset="0"/>
+                <a:cs typeface="Consolas" panose="020B0609020204030204" pitchFamily="49" charset="0"/>
+              </a:rPr>
+              <a:t>handleDBEror</a:t>
+            </a:r>
+            <a:r>
+              <a:rPr lang="en-US" sz="2800" u="sng" dirty="0">
+                <a:latin typeface="Consolas" panose="020B0609020204030204" pitchFamily="49" charset="0"/>
+                <a:cs typeface="Consolas" panose="020B0609020204030204" pitchFamily="49" charset="0"/>
+              </a:rPr>
+              <a:t>);</a:t>
+            </a:r>
+          </a:p>
+          <a:p>
+            <a:pPr marL="0" indent="0">
+              <a:buNone/>
+            </a:pPr>
+            <a:r>
+              <a:rPr lang="en-US" sz="2800" dirty="0" err="1">
+                <a:latin typeface="Consolas" panose="020B0609020204030204" pitchFamily="49" charset="0"/>
+                <a:cs typeface="Consolas" panose="020B0609020204030204" pitchFamily="49" charset="0"/>
+              </a:rPr>
+              <a:t>dbRequest.onsuccess</a:t>
+            </a:r>
+            <a:r>
+              <a:rPr lang="en-US" sz="2800" dirty="0">
+                <a:latin typeface="Consolas" panose="020B0609020204030204" pitchFamily="49" charset="0"/>
+                <a:cs typeface="Consolas" panose="020B0609020204030204" pitchFamily="49" charset="0"/>
+              </a:rPr>
+              <a:t>(</a:t>
+            </a:r>
+            <a:r>
+              <a:rPr lang="en-US" sz="2800" u="sng" dirty="0" err="1">
+                <a:latin typeface="Consolas" panose="020B0609020204030204" pitchFamily="49" charset="0"/>
+                <a:cs typeface="Consolas" panose="020B0609020204030204" pitchFamily="49" charset="0"/>
+              </a:rPr>
+              <a:t>handleDBSucess</a:t>
+            </a:r>
+            <a:r>
+              <a:rPr lang="en-US" sz="2800" u="sng" dirty="0">
+                <a:latin typeface="Consolas" panose="020B0609020204030204" pitchFamily="49" charset="0"/>
+                <a:cs typeface="Consolas" panose="020B0609020204030204" pitchFamily="49" charset="0"/>
+              </a:rPr>
+              <a:t>);</a:t>
+            </a:r>
+            <a:endParaRPr lang="en-US" sz="2800" dirty="0" smtClean="0">
+              <a:latin typeface="Consolas" panose="020B0609020204030204" pitchFamily="49" charset="0"/>
+              <a:cs typeface="Consolas" panose="020B0609020204030204" pitchFamily="49" charset="0"/>
+            </a:endParaRPr>
           </a:p>
         </p:txBody>
       </p:sp>
     </p:spTree>
     <p:extLst>
       <p:ext uri="{BB962C8B-B14F-4D97-AF65-F5344CB8AC3E}">
-        <p14:creationId xmlns:p14="http://schemas.microsoft.com/office/powerpoint/2010/main" val="2861399429"/>
+        <p14:creationId xmlns:p14="http://schemas.microsoft.com/office/powerpoint/2010/main" val="1051875835"/>
       </p:ext>
     </p:extLst>
   </p:cSld>

</xml_diff>